<commit_message>
Hebelgesetze ausgearbeitet, Impuls folie hinzugefügt
</commit_message>
<xml_diff>
--- a/LNdW2013 physik in Aikido/LNdW2013 Physik in Aikido.pptx
+++ b/LNdW2013 physik in Aikido/LNdW2013 Physik in Aikido.pptx
@@ -169,7 +169,7 @@
             </a:lvl1pPr>
           </a:lstStyle>
           <a:p>
-            <a:endParaRPr lang="de-DE"/>
+            <a:endParaRPr lang="de-DE" dirty="0"/>
           </a:p>
         </p:txBody>
       </p:sp>
@@ -202,9 +202,9 @@
           <a:p>
             <a:fld id="{22975348-65C7-4E30-829F-ADBF67F8AD2B}" type="datetimeFigureOut">
               <a:rPr lang="de-DE" smtClean="0"/>
-              <a:t>20.11.2013</a:t>
+              <a:t>21.11.2013</a:t>
             </a:fld>
-            <a:endParaRPr lang="de-DE"/>
+            <a:endParaRPr lang="de-DE" dirty="0"/>
           </a:p>
         </p:txBody>
       </p:sp>
@@ -237,7 +237,7 @@
           <a:bodyPr vert="horz" lIns="91440" tIns="45720" rIns="91440" bIns="45720" rtlCol="0" anchor="ctr"/>
           <a:lstStyle/>
           <a:p>
-            <a:endParaRPr lang="de-DE"/>
+            <a:endParaRPr lang="de-DE" dirty="0"/>
           </a:p>
         </p:txBody>
       </p:sp>
@@ -328,7 +328,7 @@
             </a:lvl1pPr>
           </a:lstStyle>
           <a:p>
-            <a:endParaRPr lang="de-DE"/>
+            <a:endParaRPr lang="de-DE" dirty="0"/>
           </a:p>
         </p:txBody>
       </p:sp>
@@ -363,7 +363,7 @@
               <a:rPr lang="de-DE" smtClean="0"/>
               <a:t>‹Nr.›</a:t>
             </a:fld>
-            <a:endParaRPr lang="de-DE"/>
+            <a:endParaRPr lang="de-DE" dirty="0"/>
           </a:p>
         </p:txBody>
       </p:sp>
@@ -563,7 +563,7 @@
               <a:rPr lang="de-DE" smtClean="0"/>
               <a:t>3</a:t>
             </a:fld>
-            <a:endParaRPr lang="de-DE"/>
+            <a:endParaRPr lang="de-DE" dirty="0"/>
           </a:p>
         </p:txBody>
       </p:sp>
@@ -634,11 +634,7 @@
             </a:r>
             <a:r>
               <a:rPr lang="de-DE" baseline="0" dirty="0" smtClean="0"/>
-              <a:t> </a:t>
-            </a:r>
-            <a:r>
-              <a:rPr lang="de-DE" baseline="0" dirty="0" err="1" smtClean="0"/>
-              <a:t>hanmi</a:t>
+              <a:t> hanmi</a:t>
             </a:r>
             <a:r>
               <a:rPr lang="de-DE" dirty="0" smtClean="0"/>
@@ -656,23 +652,7 @@
             </a:pPr>
             <a:r>
               <a:rPr lang="de-DE" baseline="0" dirty="0" smtClean="0"/>
-              <a:t>Karate </a:t>
-            </a:r>
-            <a:r>
-              <a:rPr lang="de-DE" baseline="0" dirty="0" err="1" smtClean="0"/>
-              <a:t>Zenkutsu</a:t>
-            </a:r>
-            <a:r>
-              <a:rPr lang="de-DE" baseline="0" dirty="0" smtClean="0"/>
-              <a:t> </a:t>
-            </a:r>
-            <a:r>
-              <a:rPr lang="de-DE" baseline="0" dirty="0" err="1" smtClean="0"/>
-              <a:t>dachi</a:t>
-            </a:r>
-            <a:r>
-              <a:rPr lang="de-DE" baseline="0" dirty="0" smtClean="0"/>
-              <a:t>: Zentrum ist weiter vorne, und tiefer. Grundfläche ist ein Rechteck. Ebenfalls starke und schwache Linien</a:t>
+              <a:t>Karate Zenkutsu dachi: Zentrum ist weiter vorne, und tiefer. Grundfläche ist ein Rechteck. Ebenfalls starke und schwache Linien</a:t>
             </a:r>
           </a:p>
           <a:p>
@@ -682,15 +662,7 @@
             </a:pPr>
             <a:r>
               <a:rPr lang="de-DE" baseline="0" dirty="0" smtClean="0"/>
-              <a:t>Für eine </a:t>
-            </a:r>
-            <a:r>
-              <a:rPr lang="de-DE" baseline="0" dirty="0" err="1" smtClean="0"/>
-              <a:t>Aikidotechnik</a:t>
-            </a:r>
-            <a:r>
-              <a:rPr lang="de-DE" baseline="0" dirty="0" smtClean="0"/>
-              <a:t> ist es zwingend erforderlich, den Schwerpunkt des Angreifers außerhalb seiner Standfläche zu bringen.</a:t>
+              <a:t>Für eine Aikidotechnik ist es zwingend erforderlich, den Schwerpunkt des Angreifers außerhalb seiner Standfläche zu bringen.</a:t>
             </a:r>
           </a:p>
           <a:p>
@@ -700,15 +672,7 @@
             </a:pPr>
             <a:r>
               <a:rPr lang="de-DE" baseline="0" dirty="0" smtClean="0"/>
-              <a:t>Andererseits ist eigene Stabilität für einen </a:t>
-            </a:r>
-            <a:r>
-              <a:rPr lang="de-DE" baseline="0" dirty="0" err="1" smtClean="0"/>
-              <a:t>Aikidoka</a:t>
-            </a:r>
-            <a:r>
-              <a:rPr lang="de-DE" baseline="0" dirty="0" smtClean="0"/>
-              <a:t> von entscheidender Bedeutung.</a:t>
+              <a:t>Andererseits ist eigene Stabilität für einen Aikidoka von entscheidender Bedeutung.</a:t>
             </a:r>
             <a:endParaRPr lang="de-DE" dirty="0" smtClean="0"/>
           </a:p>
@@ -733,7 +697,7 @@
               <a:rPr lang="de-DE" smtClean="0"/>
               <a:t>6</a:t>
             </a:fld>
-            <a:endParaRPr lang="de-DE"/>
+            <a:endParaRPr lang="de-DE" dirty="0"/>
           </a:p>
         </p:txBody>
       </p:sp>
@@ -838,7 +802,7 @@
               <a:rPr lang="de-DE" smtClean="0"/>
               <a:t>7</a:t>
             </a:fld>
-            <a:endParaRPr lang="de-DE"/>
+            <a:endParaRPr lang="de-DE" dirty="0"/>
           </a:p>
         </p:txBody>
       </p:sp>
@@ -914,57 +878,21 @@
               <a:t>Zu 1. </a:t>
             </a:r>
             <a:r>
-              <a:rPr lang="de-DE" baseline="0" dirty="0" err="1" smtClean="0"/>
-              <a:t>Rockkyu</a:t>
-            </a:r>
-            <a:r>
               <a:rPr lang="de-DE" baseline="0" dirty="0" smtClean="0"/>
-              <a:t>, </a:t>
-            </a:r>
-            <a:r>
-              <a:rPr lang="de-DE" baseline="0" dirty="0" err="1" smtClean="0"/>
-              <a:t>Nikkyu</a:t>
+              <a:t>Rokkyu, </a:t>
             </a:r>
             <a:r>
               <a:rPr lang="de-DE" baseline="0" dirty="0" smtClean="0"/>
-              <a:t>, Kote </a:t>
-            </a:r>
-            <a:r>
-              <a:rPr lang="de-DE" baseline="0" dirty="0" err="1" smtClean="0"/>
-              <a:t>Gaeshi</a:t>
-            </a:r>
+              <a:t>Kote Gaeshi. Nicht die Schmerzeinwirkung ist entscheidend, sondern die Struktur</a:t>
+            </a:r>
+          </a:p>
+          <a:p>
+            <a:endParaRPr lang="de-DE" baseline="0" dirty="0" smtClean="0"/>
+          </a:p>
+          <a:p>
             <a:r>
               <a:rPr lang="de-DE" baseline="0" dirty="0" smtClean="0"/>
-              <a:t>. Nicht die Schmerzeinwirkung ist entscheidend, sondern die Struktur</a:t>
-            </a:r>
-          </a:p>
-          <a:p>
-            <a:endParaRPr lang="de-DE" baseline="0" dirty="0" smtClean="0"/>
-          </a:p>
-          <a:p>
-            <a:r>
-              <a:rPr lang="de-DE" baseline="0" dirty="0" smtClean="0"/>
-              <a:t>Zu 2. </a:t>
-            </a:r>
-            <a:r>
-              <a:rPr lang="de-DE" baseline="0" dirty="0" err="1" smtClean="0"/>
-              <a:t>Shihonage</a:t>
-            </a:r>
-            <a:r>
-              <a:rPr lang="de-DE" baseline="0" dirty="0" smtClean="0"/>
-              <a:t>, </a:t>
-            </a:r>
-            <a:r>
-              <a:rPr lang="de-DE" baseline="0" dirty="0" err="1" smtClean="0"/>
-              <a:t>Irimi</a:t>
-            </a:r>
-            <a:r>
-              <a:rPr lang="de-DE" baseline="0" dirty="0" smtClean="0"/>
-              <a:t> Nage, </a:t>
-            </a:r>
-            <a:r>
-              <a:rPr lang="de-DE" baseline="0" dirty="0" err="1" smtClean="0"/>
-              <a:t>Kaitennage</a:t>
+              <a:t>Zu 2. Shihonage, Irimi Nage, Kaitennage</a:t>
             </a:r>
             <a:r>
               <a:rPr lang="de-DE" dirty="0" smtClean="0"/>
@@ -979,12 +907,8 @@
               <a:defRPr/>
             </a:pPr>
             <a:r>
-              <a:rPr lang="de-DE" dirty="0" err="1" smtClean="0"/>
-              <a:t>Kokyu</a:t>
-            </a:r>
-            <a:r>
               <a:rPr lang="de-DE" dirty="0" smtClean="0"/>
-              <a:t>: Diese </a:t>
+              <a:t>Kokyu: Diese </a:t>
             </a:r>
             <a:r>
               <a:rPr lang="de-DE" dirty="0"/>
@@ -1048,7 +972,7 @@
               <a:rPr lang="de-DE" smtClean="0"/>
               <a:t>8</a:t>
             </a:fld>
-            <a:endParaRPr lang="de-DE"/>
+            <a:endParaRPr lang="de-DE" dirty="0"/>
           </a:p>
         </p:txBody>
       </p:sp>
@@ -1136,7 +1060,11 @@
             </a:pPr>
             <a:r>
               <a:rPr lang="de-DE" baseline="0" dirty="0" smtClean="0"/>
-              <a:t>Um doppelte Masse zu beschleunigen, braucht man doppelte Kraft. Mit einfacher Kraft ist die Beschleunigung halb so groß.</a:t>
+              <a:t>+3. Um </a:t>
+            </a:r>
+            <a:r>
+              <a:rPr lang="de-DE" baseline="0" dirty="0" smtClean="0"/>
+              <a:t>doppelte Masse zu beschleunigen, braucht man doppelte Kraft. Mit einfacher Kraft ist die Beschleunigung halb so groß.</a:t>
             </a:r>
             <a:br>
               <a:rPr lang="de-DE" baseline="0" dirty="0" smtClean="0"/>
@@ -1145,31 +1073,21 @@
               <a:rPr lang="de-DE" baseline="0" dirty="0" smtClean="0"/>
               <a:t>Man muss die Masse des Angreifers beachten! </a:t>
             </a:r>
-          </a:p>
-          <a:p>
-            <a:pPr marL="228600" indent="-228600">
-              <a:buFont typeface="+mj-lt"/>
-              <a:buAutoNum type="arabicPeriod"/>
-            </a:pPr>
             <a:r>
               <a:rPr lang="de-DE" baseline="0" dirty="0" smtClean="0"/>
-              <a:t>Die gleiche Kraft wirkt auch auf </a:t>
-            </a:r>
-            <a:r>
-              <a:rPr lang="de-DE" baseline="0" dirty="0" err="1" smtClean="0"/>
-              <a:t>Aikidoka</a:t>
+              <a:t>Die </a:t>
             </a:r>
             <a:r>
               <a:rPr lang="de-DE" baseline="0" dirty="0" smtClean="0"/>
-              <a:t>! Versucht man einen schweren Gegner zu stark zu beschleunigen kommt man </a:t>
-            </a:r>
-            <a:r>
-              <a:rPr lang="de-DE" baseline="0" dirty="0" err="1" smtClean="0"/>
-              <a:t>evt</a:t>
+              <a:t>gleiche Kraft wirkt auch auf Aikidoka! Versucht man einen schweren Gegner zu stark zu beschleunigen kommt man </a:t>
             </a:r>
             <a:r>
               <a:rPr lang="de-DE" baseline="0" dirty="0" smtClean="0"/>
-              <a:t>. an eigene Grenzen!</a:t>
+              <a:t>evtl.. </a:t>
+            </a:r>
+            <a:r>
+              <a:rPr lang="de-DE" baseline="0" dirty="0" smtClean="0"/>
+              <a:t>an eigene Grenzen!</a:t>
             </a:r>
             <a:endParaRPr lang="de-DE" dirty="0"/>
           </a:p>
@@ -1194,7 +1112,7 @@
               <a:rPr lang="de-DE" smtClean="0"/>
               <a:t>9</a:t>
             </a:fld>
-            <a:endParaRPr lang="de-DE"/>
+            <a:endParaRPr lang="de-DE" dirty="0"/>
           </a:p>
         </p:txBody>
       </p:sp>
@@ -1278,7 +1196,7 @@
               <a:rPr lang="de-DE" smtClean="0"/>
               <a:t>10</a:t>
             </a:fld>
-            <a:endParaRPr lang="de-DE"/>
+            <a:endParaRPr lang="de-DE" dirty="0"/>
           </a:p>
         </p:txBody>
       </p:sp>
@@ -1630,7 +1548,7 @@
           <a:p>
             <a:r>
               <a:rPr lang="de-DE" smtClean="0"/>
-              <a:t>A. Kessler, R. Altwasser, J. Schmidt </a:t>
+              <a:t>A. Kessler,  J. Schmidt,  K. Schergaut </a:t>
             </a:r>
             <a:endParaRPr lang="de-DE" dirty="0"/>
           </a:p>
@@ -1846,7 +1764,7 @@
           <a:p>
             <a:r>
               <a:rPr lang="de-DE" smtClean="0"/>
-              <a:t>A. Kessler, R. Altwasser, J. Schmidt </a:t>
+              <a:t>A. Kessler,  J. Schmidt,  K. Schergaut </a:t>
             </a:r>
             <a:endParaRPr lang="de-DE" dirty="0"/>
           </a:p>
@@ -2176,7 +2094,7 @@
           <a:p>
             <a:r>
               <a:rPr lang="de-DE" smtClean="0"/>
-              <a:t>A. Kessler, R. Altwasser, J. Schmidt </a:t>
+              <a:t>A. Kessler,  J. Schmidt,  K. Schergaut </a:t>
             </a:r>
             <a:endParaRPr lang="de-DE" dirty="0"/>
           </a:p>
@@ -2520,9 +2438,9 @@
           <a:p>
             <a:r>
               <a:rPr lang="de-DE" smtClean="0"/>
-              <a:t>A. Kessler, R. Altwasser, J. Schmidt </a:t>
-            </a:r>
-            <a:endParaRPr lang="de-DE"/>
+              <a:t>A. Kessler,  J. Schmidt,  K. Schergaut </a:t>
+            </a:r>
+            <a:endParaRPr lang="de-DE" dirty="0"/>
           </a:p>
         </p:txBody>
       </p:sp>
@@ -2558,7 +2476,7 @@
           </a:lstStyle>
           <a:p>
             <a:r>
-              <a:rPr lang="de-DE" smtClean="0"/>
+              <a:rPr lang="de-DE" dirty="0" smtClean="0"/>
               <a:t>Physik in der Kampfkunst Aikido                                http://www.uni-jena.de/aikido</a:t>
             </a:r>
             <a:endParaRPr lang="de-DE" dirty="0"/>
@@ -2602,7 +2520,7 @@
               <a:rPr lang="de-DE" smtClean="0"/>
               <a:t>‹Nr.›</a:t>
             </a:fld>
-            <a:endParaRPr lang="de-DE"/>
+            <a:endParaRPr lang="de-DE" dirty="0"/>
           </a:p>
         </p:txBody>
       </p:sp>
@@ -2931,10 +2849,15 @@
             <p:ph type="subTitle" idx="1"/>
           </p:nvPr>
         </p:nvSpPr>
-        <p:spPr/>
+        <p:spPr>
+          <a:xfrm>
+            <a:off x="1043608" y="3933056"/>
+            <a:ext cx="7056784" cy="2135088"/>
+          </a:xfrm>
+        </p:spPr>
         <p:txBody>
           <a:bodyPr>
-            <a:normAutofit fontScale="85000" lnSpcReduction="10000"/>
+            <a:normAutofit fontScale="92500"/>
           </a:bodyPr>
           <a:lstStyle/>
           <a:p>
@@ -2946,22 +2869,39 @@
           <a:p>
             <a:r>
               <a:rPr lang="de-DE" dirty="0" smtClean="0"/>
-              <a:t>Robert Altwasser, 1. Dan (</a:t>
+              <a:t>Jacob </a:t>
+            </a:r>
+            <a:r>
+              <a:rPr lang="de-DE" dirty="0" smtClean="0"/>
+              <a:t>Schmidt, 1. Dan (Psychologie und Sozialwissenschaften</a:t>
+            </a:r>
+            <a:r>
+              <a:rPr lang="de-DE" dirty="0" smtClean="0"/>
+              <a:t>)</a:t>
+            </a:r>
+          </a:p>
+          <a:p>
+            <a:r>
+              <a:rPr lang="de-DE" dirty="0" smtClean="0"/>
+              <a:t>Konrad </a:t>
             </a:r>
             <a:r>
               <a:rPr lang="de-DE" dirty="0" err="1" smtClean="0"/>
-              <a:t>PhD</a:t>
+              <a:t>Schergaut</a:t>
             </a:r>
             <a:r>
               <a:rPr lang="de-DE" dirty="0" smtClean="0"/>
-              <a:t> Bioinformatik)</a:t>
-            </a:r>
-          </a:p>
-          <a:p>
+              <a:t>, 2. Kyu (Dipl. </a:t>
+            </a:r>
+            <a:r>
+              <a:rPr lang="de-DE" dirty="0" err="1" smtClean="0"/>
+              <a:t>Infomatiker</a:t>
+            </a:r>
             <a:r>
               <a:rPr lang="de-DE" dirty="0" smtClean="0"/>
-              <a:t>Jacob Schmidt, 1. Dan (Psychologie und Sozialwissenschaften)</a:t>
-            </a:r>
+              <a:t>)</a:t>
+            </a:r>
+            <a:endParaRPr lang="de-DE" dirty="0" smtClean="0"/>
           </a:p>
           <a:p>
             <a:endParaRPr lang="de-DE" dirty="0"/>
@@ -3007,7 +2947,7 @@
       </p:grpSpPr>
       <p:sp>
         <p:nvSpPr>
-          <p:cNvPr id="2" name="Inhaltsplatzhalter 1"/>
+          <p:cNvPr id="6" name="Inhaltsplatzhalter 5"/>
           <p:cNvSpPr>
             <a:spLocks noGrp="1"/>
           </p:cNvSpPr>
@@ -3021,9 +2961,34 @@
           <a:lstStyle/>
           <a:p>
             <a:r>
+              <a:rPr lang="de-DE" dirty="0"/>
+              <a:t>Impuls = Masse </a:t>
+            </a:r>
+            <a:r>
               <a:rPr lang="de-DE" dirty="0" smtClean="0"/>
-              <a:t>Impuls = Masse * Geschwindigkeit</a:t>
-            </a:r>
+              <a:t>* Geschwindigkeit</a:t>
+            </a:r>
+          </a:p>
+          <a:p>
+            <a:r>
+              <a:rPr lang="de-DE" dirty="0" smtClean="0"/>
+              <a:t>Man überträgt viel Impuls, wenn man den ganzen Körper einsetzt!</a:t>
+            </a:r>
+          </a:p>
+          <a:p>
+            <a:r>
+              <a:rPr lang="de-DE" dirty="0" smtClean="0"/>
+              <a:t>In Aikido: direkten Zusammenstoß vermeiden!</a:t>
+            </a:r>
+          </a:p>
+          <a:p>
+            <a:r>
+              <a:rPr lang="de-DE" dirty="0" smtClean="0"/>
+              <a:t>Ausweichen und dem Angreifer einen kleinen Impuls dazugeben!</a:t>
+            </a:r>
+            <a:endParaRPr lang="de-DE" dirty="0"/>
+          </a:p>
+          <a:p>
             <a:endParaRPr lang="de-DE" dirty="0"/>
           </a:p>
         </p:txBody>
@@ -3047,7 +3012,7 @@
           <a:p>
             <a:r>
               <a:rPr lang="de-DE" dirty="0" smtClean="0"/>
-              <a:t>Impulserhaltung</a:t>
+              <a:t>Impulsübertragung</a:t>
             </a:r>
             <a:endParaRPr lang="de-DE" dirty="0"/>
           </a:p>
@@ -3070,7 +3035,7 @@
           <a:p>
             <a:r>
               <a:rPr lang="de-DE" smtClean="0"/>
-              <a:t>A. Kessler, R. Altwasser, J. Schmidt </a:t>
+              <a:t>A. Kessler,  J. Schmidt,  K. Schergaut </a:t>
             </a:r>
             <a:endParaRPr lang="de-DE" dirty="0"/>
           </a:p>
@@ -3092,48 +3057,10 @@
           <a:lstStyle/>
           <a:p>
             <a:r>
-              <a:rPr lang="de-DE" smtClean="0"/>
+              <a:rPr lang="de-DE" dirty="0" smtClean="0"/>
               <a:t>Physik in der Kampfkunst Aikido                                http://www.uni-jena.de/aikido</a:t>
             </a:r>
             <a:endParaRPr lang="de-DE" dirty="0"/>
-          </a:p>
-        </p:txBody>
-      </p:sp>
-      <p:sp>
-        <p:nvSpPr>
-          <p:cNvPr id="6" name="Inhaltsplatzhalter 5"/>
-          <p:cNvSpPr>
-            <a:spLocks noGrp="1"/>
-          </p:cNvSpPr>
-          <p:nvPr>
-            <p:ph idx="10"/>
-          </p:nvPr>
-        </p:nvSpPr>
-        <p:spPr/>
-        <p:txBody>
-          <a:bodyPr/>
-          <a:lstStyle/>
-          <a:p>
-            <a:endParaRPr lang="de-DE"/>
-          </a:p>
-        </p:txBody>
-      </p:sp>
-      <p:sp>
-        <p:nvSpPr>
-          <p:cNvPr id="7" name="Inhaltsplatzhalter 6"/>
-          <p:cNvSpPr>
-            <a:spLocks noGrp="1"/>
-          </p:cNvSpPr>
-          <p:nvPr>
-            <p:ph idx="11"/>
-          </p:nvPr>
-        </p:nvSpPr>
-        <p:spPr/>
-        <p:txBody>
-          <a:bodyPr/>
-          <a:lstStyle/>
-          <a:p>
-            <a:endParaRPr lang="de-DE"/>
           </a:p>
         </p:txBody>
       </p:sp>
@@ -3254,7 +3181,7 @@
           <a:p>
             <a:r>
               <a:rPr lang="de-DE" smtClean="0"/>
-              <a:t>A. Kessler, R. Altwasser, J. Schmidt </a:t>
+              <a:t>A. Kessler,  J. Schmidt,  K. Schergaut </a:t>
             </a:r>
             <a:endParaRPr lang="de-DE" dirty="0"/>
           </a:p>
@@ -3276,7 +3203,7 @@
           <a:lstStyle/>
           <a:p>
             <a:r>
-              <a:rPr lang="de-DE" smtClean="0"/>
+              <a:rPr lang="de-DE" dirty="0" smtClean="0"/>
               <a:t>Physik in der Kampfkunst Aikido                                http://www.uni-jena.de/aikido</a:t>
             </a:r>
             <a:endParaRPr lang="de-DE" dirty="0"/>
@@ -3448,7 +3375,7 @@
           <a:lstStyle/>
           <a:p>
             <a:r>
-              <a:rPr lang="de-DE" sz="8000" i="1" dirty="0" err="1">
+              <a:rPr lang="de-DE" sz="8000" i="1" dirty="0">
                 <a:effectLst>
                   <a:outerShdw blurRad="38100" dist="38100" dir="2700000" algn="tl">
                     <a:srgbClr val="000000">
@@ -3460,7 +3387,7 @@
               <a:t>K</a:t>
             </a:r>
             <a:r>
-              <a:rPr lang="de-DE" sz="8000" i="1" dirty="0" err="1" smtClean="0">
+              <a:rPr lang="de-DE" sz="8000" i="1" dirty="0" smtClean="0">
                 <a:effectLst>
                   <a:outerShdw blurRad="38100" dist="38100" dir="2700000" algn="tl">
                     <a:srgbClr val="000000">
@@ -3549,7 +3476,7 @@
           <a:p>
             <a:r>
               <a:rPr lang="de-DE" smtClean="0"/>
-              <a:t>A. Kessler, R. Altwasser, J. Schmidt </a:t>
+              <a:t>A. Kessler,  J. Schmidt,  K. Schergaut </a:t>
             </a:r>
             <a:endParaRPr lang="de-DE" dirty="0"/>
           </a:p>
@@ -3571,7 +3498,7 @@
           <a:lstStyle/>
           <a:p>
             <a:r>
-              <a:rPr lang="de-DE" smtClean="0"/>
+              <a:rPr lang="de-DE" dirty="0" smtClean="0"/>
               <a:t>Physik in der Kampfkunst Aikido                                http://www.uni-jena.de/aikido</a:t>
             </a:r>
             <a:endParaRPr lang="de-DE" dirty="0"/>
@@ -3953,7 +3880,7 @@
               <a:buChar char="•"/>
             </a:pPr>
             <a:r>
-              <a:rPr lang="de-DE" sz="4000" dirty="0" err="1" smtClean="0"/>
+              <a:rPr lang="de-DE" sz="4000" dirty="0" smtClean="0"/>
               <a:t>Ueshiba</a:t>
             </a:r>
             <a:r>
@@ -3961,7 +3888,7 @@
               <a:t>, </a:t>
             </a:r>
             <a:r>
-              <a:rPr lang="de-DE" sz="4000" dirty="0" err="1" smtClean="0"/>
+              <a:rPr lang="de-DE" sz="4000" dirty="0" smtClean="0"/>
               <a:t>Morihei</a:t>
             </a:r>
             <a:r>
@@ -3969,7 +3896,7 @@
               <a:t> (O-</a:t>
             </a:r>
             <a:r>
-              <a:rPr lang="de-DE" sz="4000" dirty="0" err="1" smtClean="0"/>
+              <a:rPr lang="de-DE" sz="4000" dirty="0" smtClean="0"/>
               <a:t>Sensei</a:t>
             </a:r>
             <a:r>
@@ -3984,7 +3911,7 @@
               <a:t>*14. 12.1883 </a:t>
             </a:r>
             <a:r>
-              <a:rPr lang="de-DE" sz="2400" dirty="0" err="1" smtClean="0"/>
+              <a:rPr lang="de-DE" sz="2400" dirty="0" smtClean="0"/>
               <a:t>Tanabe</a:t>
             </a:r>
             <a:r>
@@ -3992,7 +3919,7 @@
               <a:t>; † 26. 04. 1969 </a:t>
             </a:r>
             <a:r>
-              <a:rPr lang="de-DE" sz="2400" dirty="0" err="1" smtClean="0"/>
+              <a:rPr lang="de-DE" sz="2400" dirty="0" smtClean="0"/>
               <a:t>Iwama</a:t>
             </a:r>
             <a:r>
@@ -4099,7 +4026,7 @@
           <a:p>
             <a:r>
               <a:rPr lang="de-DE" smtClean="0"/>
-              <a:t>A. Kessler, R. Altwasser, J. Schmidt </a:t>
+              <a:t>A. Kessler,  J. Schmidt,  K. Schergaut </a:t>
             </a:r>
             <a:endParaRPr lang="de-DE" dirty="0"/>
           </a:p>
@@ -4121,7 +4048,7 @@
           <a:lstStyle/>
           <a:p>
             <a:r>
-              <a:rPr lang="de-DE" smtClean="0"/>
+              <a:rPr lang="de-DE" dirty="0" smtClean="0"/>
               <a:t>Physik in der Kampfkunst Aikido                                http://www.uni-jena.de/aikido</a:t>
             </a:r>
             <a:endParaRPr lang="de-DE" dirty="0"/>
@@ -4508,7 +4435,7 @@
           <a:p>
             <a:pPr algn="ctr"/>
             <a:r>
-              <a:rPr lang="de-DE" sz="3200" b="1" dirty="0" err="1" smtClean="0">
+              <a:rPr lang="de-DE" sz="3200" b="1" dirty="0" smtClean="0">
                 <a:solidFill>
                   <a:schemeClr val="tx1"/>
                 </a:solidFill>
@@ -4612,7 +4539,7 @@
           <a:p>
             <a:pPr algn="ctr"/>
             <a:r>
-              <a:rPr lang="de-DE" sz="3200" b="1" dirty="0" err="1" smtClean="0">
+              <a:rPr lang="de-DE" sz="3200" b="1" dirty="0" smtClean="0">
                 <a:effectLst>
                   <a:outerShdw blurRad="38100" dist="38100" dir="2700000" algn="tl">
                     <a:srgbClr val="000000">
@@ -4714,7 +4641,7 @@
               <a:t>Tai </a:t>
             </a:r>
             <a:r>
-              <a:rPr lang="de-DE" sz="3200" b="1" dirty="0" err="1" smtClean="0">
+              <a:rPr lang="de-DE" sz="3200" b="1" dirty="0" smtClean="0">
                 <a:effectLst>
                   <a:outerShdw blurRad="38100" dist="38100" dir="2700000" algn="tl">
                     <a:srgbClr val="000000">
@@ -4779,7 +4706,7 @@
           <a:lstStyle/>
           <a:p>
             <a:pPr algn="ctr"/>
-            <a:endParaRPr lang="de-DE"/>
+            <a:endParaRPr lang="de-DE" dirty="0"/>
           </a:p>
         </p:txBody>
       </p:sp>
@@ -4806,7 +4733,7 @@
           <a:lstStyle/>
           <a:p>
             <a:r>
-              <a:rPr lang="de-DE" sz="2400" b="1" dirty="0" err="1" smtClean="0">
+              <a:rPr lang="de-DE" sz="2400" b="1" dirty="0" smtClean="0">
                 <a:effectLst>
                   <a:outerShdw blurRad="38100" dist="38100" dir="2700000" algn="tl">
                     <a:srgbClr val="000000">
@@ -4830,7 +4757,7 @@
               <a:t> </a:t>
             </a:r>
             <a:r>
-              <a:rPr lang="de-DE" sz="2400" b="1" dirty="0" err="1" smtClean="0">
+              <a:rPr lang="de-DE" sz="2400" b="1" dirty="0" smtClean="0">
                 <a:effectLst>
                   <a:outerShdw blurRad="38100" dist="38100" dir="2700000" algn="tl">
                     <a:srgbClr val="000000">
@@ -4888,7 +4815,7 @@
               <a:t>Jo </a:t>
             </a:r>
             <a:r>
-              <a:rPr lang="de-DE" sz="2400" b="1" dirty="0" err="1" smtClean="0">
+              <a:rPr lang="de-DE" sz="2400" b="1" dirty="0" smtClean="0">
                 <a:effectLst>
                   <a:outerShdw blurRad="38100" dist="38100" dir="2700000" algn="tl">
                     <a:srgbClr val="000000">
@@ -5034,7 +4961,7 @@
           <a:p>
             <a:r>
               <a:rPr lang="de-DE" smtClean="0"/>
-              <a:t>A. Kessler, R. Altwasser, J. Schmidt </a:t>
+              <a:t>A. Kessler,  J. Schmidt,  K. Schergaut </a:t>
             </a:r>
             <a:endParaRPr lang="de-DE" dirty="0"/>
           </a:p>
@@ -5056,7 +4983,7 @@
           <a:lstStyle/>
           <a:p>
             <a:r>
-              <a:rPr lang="de-DE" smtClean="0"/>
+              <a:rPr lang="de-DE" dirty="0" smtClean="0"/>
               <a:t>Physik in der Kampfkunst Aikido                                http://www.uni-jena.de/aikido</a:t>
             </a:r>
             <a:endParaRPr lang="de-DE" dirty="0"/>
@@ -5212,7 +5139,7 @@
               <a:t>Ken </a:t>
             </a:r>
             <a:r>
-              <a:rPr lang="de-DE" sz="2400" b="1" dirty="0" err="1" smtClean="0">
+              <a:rPr lang="de-DE" sz="2400" b="1" dirty="0" smtClean="0">
                 <a:effectLst>
                   <a:outerShdw blurRad="38100" dist="38100" dir="2700000" algn="tl">
                     <a:srgbClr val="000000">
@@ -5236,7 +5163,7 @@
               <a:t> </a:t>
             </a:r>
             <a:r>
-              <a:rPr lang="de-DE" sz="2400" b="1" dirty="0" err="1" smtClean="0">
+              <a:rPr lang="de-DE" sz="2400" b="1" dirty="0" smtClean="0">
                 <a:effectLst>
                   <a:outerShdw blurRad="38100" dist="38100" dir="2700000" algn="tl">
                     <a:srgbClr val="000000">
@@ -5751,8 +5678,9 @@
             </a:pPr>
             <a:r>
               <a:rPr lang="de-DE" dirty="0" smtClean="0"/>
-              <a:t>Impulserhaltung</a:t>
-            </a:r>
+              <a:t>Impulsübertragung</a:t>
+            </a:r>
+            <a:endParaRPr lang="de-DE" dirty="0" smtClean="0"/>
           </a:p>
           <a:p>
             <a:pPr marL="914400" lvl="1" indent="-514350">
@@ -5781,8 +5709,9 @@
             </a:pPr>
             <a:r>
               <a:rPr lang="de-DE" dirty="0" smtClean="0"/>
-              <a:t>Gravitation</a:t>
-            </a:r>
+              <a:t>Schwerkraft</a:t>
+            </a:r>
+            <a:endParaRPr lang="de-DE" dirty="0" smtClean="0"/>
           </a:p>
         </p:txBody>
       </p:sp>
@@ -5828,7 +5757,7 @@
           <a:p>
             <a:r>
               <a:rPr lang="de-DE" smtClean="0"/>
-              <a:t>A. Kessler, R. Altwasser, J. Schmidt </a:t>
+              <a:t>A. Kessler,  J. Schmidt,  K. Schergaut </a:t>
             </a:r>
             <a:endParaRPr lang="de-DE" dirty="0"/>
           </a:p>
@@ -5850,7 +5779,7 @@
           <a:lstStyle/>
           <a:p>
             <a:r>
-              <a:rPr lang="de-DE" smtClean="0"/>
+              <a:rPr lang="de-DE" dirty="0" smtClean="0"/>
               <a:t>Physik in der Kampfkunst Aikido                                http://www.uni-jena.de/aikido</a:t>
             </a:r>
             <a:endParaRPr lang="de-DE" dirty="0"/>
@@ -6507,7 +6436,7 @@
           <a:p>
             <a:r>
               <a:rPr lang="de-DE" smtClean="0"/>
-              <a:t>A. Kessler, R. Altwasser, J. Schmidt </a:t>
+              <a:t>A. Kessler,  J. Schmidt,  K. Schergaut </a:t>
             </a:r>
             <a:endParaRPr lang="de-DE" dirty="0"/>
           </a:p>
@@ -6529,7 +6458,7 @@
           <a:lstStyle/>
           <a:p>
             <a:r>
-              <a:rPr lang="de-DE" smtClean="0"/>
+              <a:rPr lang="de-DE" dirty="0" smtClean="0"/>
               <a:t>Physik in der Kampfkunst Aikido                                http://www.uni-jena.de/aikido</a:t>
             </a:r>
             <a:endParaRPr lang="de-DE" dirty="0"/>
@@ -7050,7 +6979,7 @@
               <a:t>Typische </a:t>
             </a:r>
             <a:r>
-              <a:rPr lang="de-DE" sz="3600" dirty="0" err="1" smtClean="0"/>
+              <a:rPr lang="de-DE" sz="3600" dirty="0" smtClean="0"/>
               <a:t>Aikidostellung</a:t>
             </a:r>
             <a:r>
@@ -7058,7 +6987,7 @@
               <a:t>: </a:t>
             </a:r>
             <a:r>
-              <a:rPr lang="de-DE" sz="3600" dirty="0" err="1" smtClean="0"/>
+              <a:rPr lang="de-DE" sz="3600" dirty="0" smtClean="0"/>
               <a:t>Hanmi</a:t>
             </a:r>
             <a:endParaRPr lang="de-DE" sz="3600" dirty="0"/>
@@ -7092,19 +7021,15 @@
               <a:t>Typisch für Karate: </a:t>
             </a:r>
             <a:r>
-              <a:rPr lang="de-DE" sz="3600" dirty="0" err="1" smtClean="0"/>
-              <a:t>Z</a:t>
-            </a:r>
-            <a:r>
-              <a:rPr lang="de-DE" sz="3600" dirty="0" err="1" smtClean="0"/>
-              <a:t>enkutsu</a:t>
+              <a:rPr lang="de-DE" sz="3600" dirty="0" smtClean="0"/>
+              <a:t>Zenkutsu</a:t>
             </a:r>
             <a:r>
               <a:rPr lang="de-DE" sz="3600" dirty="0" smtClean="0"/>
               <a:t> </a:t>
             </a:r>
             <a:r>
-              <a:rPr lang="de-DE" sz="3600" dirty="0" err="1"/>
+              <a:rPr lang="de-DE" sz="3600" dirty="0"/>
               <a:t>dachi</a:t>
             </a:r>
             <a:endParaRPr lang="de-DE" sz="3600" dirty="0"/>
@@ -7575,6 +7500,35 @@
       </p:grpSpPr>
       <p:pic>
         <p:nvPicPr>
+          <p:cNvPr id="12" name="Inhaltsplatzhalter 1"/>
+          <p:cNvPicPr>
+            <a:picLocks noChangeAspect="1"/>
+          </p:cNvPicPr>
+          <p:nvPr/>
+        </p:nvPicPr>
+        <p:blipFill rotWithShape="1">
+          <a:blip r:embed="rId3" cstate="print">
+            <a:extLst>
+              <a:ext uri="{28A0092B-C50C-407E-A947-70E740481C1C}">
+                <a14:useLocalDpi xmlns:a14="http://schemas.microsoft.com/office/drawing/2010/main" val="0"/>
+              </a:ext>
+            </a:extLst>
+          </a:blip>
+          <a:srcRect l="26030" t="15855" r="31005" b="2307"/>
+          <a:stretch/>
+        </p:blipFill>
+        <p:spPr>
+          <a:xfrm>
+            <a:off x="5292079" y="770130"/>
+            <a:ext cx="3776623" cy="5395173"/>
+          </a:xfrm>
+          <a:prstGeom prst="rect">
+            <a:avLst/>
+          </a:prstGeom>
+        </p:spPr>
+      </p:pic>
+      <p:pic>
+        <p:nvPicPr>
           <p:cNvPr id="9" name="Inhaltsplatzhalter 8"/>
           <p:cNvPicPr>
             <a:picLocks noGrp="1" noChangeAspect="1"/>
@@ -7584,7 +7538,7 @@
           </p:nvPr>
         </p:nvPicPr>
         <p:blipFill>
-          <a:blip r:embed="rId3" cstate="print">
+          <a:blip r:embed="rId4" cstate="print">
             <a:extLst>
               <a:ext uri="{28A0092B-C50C-407E-A947-70E740481C1C}">
                 <a14:useLocalDpi xmlns:a14="http://schemas.microsoft.com/office/drawing/2010/main" val="0"/>
@@ -7597,7 +7551,7 @@
         </p:blipFill>
         <p:spPr>
           <a:xfrm>
-            <a:off x="251520" y="4293096"/>
+            <a:off x="179512" y="692696"/>
             <a:ext cx="4659174" cy="2088232"/>
           </a:xfrm>
         </p:spPr>
@@ -7644,7 +7598,7 @@
           <a:p>
             <a:r>
               <a:rPr lang="de-DE" smtClean="0"/>
-              <a:t>A. Kessler, R. Altwasser, J. Schmidt </a:t>
+              <a:t>A. Kessler,  J. Schmidt,  K. Schergaut </a:t>
             </a:r>
             <a:endParaRPr lang="de-DE" dirty="0"/>
           </a:p>
@@ -7666,73 +7620,38 @@
           <a:lstStyle/>
           <a:p>
             <a:r>
-              <a:rPr lang="de-DE" smtClean="0"/>
+              <a:rPr lang="de-DE" dirty="0" smtClean="0"/>
               <a:t>Physik in der Kampfkunst Aikido                                http://www.uni-jena.de/aikido</a:t>
             </a:r>
             <a:endParaRPr lang="de-DE" dirty="0"/>
-          </a:p>
-        </p:txBody>
-      </p:sp>
-      <p:sp>
-        <p:nvSpPr>
-          <p:cNvPr id="7" name="Inhaltsplatzhalter 6"/>
-          <p:cNvSpPr>
-            <a:spLocks noGrp="1"/>
-          </p:cNvSpPr>
-          <p:nvPr>
-            <p:ph idx="10"/>
-          </p:nvPr>
-        </p:nvSpPr>
-        <p:spPr>
-          <a:xfrm>
-            <a:off x="5940152" y="908720"/>
-            <a:ext cx="3096344" cy="2664296"/>
-          </a:xfrm>
-        </p:spPr>
-        <p:txBody>
-          <a:bodyPr>
-            <a:normAutofit/>
-          </a:bodyPr>
-          <a:lstStyle/>
-          <a:p>
-            <a:r>
-              <a:rPr lang="de-DE" dirty="0" err="1" smtClean="0"/>
-              <a:t>Ikkyo</a:t>
-            </a:r>
-            <a:r>
-              <a:rPr lang="de-DE" dirty="0" smtClean="0"/>
-              <a:t>(FOTO)</a:t>
-            </a:r>
-            <a:endParaRPr lang="de-DE" dirty="0" smtClean="0"/>
           </a:p>
         </p:txBody>
       </p:sp>
       <p:pic>
         <p:nvPicPr>
-          <p:cNvPr id="10" name="Inhaltsplatzhalter 9"/>
+          <p:cNvPr id="2" name="Inhaltsplatzhalter 1"/>
           <p:cNvPicPr>
             <a:picLocks noGrp="1" noChangeAspect="1"/>
           </p:cNvPicPr>
           <p:nvPr>
-            <p:ph idx="11"/>
+            <p:ph idx="10"/>
           </p:nvPr>
         </p:nvPicPr>
-        <p:blipFill>
-          <a:blip r:embed="rId4" cstate="print">
+        <p:blipFill rotWithShape="1">
+          <a:blip r:embed="rId5" cstate="print">
             <a:extLst>
               <a:ext uri="{28A0092B-C50C-407E-A947-70E740481C1C}">
                 <a14:useLocalDpi xmlns:a14="http://schemas.microsoft.com/office/drawing/2010/main" val="0"/>
               </a:ext>
             </a:extLst>
           </a:blip>
-          <a:stretch>
-            <a:fillRect/>
-          </a:stretch>
+          <a:srcRect l="21010" t="1567" r="22982" b="7388"/>
+          <a:stretch/>
         </p:blipFill>
         <p:spPr>
           <a:xfrm>
-            <a:off x="179512" y="648072"/>
-            <a:ext cx="4913474" cy="1844824"/>
+            <a:off x="5292080" y="764704"/>
+            <a:ext cx="3720956" cy="4536504"/>
           </a:xfrm>
         </p:spPr>
       </p:pic>
@@ -7748,8 +7667,8 @@
             </p:nvSpPr>
             <p:spPr>
               <a:xfrm>
-                <a:off x="35496" y="2537520"/>
-                <a:ext cx="5688632" cy="1755576"/>
+                <a:off x="35496" y="2897560"/>
+                <a:ext cx="5112568" cy="3123728"/>
               </a:xfrm>
               <a:prstGeom prst="rect">
                 <a:avLst/>
@@ -7757,7 +7676,7 @@
             </p:spPr>
             <p:txBody>
               <a:bodyPr vert="horz" lIns="91440" tIns="45720" rIns="91440" bIns="45720" rtlCol="0">
-                <a:normAutofit lnSpcReduction="10000"/>
+                <a:normAutofit/>
               </a:bodyPr>
               <a:lstStyle>
                 <a:lvl1pPr marL="342900" indent="-342900" algn="l" defTabSz="914400" rtl="0" eaLnBrk="1" latinLnBrk="0" hangingPunct="1">
@@ -7897,96 +7816,6 @@
                 </a:lvl9pPr>
               </a:lstStyle>
               <a:p>
-                <a:r>
-                  <a:rPr lang="de-DE" dirty="0" smtClean="0"/>
-                  <a:t>Drehmoment: </a:t>
-                </a:r>
-                <a14:m>
-                  <m:oMath xmlns:m="http://schemas.openxmlformats.org/officeDocument/2006/math">
-                    <m:acc>
-                      <m:accPr>
-                        <m:chr m:val="⃗"/>
-                        <m:ctrlPr>
-                          <a:rPr lang="de-DE" i="1" smtClean="0">
-                            <a:latin typeface="Cambria Math"/>
-                          </a:rPr>
-                        </m:ctrlPr>
-                      </m:accPr>
-                      <m:e>
-                        <m:r>
-                          <a:rPr lang="de-DE" i="1" smtClean="0">
-                            <a:latin typeface="Cambria Math"/>
-                          </a:rPr>
-                          <m:t>𝑀</m:t>
-                        </m:r>
-                      </m:e>
-                    </m:acc>
-                    <m:r>
-                      <a:rPr lang="de-DE" i="1" smtClean="0">
-                        <a:latin typeface="Cambria Math"/>
-                      </a:rPr>
-                      <m:t>=</m:t>
-                    </m:r>
-                    <m:acc>
-                      <m:accPr>
-                        <m:chr m:val="⃗"/>
-                        <m:ctrlPr>
-                          <a:rPr lang="de-DE" i="1" smtClean="0">
-                            <a:latin typeface="Cambria Math"/>
-                          </a:rPr>
-                        </m:ctrlPr>
-                      </m:accPr>
-                      <m:e>
-                        <m:r>
-                          <a:rPr lang="de-DE" i="1" smtClean="0">
-                            <a:latin typeface="Cambria Math"/>
-                          </a:rPr>
-                          <m:t>𝑟</m:t>
-                        </m:r>
-                      </m:e>
-                    </m:acc>
-                    <m:r>
-                      <a:rPr lang="de-DE" i="1" smtClean="0">
-                        <a:latin typeface="Cambria Math"/>
-                        <a:ea typeface="Cambria Math"/>
-                      </a:rPr>
-                      <m:t>×</m:t>
-                    </m:r>
-                    <m:acc>
-                      <m:accPr>
-                        <m:chr m:val="⃗"/>
-                        <m:ctrlPr>
-                          <a:rPr lang="de-DE" i="1" smtClean="0">
-                            <a:latin typeface="Cambria Math"/>
-                            <a:ea typeface="Cambria Math"/>
-                          </a:rPr>
-                        </m:ctrlPr>
-                      </m:accPr>
-                      <m:e>
-                        <m:r>
-                          <a:rPr lang="de-DE" i="1" smtClean="0">
-                            <a:latin typeface="Cambria Math"/>
-                            <a:ea typeface="Cambria Math"/>
-                          </a:rPr>
-                          <m:t>𝐹</m:t>
-                        </m:r>
-                      </m:e>
-                    </m:acc>
-                  </m:oMath>
-                </a14:m>
-                <a:endParaRPr lang="de-DE" dirty="0" smtClean="0"/>
-              </a:p>
-              <a:p>
-                <a:r>
-                  <a:rPr lang="de-DE" dirty="0" smtClean="0"/>
-                  <a:t>Wenn Kräfte senkrecht wirken:</a:t>
-                </a:r>
-              </a:p>
-              <a:p>
-                <a:pPr marL="400050" lvl="1" indent="0">
-                  <a:buFont typeface="Arial" pitchFamily="34" charset="0"/>
-                  <a:buNone/>
-                </a:pPr>
                 <a14:m>
                   <m:oMath xmlns:m="http://schemas.openxmlformats.org/officeDocument/2006/math">
                     <m:sSub>
@@ -7999,18 +7828,18 @@
                       </m:sSubPr>
                       <m:e>
                         <m:r>
-                          <a:rPr lang="de-DE" sz="3200" i="1" smtClean="0">
+                          <a:rPr lang="de-DE" sz="3200" b="0" i="1" smtClean="0">
                             <a:latin typeface="Cambria Math"/>
                           </a:rPr>
-                          <m:t>𝑟</m:t>
+                          <m:t>h</m:t>
                         </m:r>
                       </m:e>
                       <m:sub>
                         <m:r>
-                          <a:rPr lang="de-DE" sz="3200" i="1" smtClean="0">
+                          <a:rPr lang="de-DE" sz="3200" b="0" i="1" smtClean="0">
                             <a:latin typeface="Cambria Math"/>
                           </a:rPr>
-                          <m:t>1</m:t>
+                          <m:t>𝑙</m:t>
                         </m:r>
                       </m:sub>
                     </m:sSub>
@@ -8039,10 +7868,10 @@
                       </m:e>
                       <m:sub>
                         <m:r>
-                          <a:rPr lang="de-DE" sz="3200" i="1" dirty="0" smtClean="0">
+                          <a:rPr lang="de-DE" sz="3200" b="0" i="1" dirty="0" smtClean="0">
                             <a:latin typeface="Cambria Math"/>
                           </a:rPr>
-                          <m:t>1</m:t>
+                          <m:t>𝑙</m:t>
                         </m:r>
                       </m:sub>
                     </m:sSub>
@@ -8068,18 +7897,18 @@
                       </m:sSubPr>
                       <m:e>
                         <m:r>
-                          <a:rPr lang="de-DE" sz="3200" i="1">
+                          <a:rPr lang="de-DE" sz="3200" b="0" i="1" smtClean="0">
                             <a:latin typeface="Cambria Math"/>
                           </a:rPr>
-                          <m:t>𝑟</m:t>
+                          <m:t>h</m:t>
                         </m:r>
                       </m:e>
                       <m:sub>
                         <m:r>
-                          <a:rPr lang="de-DE" sz="3200" i="1" smtClean="0">
+                          <a:rPr lang="de-DE" sz="3200" b="0" i="1" smtClean="0">
                             <a:latin typeface="Cambria Math"/>
                           </a:rPr>
-                          <m:t>2</m:t>
+                          <m:t>𝑟</m:t>
                         </m:r>
                       </m:sub>
                     </m:sSub>
@@ -8108,10 +7937,73 @@
                       </m:e>
                       <m:sub>
                         <m:r>
-                          <a:rPr lang="de-DE" sz="3200" i="1" dirty="0" smtClean="0">
+                          <a:rPr lang="de-DE" sz="3200" b="0" i="1" dirty="0" smtClean="0">
                             <a:latin typeface="Cambria Math"/>
                           </a:rPr>
-                          <m:t>2</m:t>
+                          <m:t>𝑟</m:t>
+                        </m:r>
+                      </m:sub>
+                    </m:sSub>
+                  </m:oMath>
+                </a14:m>
+                <a:endParaRPr lang="de-DE" sz="3200" dirty="0" smtClean="0"/>
+              </a:p>
+              <a:p>
+                <a14:m>
+                  <m:oMath xmlns:m="http://schemas.openxmlformats.org/officeDocument/2006/math">
+                    <m:sSub>
+                      <m:sSubPr>
+                        <m:ctrlPr>
+                          <a:rPr lang="de-DE" sz="3200" i="1" smtClean="0">
+                            <a:latin typeface="Cambria Math"/>
+                          </a:rPr>
+                        </m:ctrlPr>
+                      </m:sSubPr>
+                      <m:e>
+                        <m:r>
+                          <a:rPr lang="de-DE" sz="3200" b="0" i="1" smtClean="0">
+                            <a:latin typeface="Cambria Math"/>
+                          </a:rPr>
+                          <m:t>h</m:t>
+                        </m:r>
+                      </m:e>
+                      <m:sub>
+                        <m:r>
+                          <a:rPr lang="de-DE" sz="3200" b="0" i="1" smtClean="0">
+                            <a:latin typeface="Cambria Math"/>
+                          </a:rPr>
+                          <m:t>𝑙</m:t>
+                        </m:r>
+                      </m:sub>
+                    </m:sSub>
+                    <m:r>
+                      <a:rPr lang="de-DE" sz="3200" b="0" i="1" smtClean="0">
+                        <a:latin typeface="Cambria Math"/>
+                      </a:rPr>
+                      <m:t>,</m:t>
+                    </m:r>
+                    <m:sSub>
+                      <m:sSubPr>
+                        <m:ctrlPr>
+                          <a:rPr lang="de-DE" sz="3200" b="0" i="1" smtClean="0">
+                            <a:latin typeface="Cambria Math"/>
+                          </a:rPr>
+                        </m:ctrlPr>
+                      </m:sSubPr>
+                      <m:e>
+                        <m:r>
+                          <a:rPr lang="de-DE" sz="3200" b="0" i="1" smtClean="0">
+                            <a:latin typeface="Cambria Math"/>
+                          </a:rPr>
+                          <m:t>h</m:t>
+                        </m:r>
+                      </m:e>
+                      <m:sub>
+                        <m:r>
+                          <a:rPr lang="de-DE" sz="3200" b="0" i="1" smtClean="0">
+                            <a:latin typeface="Cambria Math"/>
+                          </a:rPr>
+                          <m:t>𝑟</m:t>
                         </m:r>
                       </m:sub>
                     </m:sSub>
@@ -8119,8 +8011,85 @@
                 </a14:m>
                 <a:r>
                   <a:rPr lang="de-DE" sz="3200" dirty="0" smtClean="0"/>
+                  <a:t>: Hebelarm links und rechts</a:t>
+                </a:r>
+              </a:p>
+              <a:p>
+                <a:r>
+                  <a:rPr lang="de-DE" sz="3200" dirty="0" smtClean="0"/>
                   <a:t> </a:t>
                 </a:r>
+                <a14:m>
+                  <m:oMath xmlns:m="http://schemas.openxmlformats.org/officeDocument/2006/math">
+                    <m:sSub>
+                      <m:sSubPr>
+                        <m:ctrlPr>
+                          <a:rPr lang="de-DE" i="1" dirty="0">
+                            <a:latin typeface="Cambria Math"/>
+                          </a:rPr>
+                        </m:ctrlPr>
+                      </m:sSubPr>
+                      <m:e>
+                        <m:r>
+                          <a:rPr lang="de-DE" i="1" dirty="0">
+                            <a:latin typeface="Cambria Math"/>
+                          </a:rPr>
+                          <m:t>𝐹</m:t>
+                        </m:r>
+                      </m:e>
+                      <m:sub>
+                        <m:r>
+                          <a:rPr lang="de-DE" i="1" dirty="0">
+                            <a:latin typeface="Cambria Math"/>
+                          </a:rPr>
+                          <m:t>𝑙</m:t>
+                        </m:r>
+                      </m:sub>
+                    </m:sSub>
+                    <m:r>
+                      <a:rPr lang="de-DE" b="0" i="1" dirty="0" smtClean="0">
+                        <a:latin typeface="Cambria Math"/>
+                      </a:rPr>
+                      <m:t>,</m:t>
+                    </m:r>
+                    <m:sSub>
+                      <m:sSubPr>
+                        <m:ctrlPr>
+                          <a:rPr lang="de-DE" i="1" dirty="0" smtClean="0">
+                            <a:latin typeface="Cambria Math"/>
+                          </a:rPr>
+                        </m:ctrlPr>
+                      </m:sSubPr>
+                      <m:e>
+                        <m:r>
+                          <a:rPr lang="de-DE" i="1" dirty="0">
+                            <a:latin typeface="Cambria Math"/>
+                          </a:rPr>
+                          <m:t>𝐹</m:t>
+                        </m:r>
+                      </m:e>
+                      <m:sub>
+                        <m:r>
+                          <a:rPr lang="de-DE" i="1" dirty="0">
+                            <a:latin typeface="Cambria Math"/>
+                          </a:rPr>
+                          <m:t>𝑟</m:t>
+                        </m:r>
+                      </m:sub>
+                    </m:sSub>
+                    <m:r>
+                      <a:rPr lang="de-DE" b="0" i="1" dirty="0" smtClean="0">
+                        <a:latin typeface="Cambria Math"/>
+                      </a:rPr>
+                      <m:t>:</m:t>
+                    </m:r>
+                  </m:oMath>
+                </a14:m>
+                <a:r>
+                  <a:rPr lang="de-DE" sz="3200" dirty="0" smtClean="0"/>
+                  <a:t> Kraft links und rechts</a:t>
+                </a:r>
+                <a:endParaRPr lang="de-DE" sz="3200" dirty="0" smtClean="0"/>
               </a:p>
             </p:txBody>
           </p:sp>
@@ -8136,16 +8105,16 @@
             </p:nvSpPr>
             <p:spPr>
               <a:xfrm>
-                <a:off x="35496" y="2537520"/>
-                <a:ext cx="5688632" cy="1755576"/>
+                <a:off x="35496" y="2897560"/>
+                <a:ext cx="5112568" cy="3123728"/>
               </a:xfrm>
               <a:prstGeom prst="rect">
                 <a:avLst/>
               </a:prstGeom>
               <a:blipFill rotWithShape="1">
-                <a:blip r:embed="rId5"/>
+                <a:blip r:embed="rId6"/>
                 <a:stretch>
-                  <a:fillRect l="-2465" t="-3819" r="-1179"/>
+                  <a:fillRect l="-2745"/>
                 </a:stretch>
               </a:blipFill>
             </p:spPr>
@@ -8174,7 +8143,7 @@
         </p:nvSpPr>
         <p:spPr>
           <a:xfrm>
-            <a:off x="6040760" y="3861048"/>
+            <a:off x="6040760" y="3874491"/>
             <a:ext cx="3096344" cy="2664296"/>
           </a:xfrm>
           <a:prstGeom prst="rect">
@@ -8323,22 +8292,478 @@
             </a:lvl9pPr>
           </a:lstStyle>
           <a:p>
-            <a:r>
-              <a:rPr lang="de-DE" dirty="0" smtClean="0"/>
-              <a:t>Jo </a:t>
-            </a:r>
-            <a:r>
-              <a:rPr lang="de-DE" dirty="0" err="1" smtClean="0"/>
-              <a:t>Dori</a:t>
-            </a:r>
-            <a:r>
-              <a:rPr lang="de-DE" dirty="0" smtClean="0"/>
-              <a:t> (FOTO)</a:t>
-            </a:r>
             <a:endParaRPr lang="de-DE" dirty="0"/>
           </a:p>
         </p:txBody>
       </p:sp>
+      <p:grpSp>
+        <p:nvGrpSpPr>
+          <p:cNvPr id="1034" name="Gruppieren 1033"/>
+          <p:cNvGrpSpPr/>
+          <p:nvPr/>
+        </p:nvGrpSpPr>
+        <p:grpSpPr>
+          <a:xfrm>
+            <a:off x="323528" y="1772816"/>
+            <a:ext cx="4113131" cy="1104426"/>
+            <a:chOff x="314853" y="1832255"/>
+            <a:chExt cx="4113131" cy="1104426"/>
+          </a:xfrm>
+        </p:grpSpPr>
+        <p:grpSp>
+          <p:nvGrpSpPr>
+            <p:cNvPr id="1033" name="Gruppieren 1032"/>
+            <p:cNvGrpSpPr/>
+            <p:nvPr/>
+          </p:nvGrpSpPr>
+          <p:grpSpPr>
+            <a:xfrm>
+              <a:off x="691431" y="1832255"/>
+              <a:ext cx="3736553" cy="790347"/>
+              <a:chOff x="691431" y="1832255"/>
+              <a:chExt cx="3736553" cy="790347"/>
+            </a:xfrm>
+          </p:grpSpPr>
+          <p:cxnSp>
+            <p:nvCxnSpPr>
+              <p:cNvPr id="15" name="Gerade Verbindung 14"/>
+              <p:cNvCxnSpPr/>
+              <p:nvPr/>
+            </p:nvCxnSpPr>
+            <p:spPr>
+              <a:xfrm>
+                <a:off x="827584" y="2334570"/>
+                <a:ext cx="3600400" cy="288032"/>
+              </a:xfrm>
+              <a:prstGeom prst="line">
+                <a:avLst/>
+              </a:prstGeom>
+              <a:ln w="101600">
+                <a:solidFill>
+                  <a:srgbClr val="C00000"/>
+                </a:solidFill>
+              </a:ln>
+            </p:spPr>
+            <p:style>
+              <a:lnRef idx="1">
+                <a:schemeClr val="accent1"/>
+              </a:lnRef>
+              <a:fillRef idx="0">
+                <a:schemeClr val="accent1"/>
+              </a:fillRef>
+              <a:effectRef idx="0">
+                <a:schemeClr val="accent1"/>
+              </a:effectRef>
+              <a:fontRef idx="minor">
+                <a:schemeClr val="tx1"/>
+              </a:fontRef>
+            </p:style>
+          </p:cxnSp>
+          <mc:AlternateContent xmlns:mc="http://schemas.openxmlformats.org/markup-compatibility/2006">
+            <mc:Choice xmlns:a14="http://schemas.microsoft.com/office/drawing/2010/main" Requires="a14">
+              <p:sp>
+                <p:nvSpPr>
+                  <p:cNvPr id="16" name="Rechteck 15"/>
+                  <p:cNvSpPr/>
+                  <p:nvPr/>
+                </p:nvSpPr>
+                <p:spPr>
+                  <a:xfrm>
+                    <a:off x="2392558" y="1832255"/>
+                    <a:ext cx="780919" cy="646331"/>
+                  </a:xfrm>
+                  <a:prstGeom prst="rect">
+                    <a:avLst/>
+                  </a:prstGeom>
+                </p:spPr>
+                <p:txBody>
+                  <a:bodyPr wrap="none">
+                    <a:spAutoFit/>
+                  </a:bodyPr>
+                  <a:lstStyle/>
+                  <a:p>
+                    <a14:m>
+                      <m:oMathPara xmlns:m="http://schemas.openxmlformats.org/officeDocument/2006/math">
+                        <m:oMathParaPr>
+                          <m:jc m:val="centerGroup"/>
+                        </m:oMathParaPr>
+                        <m:oMath xmlns:m="http://schemas.openxmlformats.org/officeDocument/2006/math">
+                          <m:sSub>
+                            <m:sSubPr>
+                              <m:ctrlPr>
+                                <a:rPr lang="de-DE" sz="3600" b="1" i="1" smtClean="0">
+                                  <a:solidFill>
+                                    <a:srgbClr val="C00000"/>
+                                  </a:solidFill>
+                                  <a:latin typeface="Cambria Math"/>
+                                </a:rPr>
+                              </m:ctrlPr>
+                            </m:sSubPr>
+                            <m:e>
+                              <m:r>
+                                <a:rPr lang="de-DE" sz="3600" b="1" i="1">
+                                  <a:solidFill>
+                                    <a:srgbClr val="C00000"/>
+                                  </a:solidFill>
+                                  <a:latin typeface="Cambria Math"/>
+                                </a:rPr>
+                                <m:t>𝒉</m:t>
+                              </m:r>
+                            </m:e>
+                            <m:sub>
+                              <m:r>
+                                <a:rPr lang="de-DE" sz="3600" b="1" i="1">
+                                  <a:solidFill>
+                                    <a:srgbClr val="C00000"/>
+                                  </a:solidFill>
+                                  <a:latin typeface="Cambria Math"/>
+                                </a:rPr>
+                                <m:t>𝒓</m:t>
+                              </m:r>
+                            </m:sub>
+                          </m:sSub>
+                        </m:oMath>
+                      </m:oMathPara>
+                    </a14:m>
+                    <a:endParaRPr lang="de-DE" sz="3600" b="1" dirty="0">
+                      <a:solidFill>
+                        <a:srgbClr val="C00000"/>
+                      </a:solidFill>
+                    </a:endParaRPr>
+                  </a:p>
+                </p:txBody>
+              </p:sp>
+            </mc:Choice>
+            <mc:Fallback>
+              <p:sp>
+                <p:nvSpPr>
+                  <p:cNvPr id="16" name="Rechteck 15"/>
+                  <p:cNvSpPr>
+                    <a:spLocks noRot="1" noChangeAspect="1" noMove="1" noResize="1" noEditPoints="1" noAdjustHandles="1" noChangeArrowheads="1" noChangeShapeType="1" noTextEdit="1"/>
+                  </p:cNvSpPr>
+                  <p:nvPr/>
+                </p:nvSpPr>
+                <p:spPr>
+                  <a:xfrm>
+                    <a:off x="2392558" y="1832255"/>
+                    <a:ext cx="780919" cy="646331"/>
+                  </a:xfrm>
+                  <a:prstGeom prst="rect">
+                    <a:avLst/>
+                  </a:prstGeom>
+                  <a:blipFill rotWithShape="1">
+                    <a:blip r:embed="rId7"/>
+                    <a:stretch>
+                      <a:fillRect/>
+                    </a:stretch>
+                  </a:blipFill>
+                </p:spPr>
+                <p:txBody>
+                  <a:bodyPr/>
+                  <a:lstStyle/>
+                  <a:p>
+                    <a:r>
+                      <a:rPr lang="de-DE">
+                        <a:noFill/>
+                      </a:rPr>
+                      <a:t> </a:t>
+                    </a:r>
+                  </a:p>
+                </p:txBody>
+              </p:sp>
+            </mc:Fallback>
+          </mc:AlternateContent>
+          <p:cxnSp>
+            <p:nvCxnSpPr>
+              <p:cNvPr id="18" name="Gerade Verbindung 17"/>
+              <p:cNvCxnSpPr/>
+              <p:nvPr/>
+            </p:nvCxnSpPr>
+            <p:spPr>
+              <a:xfrm>
+                <a:off x="691431" y="2320260"/>
+                <a:ext cx="144016" cy="14310"/>
+              </a:xfrm>
+              <a:prstGeom prst="line">
+                <a:avLst/>
+              </a:prstGeom>
+              <a:ln w="101600">
+                <a:solidFill>
+                  <a:schemeClr val="tx2"/>
+                </a:solidFill>
+              </a:ln>
+            </p:spPr>
+            <p:style>
+              <a:lnRef idx="1">
+                <a:schemeClr val="accent1"/>
+              </a:lnRef>
+              <a:fillRef idx="0">
+                <a:schemeClr val="accent1"/>
+              </a:fillRef>
+              <a:effectRef idx="0">
+                <a:schemeClr val="accent1"/>
+              </a:effectRef>
+              <a:fontRef idx="minor">
+                <a:schemeClr val="tx1"/>
+              </a:fontRef>
+            </p:style>
+          </p:cxnSp>
+        </p:grpSp>
+        <mc:AlternateContent xmlns:mc="http://schemas.openxmlformats.org/markup-compatibility/2006">
+          <mc:Choice xmlns:a14="http://schemas.microsoft.com/office/drawing/2010/main" Requires="a14">
+            <p:sp>
+              <p:nvSpPr>
+                <p:cNvPr id="29" name="Rechteck 28"/>
+                <p:cNvSpPr/>
+                <p:nvPr/>
+              </p:nvSpPr>
+              <p:spPr>
+                <a:xfrm>
+                  <a:off x="314853" y="2290350"/>
+                  <a:ext cx="780919" cy="646331"/>
+                </a:xfrm>
+                <a:prstGeom prst="rect">
+                  <a:avLst/>
+                </a:prstGeom>
+              </p:spPr>
+              <p:txBody>
+                <a:bodyPr wrap="none">
+                  <a:spAutoFit/>
+                </a:bodyPr>
+                <a:lstStyle/>
+                <a:p>
+                  <a14:m>
+                    <m:oMathPara xmlns:m="http://schemas.openxmlformats.org/officeDocument/2006/math">
+                      <m:oMathParaPr>
+                        <m:jc m:val="centerGroup"/>
+                      </m:oMathParaPr>
+                      <m:oMath xmlns:m="http://schemas.openxmlformats.org/officeDocument/2006/math">
+                        <m:sSub>
+                          <m:sSubPr>
+                            <m:ctrlPr>
+                              <a:rPr lang="de-DE" sz="3600" b="1" i="1" smtClean="0">
+                                <a:solidFill>
+                                  <a:schemeClr val="tx2"/>
+                                </a:solidFill>
+                                <a:latin typeface="Cambria Math"/>
+                              </a:rPr>
+                            </m:ctrlPr>
+                          </m:sSubPr>
+                          <m:e>
+                            <m:r>
+                              <a:rPr lang="de-DE" sz="3600" b="1" i="1">
+                                <a:solidFill>
+                                  <a:schemeClr val="tx2"/>
+                                </a:solidFill>
+                                <a:latin typeface="Cambria Math"/>
+                              </a:rPr>
+                              <m:t>𝒉</m:t>
+                            </m:r>
+                          </m:e>
+                          <m:sub>
+                            <m:r>
+                              <a:rPr lang="de-DE" sz="3600" b="1" i="1">
+                                <a:solidFill>
+                                  <a:schemeClr val="tx2"/>
+                                </a:solidFill>
+                                <a:latin typeface="Cambria Math"/>
+                              </a:rPr>
+                              <m:t>𝒓</m:t>
+                            </m:r>
+                          </m:sub>
+                        </m:sSub>
+                      </m:oMath>
+                    </m:oMathPara>
+                  </a14:m>
+                  <a:endParaRPr lang="de-DE" sz="3600" b="1" dirty="0">
+                    <a:solidFill>
+                      <a:schemeClr val="tx2"/>
+                    </a:solidFill>
+                  </a:endParaRPr>
+                </a:p>
+              </p:txBody>
+            </p:sp>
+          </mc:Choice>
+          <mc:Fallback>
+            <p:sp>
+              <p:nvSpPr>
+                <p:cNvPr id="29" name="Rechteck 28"/>
+                <p:cNvSpPr>
+                  <a:spLocks noRot="1" noChangeAspect="1" noMove="1" noResize="1" noEditPoints="1" noAdjustHandles="1" noChangeArrowheads="1" noChangeShapeType="1" noTextEdit="1"/>
+                </p:cNvSpPr>
+                <p:nvPr/>
+              </p:nvSpPr>
+              <p:spPr>
+                <a:xfrm>
+                  <a:off x="314853" y="2290350"/>
+                  <a:ext cx="780919" cy="646331"/>
+                </a:xfrm>
+                <a:prstGeom prst="rect">
+                  <a:avLst/>
+                </a:prstGeom>
+                <a:blipFill rotWithShape="1">
+                  <a:blip r:embed="rId8"/>
+                  <a:stretch>
+                    <a:fillRect/>
+                  </a:stretch>
+                </a:blipFill>
+              </p:spPr>
+              <p:txBody>
+                <a:bodyPr/>
+                <a:lstStyle/>
+                <a:p>
+                  <a:r>
+                    <a:rPr lang="de-DE">
+                      <a:noFill/>
+                    </a:rPr>
+                    <a:t> </a:t>
+                  </a:r>
+                </a:p>
+              </p:txBody>
+            </p:sp>
+          </mc:Fallback>
+        </mc:AlternateContent>
+      </p:grpSp>
+      <p:cxnSp>
+        <p:nvCxnSpPr>
+          <p:cNvPr id="30" name="Gerade Verbindung 29"/>
+          <p:cNvCxnSpPr/>
+          <p:nvPr/>
+        </p:nvCxnSpPr>
+        <p:spPr>
+          <a:xfrm>
+            <a:off x="6771038" y="1064444"/>
+            <a:ext cx="936104" cy="1281834"/>
+          </a:xfrm>
+          <a:prstGeom prst="line">
+            <a:avLst/>
+          </a:prstGeom>
+          <a:ln w="101600">
+            <a:solidFill>
+              <a:schemeClr val="tx2"/>
+            </a:solidFill>
+          </a:ln>
+        </p:spPr>
+        <p:style>
+          <a:lnRef idx="1">
+            <a:schemeClr val="accent1"/>
+          </a:lnRef>
+          <a:fillRef idx="0">
+            <a:schemeClr val="accent1"/>
+          </a:fillRef>
+          <a:effectRef idx="0">
+            <a:schemeClr val="accent1"/>
+          </a:effectRef>
+          <a:fontRef idx="minor">
+            <a:schemeClr val="tx1"/>
+          </a:fontRef>
+        </p:style>
+      </p:cxnSp>
+      <p:cxnSp>
+        <p:nvCxnSpPr>
+          <p:cNvPr id="38" name="Gerade Verbindung 37"/>
+          <p:cNvCxnSpPr/>
+          <p:nvPr/>
+        </p:nvCxnSpPr>
+        <p:spPr>
+          <a:xfrm>
+            <a:off x="7180390" y="1916832"/>
+            <a:ext cx="1163979" cy="1606741"/>
+          </a:xfrm>
+          <a:prstGeom prst="line">
+            <a:avLst/>
+          </a:prstGeom>
+          <a:ln w="101600">
+            <a:solidFill>
+              <a:srgbClr val="C00000"/>
+            </a:solidFill>
+          </a:ln>
+        </p:spPr>
+        <p:style>
+          <a:lnRef idx="1">
+            <a:schemeClr val="accent1"/>
+          </a:lnRef>
+          <a:fillRef idx="0">
+            <a:schemeClr val="accent1"/>
+          </a:fillRef>
+          <a:effectRef idx="0">
+            <a:schemeClr val="accent1"/>
+          </a:effectRef>
+          <a:fontRef idx="minor">
+            <a:schemeClr val="tx1"/>
+          </a:fontRef>
+        </p:style>
+      </p:cxnSp>
+      <p:cxnSp>
+        <p:nvCxnSpPr>
+          <p:cNvPr id="46" name="Gerade Verbindung 45"/>
+          <p:cNvCxnSpPr/>
+          <p:nvPr/>
+        </p:nvCxnSpPr>
+        <p:spPr>
+          <a:xfrm>
+            <a:off x="7120880" y="3212976"/>
+            <a:ext cx="468052" cy="144016"/>
+          </a:xfrm>
+          <a:prstGeom prst="line">
+            <a:avLst/>
+          </a:prstGeom>
+          <a:ln w="101600">
+            <a:solidFill>
+              <a:schemeClr val="tx2"/>
+            </a:solidFill>
+          </a:ln>
+        </p:spPr>
+        <p:style>
+          <a:lnRef idx="1">
+            <a:schemeClr val="accent1"/>
+          </a:lnRef>
+          <a:fillRef idx="0">
+            <a:schemeClr val="accent1"/>
+          </a:fillRef>
+          <a:effectRef idx="0">
+            <a:schemeClr val="accent1"/>
+          </a:effectRef>
+          <a:fontRef idx="minor">
+            <a:schemeClr val="tx1"/>
+          </a:fontRef>
+        </p:style>
+      </p:cxnSp>
+      <p:cxnSp>
+        <p:nvCxnSpPr>
+          <p:cNvPr id="48" name="Gerade Verbindung 47"/>
+          <p:cNvCxnSpPr/>
+          <p:nvPr/>
+        </p:nvCxnSpPr>
+        <p:spPr>
+          <a:xfrm>
+            <a:off x="6300192" y="2924336"/>
+            <a:ext cx="820688" cy="288640"/>
+          </a:xfrm>
+          <a:prstGeom prst="line">
+            <a:avLst/>
+          </a:prstGeom>
+          <a:ln w="101600">
+            <a:solidFill>
+              <a:srgbClr val="C00000"/>
+            </a:solidFill>
+          </a:ln>
+        </p:spPr>
+        <p:style>
+          <a:lnRef idx="1">
+            <a:schemeClr val="accent1"/>
+          </a:lnRef>
+          <a:fillRef idx="0">
+            <a:schemeClr val="accent1"/>
+          </a:fillRef>
+          <a:effectRef idx="0">
+            <a:schemeClr val="accent1"/>
+          </a:effectRef>
+          <a:fontRef idx="minor">
+            <a:schemeClr val="tx1"/>
+          </a:fontRef>
+        </p:style>
+      </p:cxnSp>
     </p:spTree>
     <p:extLst>
       <p:ext uri="{BB962C8B-B14F-4D97-AF65-F5344CB8AC3E}">
@@ -8383,7 +8808,361 @@
                                           </p:stCondLst>
                                         </p:cTn>
                                         <p:tgtEl>
-                                          <p:spTgt spid="9"/>
+                                          <p:spTgt spid="1034"/>
+                                        </p:tgtEl>
+                                        <p:attrNameLst>
+                                          <p:attrName>style.visibility</p:attrName>
+                                        </p:attrNameLst>
+                                      </p:cBhvr>
+                                      <p:to>
+                                        <p:strVal val="visible"/>
+                                      </p:to>
+                                    </p:set>
+                                  </p:childTnLst>
+                                </p:cTn>
+                              </p:par>
+                            </p:childTnLst>
+                          </p:cTn>
+                        </p:par>
+                      </p:childTnLst>
+                    </p:cTn>
+                  </p:par>
+                  <p:par>
+                    <p:cTn id="7" fill="hold">
+                      <p:stCondLst>
+                        <p:cond delay="indefinite"/>
+                      </p:stCondLst>
+                      <p:childTnLst>
+                        <p:par>
+                          <p:cTn id="8" fill="hold">
+                            <p:stCondLst>
+                              <p:cond delay="0"/>
+                            </p:stCondLst>
+                            <p:childTnLst>
+                              <p:par>
+                                <p:cTn id="9" presetID="1" presetClass="entr" presetSubtype="0" fill="hold" nodeType="clickEffect">
+                                  <p:stCondLst>
+                                    <p:cond delay="0"/>
+                                  </p:stCondLst>
+                                  <p:childTnLst>
+                                    <p:set>
+                                      <p:cBhvr>
+                                        <p:cTn id="10" dur="1" fill="hold">
+                                          <p:stCondLst>
+                                            <p:cond delay="0"/>
+                                          </p:stCondLst>
+                                        </p:cTn>
+                                        <p:tgtEl>
+                                          <p:spTgt spid="30"/>
+                                        </p:tgtEl>
+                                        <p:attrNameLst>
+                                          <p:attrName>style.visibility</p:attrName>
+                                        </p:attrNameLst>
+                                      </p:cBhvr>
+                                      <p:to>
+                                        <p:strVal val="visible"/>
+                                      </p:to>
+                                    </p:set>
+                                  </p:childTnLst>
+                                </p:cTn>
+                              </p:par>
+                            </p:childTnLst>
+                          </p:cTn>
+                        </p:par>
+                      </p:childTnLst>
+                    </p:cTn>
+                  </p:par>
+                  <p:par>
+                    <p:cTn id="11" fill="hold">
+                      <p:stCondLst>
+                        <p:cond delay="indefinite"/>
+                      </p:stCondLst>
+                      <p:childTnLst>
+                        <p:par>
+                          <p:cTn id="12" fill="hold">
+                            <p:stCondLst>
+                              <p:cond delay="0"/>
+                            </p:stCondLst>
+                            <p:childTnLst>
+                              <p:par>
+                                <p:cTn id="13" presetID="1" presetClass="entr" presetSubtype="0" fill="hold" nodeType="clickEffect">
+                                  <p:stCondLst>
+                                    <p:cond delay="0"/>
+                                  </p:stCondLst>
+                                  <p:childTnLst>
+                                    <p:set>
+                                      <p:cBhvr>
+                                        <p:cTn id="14" dur="1" fill="hold">
+                                          <p:stCondLst>
+                                            <p:cond delay="0"/>
+                                          </p:stCondLst>
+                                        </p:cTn>
+                                        <p:tgtEl>
+                                          <p:spTgt spid="38"/>
+                                        </p:tgtEl>
+                                        <p:attrNameLst>
+                                          <p:attrName>style.visibility</p:attrName>
+                                        </p:attrNameLst>
+                                      </p:cBhvr>
+                                      <p:to>
+                                        <p:strVal val="visible"/>
+                                      </p:to>
+                                    </p:set>
+                                  </p:childTnLst>
+                                </p:cTn>
+                              </p:par>
+                            </p:childTnLst>
+                          </p:cTn>
+                        </p:par>
+                      </p:childTnLst>
+                    </p:cTn>
+                  </p:par>
+                  <p:par>
+                    <p:cTn id="15" fill="hold">
+                      <p:stCondLst>
+                        <p:cond delay="indefinite"/>
+                      </p:stCondLst>
+                      <p:childTnLst>
+                        <p:par>
+                          <p:cTn id="16" fill="hold">
+                            <p:stCondLst>
+                              <p:cond delay="0"/>
+                            </p:stCondLst>
+                            <p:childTnLst>
+                              <p:par>
+                                <p:cTn id="17" presetID="42" presetClass="path" presetSubtype="0" accel="50000" decel="50000" fill="hold" nodeType="clickEffect">
+                                  <p:stCondLst>
+                                    <p:cond delay="0"/>
+                                  </p:stCondLst>
+                                  <p:childTnLst>
+                                    <p:animMotion origin="layout" path="M 3.33333E-6 -1.11111E-6 L 0.08628 0.15695 " pathEditMode="relative" rAng="0" ptsTypes="AA">
+                                      <p:cBhvr>
+                                        <p:cTn id="18" dur="1250" fill="hold"/>
+                                        <p:tgtEl>
+                                          <p:spTgt spid="30"/>
+                                        </p:tgtEl>
+                                        <p:attrNameLst>
+                                          <p:attrName>ppt_x</p:attrName>
+                                          <p:attrName>ppt_y</p:attrName>
+                                        </p:attrNameLst>
+                                      </p:cBhvr>
+                                      <p:rCtr x="4306" y="7847"/>
+                                    </p:animMotion>
+                                  </p:childTnLst>
+                                </p:cTn>
+                              </p:par>
+                            </p:childTnLst>
+                          </p:cTn>
+                        </p:par>
+                      </p:childTnLst>
+                    </p:cTn>
+                  </p:par>
+                  <p:par>
+                    <p:cTn id="19" fill="hold">
+                      <p:stCondLst>
+                        <p:cond delay="indefinite"/>
+                      </p:stCondLst>
+                      <p:childTnLst>
+                        <p:par>
+                          <p:cTn id="20" fill="hold">
+                            <p:stCondLst>
+                              <p:cond delay="0"/>
+                            </p:stCondLst>
+                            <p:childTnLst>
+                              <p:par>
+                                <p:cTn id="21" presetID="1" presetClass="exit" presetSubtype="0" fill="hold" nodeType="clickEffect">
+                                  <p:stCondLst>
+                                    <p:cond delay="0"/>
+                                  </p:stCondLst>
+                                  <p:childTnLst>
+                                    <p:set>
+                                      <p:cBhvr>
+                                        <p:cTn id="22" dur="1" fill="hold">
+                                          <p:stCondLst>
+                                            <p:cond delay="0"/>
+                                          </p:stCondLst>
+                                        </p:cTn>
+                                        <p:tgtEl>
+                                          <p:spTgt spid="38"/>
+                                        </p:tgtEl>
+                                        <p:attrNameLst>
+                                          <p:attrName>style.visibility</p:attrName>
+                                        </p:attrNameLst>
+                                      </p:cBhvr>
+                                      <p:to>
+                                        <p:strVal val="hidden"/>
+                                      </p:to>
+                                    </p:set>
+                                  </p:childTnLst>
+                                </p:cTn>
+                              </p:par>
+                              <p:par>
+                                <p:cTn id="23" presetID="1" presetClass="exit" presetSubtype="0" fill="hold" nodeType="withEffect">
+                                  <p:stCondLst>
+                                    <p:cond delay="0"/>
+                                  </p:stCondLst>
+                                  <p:childTnLst>
+                                    <p:set>
+                                      <p:cBhvr>
+                                        <p:cTn id="24" dur="1" fill="hold">
+                                          <p:stCondLst>
+                                            <p:cond delay="0"/>
+                                          </p:stCondLst>
+                                        </p:cTn>
+                                        <p:tgtEl>
+                                          <p:spTgt spid="30"/>
+                                        </p:tgtEl>
+                                        <p:attrNameLst>
+                                          <p:attrName>style.visibility</p:attrName>
+                                        </p:attrNameLst>
+                                      </p:cBhvr>
+                                      <p:to>
+                                        <p:strVal val="hidden"/>
+                                      </p:to>
+                                    </p:set>
+                                  </p:childTnLst>
+                                </p:cTn>
+                              </p:par>
+                              <p:par>
+                                <p:cTn id="25" presetID="1" presetClass="exit" presetSubtype="0" fill="hold" nodeType="withEffect">
+                                  <p:stCondLst>
+                                    <p:cond delay="0"/>
+                                  </p:stCondLst>
+                                  <p:childTnLst>
+                                    <p:set>
+                                      <p:cBhvr>
+                                        <p:cTn id="26" dur="1" fill="hold">
+                                          <p:stCondLst>
+                                            <p:cond delay="0"/>
+                                          </p:stCondLst>
+                                        </p:cTn>
+                                        <p:tgtEl>
+                                          <p:spTgt spid="12"/>
+                                        </p:tgtEl>
+                                        <p:attrNameLst>
+                                          <p:attrName>style.visibility</p:attrName>
+                                        </p:attrNameLst>
+                                      </p:cBhvr>
+                                      <p:to>
+                                        <p:strVal val="hidden"/>
+                                      </p:to>
+                                    </p:set>
+                                  </p:childTnLst>
+                                </p:cTn>
+                              </p:par>
+                              <p:par>
+                                <p:cTn id="27" presetID="10" presetClass="entr" presetSubtype="0" fill="hold" nodeType="withEffect">
+                                  <p:stCondLst>
+                                    <p:cond delay="0"/>
+                                  </p:stCondLst>
+                                  <p:childTnLst>
+                                    <p:set>
+                                      <p:cBhvr>
+                                        <p:cTn id="28" dur="1" fill="hold">
+                                          <p:stCondLst>
+                                            <p:cond delay="0"/>
+                                          </p:stCondLst>
+                                        </p:cTn>
+                                        <p:tgtEl>
+                                          <p:spTgt spid="2"/>
+                                        </p:tgtEl>
+                                        <p:attrNameLst>
+                                          <p:attrName>style.visibility</p:attrName>
+                                        </p:attrNameLst>
+                                      </p:cBhvr>
+                                      <p:to>
+                                        <p:strVal val="visible"/>
+                                      </p:to>
+                                    </p:set>
+                                    <p:animEffect transition="in" filter="fade">
+                                      <p:cBhvr>
+                                        <p:cTn id="29" dur="500"/>
+                                        <p:tgtEl>
+                                          <p:spTgt spid="2"/>
+                                        </p:tgtEl>
+                                      </p:cBhvr>
+                                    </p:animEffect>
+                                  </p:childTnLst>
+                                </p:cTn>
+                              </p:par>
+                            </p:childTnLst>
+                          </p:cTn>
+                        </p:par>
+                      </p:childTnLst>
+                    </p:cTn>
+                  </p:par>
+                  <p:par>
+                    <p:cTn id="30" fill="hold">
+                      <p:stCondLst>
+                        <p:cond delay="indefinite"/>
+                      </p:stCondLst>
+                      <p:childTnLst>
+                        <p:par>
+                          <p:cTn id="31" fill="hold">
+                            <p:stCondLst>
+                              <p:cond delay="0"/>
+                            </p:stCondLst>
+                            <p:childTnLst>
+                              <p:par>
+                                <p:cTn id="32" presetID="1" presetClass="entr" presetSubtype="0" fill="hold" nodeType="clickEffect">
+                                  <p:stCondLst>
+                                    <p:cond delay="0"/>
+                                  </p:stCondLst>
+                                  <p:childTnLst>
+                                    <p:set>
+                                      <p:cBhvr>
+                                        <p:cTn id="33" dur="1" fill="hold">
+                                          <p:stCondLst>
+                                            <p:cond delay="0"/>
+                                          </p:stCondLst>
+                                        </p:cTn>
+                                        <p:tgtEl>
+                                          <p:spTgt spid="46"/>
+                                        </p:tgtEl>
+                                        <p:attrNameLst>
+                                          <p:attrName>style.visibility</p:attrName>
+                                        </p:attrNameLst>
+                                      </p:cBhvr>
+                                      <p:to>
+                                        <p:strVal val="visible"/>
+                                      </p:to>
+                                    </p:set>
+                                  </p:childTnLst>
+                                </p:cTn>
+                              </p:par>
+                            </p:childTnLst>
+                          </p:cTn>
+                        </p:par>
+                      </p:childTnLst>
+                    </p:cTn>
+                  </p:par>
+                  <p:par>
+                    <p:cTn id="34" fill="hold">
+                      <p:stCondLst>
+                        <p:cond delay="indefinite"/>
+                      </p:stCondLst>
+                      <p:childTnLst>
+                        <p:par>
+                          <p:cTn id="35" fill="hold">
+                            <p:stCondLst>
+                              <p:cond delay="0"/>
+                            </p:stCondLst>
+                            <p:childTnLst>
+                              <p:par>
+                                <p:cTn id="36" presetID="1" presetClass="entr" presetSubtype="0" fill="hold" nodeType="clickEffect">
+                                  <p:stCondLst>
+                                    <p:cond delay="0"/>
+                                  </p:stCondLst>
+                                  <p:childTnLst>
+                                    <p:set>
+                                      <p:cBhvr>
+                                        <p:cTn id="37" dur="1" fill="hold">
+                                          <p:stCondLst>
+                                            <p:cond delay="0"/>
+                                          </p:stCondLst>
+                                        </p:cTn>
+                                        <p:tgtEl>
+                                          <p:spTgt spid="48"/>
                                         </p:tgtEl>
                                         <p:attrNameLst>
                                           <p:attrName>style.visibility</p:attrName>
@@ -8513,7 +9292,7 @@
           <a:p>
             <a:r>
               <a:rPr lang="de-DE" smtClean="0"/>
-              <a:t>A. Kessler, R. Altwasser, J. Schmidt </a:t>
+              <a:t>A. Kessler,  J. Schmidt,  K. Schergaut </a:t>
             </a:r>
             <a:endParaRPr lang="de-DE" dirty="0"/>
           </a:p>
@@ -8602,7 +9381,7 @@
               <a:buAutoNum type="arabicPeriod"/>
             </a:pPr>
             <a:r>
-              <a:rPr lang="de-DE" dirty="0" err="1" smtClean="0"/>
+              <a:rPr lang="de-DE" dirty="0" smtClean="0"/>
               <a:t>Kokyu</a:t>
             </a:r>
             <a:r>
@@ -8682,18 +9461,10 @@
               <a:buNone/>
             </a:pPr>
             <a:r>
-              <a:rPr lang="de-DE" sz="2400" dirty="0" smtClean="0">
-                <a:solidFill>
-                  <a:schemeClr val="accent6"/>
-                </a:solidFill>
-              </a:rPr>
+              <a:rPr lang="de-DE" sz="2400" b="1" dirty="0" smtClean="0"/>
               <a:t>Menschlicher Körper: ein System mit vielen Freiheitgraden!</a:t>
             </a:r>
-            <a:endParaRPr lang="de-DE" sz="2400" dirty="0">
-              <a:solidFill>
-                <a:schemeClr val="accent6"/>
-              </a:solidFill>
-            </a:endParaRPr>
+            <a:endParaRPr lang="de-DE" sz="2400" b="1" dirty="0"/>
           </a:p>
         </p:txBody>
       </p:sp>
@@ -9134,7 +9905,7 @@
                   <a:buNone/>
                 </a:pPr>
                 <a:r>
-                  <a:rPr lang="de-DE" i="1" u="sng" dirty="0" err="1" smtClean="0">
+                  <a:rPr lang="de-DE" i="1" u="sng" dirty="0" smtClean="0">
                     <a:latin typeface="+mj-lt"/>
                   </a:rPr>
                   <a:t>Newtonsche</a:t>
@@ -9143,13 +9914,7 @@
                   <a:rPr lang="de-DE" i="1" u="sng" dirty="0" smtClean="0">
                     <a:latin typeface="+mj-lt"/>
                   </a:rPr>
-                  <a:t> </a:t>
-                </a:r>
-                <a:r>
-                  <a:rPr lang="de-DE" i="1" u="sng" dirty="0" smtClean="0">
-                    <a:latin typeface="+mj-lt"/>
-                  </a:rPr>
-                  <a:t>Gesetze: </a:t>
+                  <a:t> Gesetze: </a:t>
                 </a:r>
               </a:p>
               <a:p>
@@ -9162,7 +9927,11 @@
                 </a:pPr>
                 <a:r>
                   <a:rPr lang="de-DE" dirty="0" smtClean="0"/>
-                  <a:t>Ohne einwirkende Kräfte, ruht ein Körper, oder bewegt sich geradlinig und gleichmäßig</a:t>
+                  <a:t>Ohne einwirkende Kräfte, </a:t>
+                </a:r>
+                <a:r>
+                  <a:rPr lang="de-DE" dirty="0" smtClean="0"/>
+                  <a:t>gibt es keine Geschwindigkeitsänderung</a:t>
                 </a:r>
                 <a:endParaRPr lang="de-DE" b="0" i="1" dirty="0" smtClean="0">
                   <a:latin typeface="Cambria Math"/>
@@ -9176,30 +9945,14 @@
                   <a:buFont typeface="+mj-lt"/>
                   <a:buAutoNum type="arabicPeriod"/>
                 </a:pPr>
-                <a:r>
-                  <a:rPr lang="de-DE" b="0" dirty="0" smtClean="0"/>
-                  <a:t> </a:t>
-                </a:r>
                 <a14:m>
                   <m:oMath xmlns:m="http://schemas.openxmlformats.org/officeDocument/2006/math">
-                    <m:acc>
-                      <m:accPr>
-                        <m:chr m:val="⃗"/>
-                        <m:ctrlPr>
-                          <a:rPr lang="de-DE" b="0" i="1" smtClean="0">
-                            <a:latin typeface="Cambria Math"/>
-                          </a:rPr>
-                        </m:ctrlPr>
-                      </m:accPr>
-                      <m:e>
-                        <m:r>
-                          <a:rPr lang="de-DE" b="0" i="1" smtClean="0">
-                            <a:latin typeface="Cambria Math"/>
-                          </a:rPr>
-                          <m:t>𝐹</m:t>
-                        </m:r>
-                      </m:e>
-                    </m:acc>
+                    <m:r>
+                      <a:rPr lang="de-DE" b="0" i="1" smtClean="0">
+                        <a:latin typeface="Cambria Math"/>
+                      </a:rPr>
+                      <m:t>𝐹</m:t>
+                    </m:r>
                     <m:r>
                       <a:rPr lang="de-DE" b="0" i="1" smtClean="0">
                         <a:latin typeface="Cambria Math"/>
@@ -9215,84 +9968,76 @@
                     <m:r>
                       <a:rPr lang="de-DE" b="0" i="1" smtClean="0">
                         <a:latin typeface="Cambria Math"/>
+                        <a:ea typeface="Cambria Math"/>
                       </a:rPr>
-                      <m:t> </m:t>
+                      <m:t>∙</m:t>
                     </m:r>
-                    <m:acc>
-                      <m:accPr>
-                        <m:chr m:val="⃗"/>
-                        <m:ctrlPr>
-                          <a:rPr lang="de-DE" b="0" i="1" smtClean="0">
-                            <a:latin typeface="Cambria Math"/>
-                          </a:rPr>
-                        </m:ctrlPr>
-                      </m:accPr>
-                      <m:e>
-                        <m:r>
-                          <a:rPr lang="de-DE" b="0" i="1" smtClean="0">
-                            <a:latin typeface="Cambria Math"/>
-                          </a:rPr>
-                          <m:t>𝑎</m:t>
-                        </m:r>
-                      </m:e>
-                    </m:acc>
+                    <m:r>
+                      <a:rPr lang="de-DE" b="0" i="1" smtClean="0">
+                        <a:latin typeface="Cambria Math"/>
+                        <a:ea typeface="Cambria Math"/>
+                      </a:rPr>
+                      <m:t>𝑎</m:t>
+                    </m:r>
                   </m:oMath>
                 </a14:m>
                 <a:r>
                   <a:rPr lang="de-DE" dirty="0" smtClean="0"/>
-                  <a:t> mit  </a:t>
+                  <a:t> </a:t>
+                </a:r>
+                <a:r>
+                  <a:rPr lang="de-DE" dirty="0" smtClean="0"/>
+                  <a:t>mit  </a:t>
                 </a:r>
                 <a14:m>
                   <m:oMath xmlns:m="http://schemas.openxmlformats.org/officeDocument/2006/math">
-                    <m:acc>
-                      <m:accPr>
-                        <m:chr m:val="⃗"/>
-                        <m:ctrlPr>
-                          <a:rPr lang="de-DE" i="1" dirty="0" smtClean="0">
-                            <a:latin typeface="Cambria Math"/>
-                          </a:rPr>
-                        </m:ctrlPr>
-                      </m:accPr>
-                      <m:e>
-                        <m:r>
-                          <a:rPr lang="de-DE" b="0" i="1" dirty="0" smtClean="0">
-                            <a:latin typeface="Cambria Math"/>
-                          </a:rPr>
-                          <m:t>𝐹</m:t>
-                        </m:r>
-                      </m:e>
-                    </m:acc>
+                    <m:r>
+                      <a:rPr lang="de-DE" b="0" i="1" smtClean="0">
+                        <a:latin typeface="Cambria Math"/>
+                      </a:rPr>
+                      <m:t>𝐹</m:t>
+                    </m:r>
                   </m:oMath>
                 </a14:m>
                 <a:r>
                   <a:rPr lang="de-DE" dirty="0" smtClean="0"/>
-                  <a:t>: Kraft, </a:t>
+                  <a:t>: </a:t>
+                </a:r>
+                <a:r>
+                  <a:rPr lang="de-DE" dirty="0" smtClean="0"/>
+                  <a:t>Kraft, </a:t>
                 </a:r>
                 <a14:m>
                   <m:oMath xmlns:m="http://schemas.openxmlformats.org/officeDocument/2006/math">
-                    <m:acc>
-                      <m:accPr>
-                        <m:chr m:val="⃗"/>
-                        <m:ctrlPr>
-                          <a:rPr lang="de-DE" i="1" dirty="0">
-                            <a:latin typeface="Cambria Math"/>
-                          </a:rPr>
-                        </m:ctrlPr>
-                      </m:accPr>
-                      <m:e>
-                        <m:r>
-                          <a:rPr lang="de-DE" b="0" i="1" dirty="0" smtClean="0">
-                            <a:latin typeface="Cambria Math"/>
-                          </a:rPr>
-                          <m:t>𝑎</m:t>
-                        </m:r>
-                      </m:e>
-                    </m:acc>
+                    <m:r>
+                      <a:rPr lang="de-DE" b="0" i="1" smtClean="0">
+                        <a:latin typeface="Cambria Math"/>
+                      </a:rPr>
+                      <m:t>𝑎</m:t>
+                    </m:r>
                   </m:oMath>
                 </a14:m>
                 <a:r>
                   <a:rPr lang="de-DE" dirty="0" smtClean="0"/>
-                  <a:t>:Beschleunigung, m: Masse</a:t>
+                  <a:t>: Beschleunigung</a:t>
+                </a:r>
+                <a:r>
+                  <a:rPr lang="de-DE" dirty="0" smtClean="0"/>
+                  <a:t>, </a:t>
+                </a:r>
+                <a14:m>
+                  <m:oMath xmlns:m="http://schemas.openxmlformats.org/officeDocument/2006/math">
+                    <m:r>
+                      <a:rPr lang="de-DE" i="1" dirty="0" smtClean="0">
+                        <a:latin typeface="Cambria Math"/>
+                      </a:rPr>
+                      <m:t>𝑚</m:t>
+                    </m:r>
+                  </m:oMath>
+                </a14:m>
+                <a:r>
+                  <a:rPr lang="de-DE" dirty="0" smtClean="0"/>
+                  <a:t>: Masse</a:t>
                 </a:r>
               </a:p>
               <a:p>
@@ -9331,7 +10076,7 @@
               <a:blipFill rotWithShape="1">
                 <a:blip r:embed="rId3"/>
                 <a:stretch>
-                  <a:fillRect l="-1926" r="-1556" b="-2366"/>
+                  <a:fillRect l="-1926" b="-249"/>
                 </a:stretch>
               </a:blipFill>
             </p:spPr>
@@ -9392,7 +10137,7 @@
           <a:p>
             <a:r>
               <a:rPr lang="de-DE" smtClean="0"/>
-              <a:t>A. Kessler, R. Altwasser, J. Schmidt </a:t>
+              <a:t>A. Kessler,  J. Schmidt,  K. Schergaut </a:t>
             </a:r>
             <a:endParaRPr lang="de-DE" dirty="0"/>
           </a:p>
@@ -9414,7 +10159,7 @@
           <a:lstStyle/>
           <a:p>
             <a:r>
-              <a:rPr lang="de-DE" smtClean="0"/>
+              <a:rPr lang="de-DE" dirty="0" smtClean="0"/>
               <a:t>Physik in der Kampfkunst Aikido                                http://www.uni-jena.de/aikido</a:t>
             </a:r>
             <a:endParaRPr lang="de-DE" dirty="0"/>

</xml_diff>

<commit_message>
Impuls hinzugefügt, Drehimpuls angefangen
</commit_message>
<xml_diff>
--- a/LNdW2013 physik in Aikido/LNdW2013 Physik in Aikido.pptx
+++ b/LNdW2013 physik in Aikido/LNdW2013 Physik in Aikido.pptx
@@ -5,7 +5,7 @@
     <p:sldMasterId id="2147483648" r:id="rId1"/>
   </p:sldMasterIdLst>
   <p:notesMasterIdLst>
-    <p:notesMasterId r:id="rId13"/>
+    <p:notesMasterId r:id="rId15"/>
   </p:notesMasterIdLst>
   <p:sldIdLst>
     <p:sldId id="256" r:id="rId2"/>
@@ -18,7 +18,9 @@
     <p:sldId id="264" r:id="rId9"/>
     <p:sldId id="267" r:id="rId10"/>
     <p:sldId id="268" r:id="rId11"/>
-    <p:sldId id="262" r:id="rId12"/>
+    <p:sldId id="269" r:id="rId12"/>
+    <p:sldId id="270" r:id="rId13"/>
+    <p:sldId id="262" r:id="rId14"/>
   </p:sldIdLst>
   <p:sldSz cx="9144000" cy="6858000" type="screen4x3"/>
   <p:notesSz cx="6858000" cy="9144000"/>
@@ -875,15 +877,7 @@
           <a:p>
             <a:r>
               <a:rPr lang="de-DE" baseline="0" dirty="0" smtClean="0"/>
-              <a:t>Zu 1. </a:t>
-            </a:r>
-            <a:r>
-              <a:rPr lang="de-DE" baseline="0" dirty="0" smtClean="0"/>
-              <a:t>Rokkyu, </a:t>
-            </a:r>
-            <a:r>
-              <a:rPr lang="de-DE" baseline="0" dirty="0" smtClean="0"/>
-              <a:t>Kote Gaeshi. Nicht die Schmerzeinwirkung ist entscheidend, sondern die Struktur</a:t>
+              <a:t>Zu 1. Rokkyu, Kote Gaeshi. Nicht die Schmerzeinwirkung ist entscheidend, sondern die Struktur</a:t>
             </a:r>
           </a:p>
           <a:p>
@@ -1060,34 +1054,14 @@
             </a:pPr>
             <a:r>
               <a:rPr lang="de-DE" baseline="0" dirty="0" smtClean="0"/>
-              <a:t>+3. Um </a:t>
-            </a:r>
-            <a:r>
-              <a:rPr lang="de-DE" baseline="0" dirty="0" smtClean="0"/>
-              <a:t>doppelte Masse zu beschleunigen, braucht man doppelte Kraft. Mit einfacher Kraft ist die Beschleunigung halb so groß.</a:t>
+              <a:t>+3. Um doppelte Masse zu beschleunigen, braucht man doppelte Kraft. Mit einfacher Kraft ist die Beschleunigung halb so groß.</a:t>
             </a:r>
             <a:br>
               <a:rPr lang="de-DE" baseline="0" dirty="0" smtClean="0"/>
             </a:br>
             <a:r>
               <a:rPr lang="de-DE" baseline="0" dirty="0" smtClean="0"/>
-              <a:t>Man muss die Masse des Angreifers beachten! </a:t>
-            </a:r>
-            <a:r>
-              <a:rPr lang="de-DE" baseline="0" dirty="0" smtClean="0"/>
-              <a:t>Die </a:t>
-            </a:r>
-            <a:r>
-              <a:rPr lang="de-DE" baseline="0" dirty="0" smtClean="0"/>
-              <a:t>gleiche Kraft wirkt auch auf Aikidoka! Versucht man einen schweren Gegner zu stark zu beschleunigen kommt man </a:t>
-            </a:r>
-            <a:r>
-              <a:rPr lang="de-DE" baseline="0" dirty="0" smtClean="0"/>
-              <a:t>evtl.. </a:t>
-            </a:r>
-            <a:r>
-              <a:rPr lang="de-DE" baseline="0" dirty="0" smtClean="0"/>
-              <a:t>an eigene Grenzen!</a:t>
+              <a:t>Man muss die Masse des Angreifers beachten! Die gleiche Kraft wirkt auch auf Aikidoka! Versucht man einen schweren Gegner zu stark zu beschleunigen kommt man evtl.. an eigene Grenzen!</a:t>
             </a:r>
             <a:endParaRPr lang="de-DE" dirty="0"/>
           </a:p>
@@ -2869,39 +2843,30 @@
           <a:p>
             <a:r>
               <a:rPr lang="de-DE" dirty="0" smtClean="0"/>
-              <a:t>Jacob </a:t>
-            </a:r>
+              <a:t>Jacob Schmidt, 1. Dan (Psychologie und Sozialwissenschaften)</a:t>
+            </a:r>
+          </a:p>
+          <a:p>
             <a:r>
               <a:rPr lang="de-DE" dirty="0" smtClean="0"/>
-              <a:t>Schmidt, 1. Dan (Psychologie und Sozialwissenschaften</a:t>
+              <a:t>Konrad </a:t>
+            </a:r>
+            <a:r>
+              <a:rPr lang="de-DE" dirty="0" err="1" smtClean="0"/>
+              <a:t>Schergaut</a:t>
+            </a:r>
+            <a:r>
+              <a:rPr lang="de-DE" dirty="0" smtClean="0"/>
+              <a:t>, 2. Kyu (Dipl. </a:t>
+            </a:r>
+            <a:r>
+              <a:rPr lang="de-DE" dirty="0" err="1" smtClean="0"/>
+              <a:t>Infomatiker</a:t>
             </a:r>
             <a:r>
               <a:rPr lang="de-DE" dirty="0" smtClean="0"/>
               <a:t>)</a:t>
             </a:r>
-          </a:p>
-          <a:p>
-            <a:r>
-              <a:rPr lang="de-DE" dirty="0" smtClean="0"/>
-              <a:t>Konrad </a:t>
-            </a:r>
-            <a:r>
-              <a:rPr lang="de-DE" dirty="0" err="1" smtClean="0"/>
-              <a:t>Schergaut</a:t>
-            </a:r>
-            <a:r>
-              <a:rPr lang="de-DE" dirty="0" smtClean="0"/>
-              <a:t>, 2. Kyu (Dipl. </a:t>
-            </a:r>
-            <a:r>
-              <a:rPr lang="de-DE" dirty="0" err="1" smtClean="0"/>
-              <a:t>Infomatiker</a:t>
-            </a:r>
-            <a:r>
-              <a:rPr lang="de-DE" dirty="0" smtClean="0"/>
-              <a:t>)</a:t>
-            </a:r>
-            <a:endParaRPr lang="de-DE" dirty="0" smtClean="0"/>
           </a:p>
           <a:p>
             <a:endParaRPr lang="de-DE" dirty="0"/>
@@ -3085,6 +3050,345 @@
 </file>
 
 <file path=ppt/slides/slide11.xml><?xml version="1.0" encoding="utf-8"?>
+<p:sld xmlns:a="http://schemas.openxmlformats.org/drawingml/2006/main" xmlns:r="http://schemas.openxmlformats.org/officeDocument/2006/relationships" xmlns:p="http://schemas.openxmlformats.org/presentationml/2006/main">
+  <p:cSld>
+    <p:spTree>
+      <p:nvGrpSpPr>
+        <p:cNvPr id="1" name=""/>
+        <p:cNvGrpSpPr/>
+        <p:nvPr/>
+      </p:nvGrpSpPr>
+      <p:grpSpPr>
+        <a:xfrm>
+          <a:off x="0" y="0"/>
+          <a:ext cx="0" cy="0"/>
+          <a:chOff x="0" y="0"/>
+          <a:chExt cx="0" cy="0"/>
+        </a:xfrm>
+      </p:grpSpPr>
+      <p:sp>
+        <p:nvSpPr>
+          <p:cNvPr id="3" name="Titel 2"/>
+          <p:cNvSpPr>
+            <a:spLocks noGrp="1"/>
+          </p:cNvSpPr>
+          <p:nvPr>
+            <p:ph type="title"/>
+          </p:nvPr>
+        </p:nvSpPr>
+        <p:spPr/>
+        <p:txBody>
+          <a:bodyPr>
+            <a:normAutofit fontScale="90000"/>
+          </a:bodyPr>
+          <a:lstStyle/>
+          <a:p>
+            <a:r>
+              <a:rPr lang="de-DE" dirty="0"/>
+              <a:t>Drehimpulserhaltung</a:t>
+            </a:r>
+          </a:p>
+        </p:txBody>
+      </p:sp>
+      <p:sp>
+        <p:nvSpPr>
+          <p:cNvPr id="4" name="Datumsplatzhalter 3"/>
+          <p:cNvSpPr>
+            <a:spLocks noGrp="1"/>
+          </p:cNvSpPr>
+          <p:nvPr>
+            <p:ph type="dt" sz="half" idx="2"/>
+          </p:nvPr>
+        </p:nvSpPr>
+        <p:spPr/>
+        <p:txBody>
+          <a:bodyPr/>
+          <a:lstStyle/>
+          <a:p>
+            <a:r>
+              <a:rPr lang="de-DE" smtClean="0"/>
+              <a:t>A. Kessler,  J. Schmidt,  K. Schergaut </a:t>
+            </a:r>
+            <a:endParaRPr lang="de-DE" dirty="0"/>
+          </a:p>
+        </p:txBody>
+      </p:sp>
+      <p:sp>
+        <p:nvSpPr>
+          <p:cNvPr id="5" name="Fußzeilenplatzhalter 4"/>
+          <p:cNvSpPr>
+            <a:spLocks noGrp="1"/>
+          </p:cNvSpPr>
+          <p:nvPr>
+            <p:ph type="ftr" sz="quarter" idx="3"/>
+          </p:nvPr>
+        </p:nvSpPr>
+        <p:spPr/>
+        <p:txBody>
+          <a:bodyPr/>
+          <a:lstStyle/>
+          <a:p>
+            <a:r>
+              <a:rPr lang="de-DE" smtClean="0"/>
+              <a:t>Physik in der Kampfkunst Aikido                                http://www.uni-jena.de/aikido</a:t>
+            </a:r>
+            <a:endParaRPr lang="de-DE" dirty="0"/>
+          </a:p>
+        </p:txBody>
+      </p:sp>
+      <p:sp>
+        <p:nvSpPr>
+          <p:cNvPr id="10" name="Ellipse 9"/>
+          <p:cNvSpPr/>
+          <p:nvPr/>
+        </p:nvSpPr>
+        <p:spPr>
+          <a:xfrm>
+            <a:off x="3815916" y="2502373"/>
+            <a:ext cx="1944216" cy="1944216"/>
+          </a:xfrm>
+          <a:prstGeom prst="ellipse">
+            <a:avLst/>
+          </a:prstGeom>
+        </p:spPr>
+        <p:style>
+          <a:lnRef idx="2">
+            <a:schemeClr val="accent6">
+              <a:shade val="50000"/>
+            </a:schemeClr>
+          </a:lnRef>
+          <a:fillRef idx="1">
+            <a:schemeClr val="accent6"/>
+          </a:fillRef>
+          <a:effectRef idx="0">
+            <a:schemeClr val="accent6"/>
+          </a:effectRef>
+          <a:fontRef idx="minor">
+            <a:schemeClr val="lt1"/>
+          </a:fontRef>
+        </p:style>
+        <p:txBody>
+          <a:bodyPr rtlCol="0" anchor="ctr"/>
+          <a:lstStyle/>
+          <a:p>
+            <a:pPr algn="ctr"/>
+            <a:endParaRPr lang="de-DE"/>
+          </a:p>
+        </p:txBody>
+      </p:sp>
+      <p:sp>
+        <p:nvSpPr>
+          <p:cNvPr id="11" name="Ellipse 10"/>
+          <p:cNvSpPr/>
+          <p:nvPr/>
+        </p:nvSpPr>
+        <p:spPr>
+          <a:xfrm>
+            <a:off x="1763688" y="558157"/>
+            <a:ext cx="6048672" cy="5832648"/>
+          </a:xfrm>
+          <a:prstGeom prst="ellipse">
+            <a:avLst/>
+          </a:prstGeom>
+          <a:noFill/>
+        </p:spPr>
+        <p:style>
+          <a:lnRef idx="2">
+            <a:schemeClr val="accent1">
+              <a:shade val="50000"/>
+            </a:schemeClr>
+          </a:lnRef>
+          <a:fillRef idx="1">
+            <a:schemeClr val="accent1"/>
+          </a:fillRef>
+          <a:effectRef idx="0">
+            <a:schemeClr val="accent1"/>
+          </a:effectRef>
+          <a:fontRef idx="minor">
+            <a:schemeClr val="lt1"/>
+          </a:fontRef>
+        </p:style>
+        <p:txBody>
+          <a:bodyPr rtlCol="0" anchor="ctr"/>
+          <a:lstStyle/>
+          <a:p>
+            <a:pPr algn="ctr"/>
+            <a:endParaRPr lang="de-DE"/>
+          </a:p>
+        </p:txBody>
+      </p:sp>
+      <p:pic>
+        <p:nvPicPr>
+          <p:cNvPr id="9" name="Inhaltsplatzhalter 8"/>
+          <p:cNvPicPr>
+            <a:picLocks noGrp="1" noChangeAspect="1"/>
+          </p:cNvPicPr>
+          <p:nvPr>
+            <p:ph idx="1"/>
+          </p:nvPr>
+        </p:nvPicPr>
+        <p:blipFill>
+          <a:blip r:embed="rId2" cstate="print">
+            <a:extLst>
+              <a:ext uri="{28A0092B-C50C-407E-A947-70E740481C1C}">
+                <a14:useLocalDpi xmlns:a14="http://schemas.microsoft.com/office/drawing/2010/main" val="0"/>
+              </a:ext>
+            </a:extLst>
+          </a:blip>
+          <a:stretch>
+            <a:fillRect/>
+          </a:stretch>
+        </p:blipFill>
+        <p:spPr>
+          <a:xfrm>
+            <a:off x="1399757" y="2996952"/>
+            <a:ext cx="727862" cy="721449"/>
+          </a:xfrm>
+        </p:spPr>
+      </p:pic>
+    </p:spTree>
+    <p:extLst>
+      <p:ext uri="{BB962C8B-B14F-4D97-AF65-F5344CB8AC3E}">
+        <p14:creationId xmlns:p14="http://schemas.microsoft.com/office/powerpoint/2010/main" val="1203074654"/>
+      </p:ext>
+    </p:extLst>
+  </p:cSld>
+  <p:clrMapOvr>
+    <a:masterClrMapping/>
+  </p:clrMapOvr>
+</p:sld>
+</file>
+
+<file path=ppt/slides/slide12.xml><?xml version="1.0" encoding="utf-8"?>
+<p:sld xmlns:a="http://schemas.openxmlformats.org/drawingml/2006/main" xmlns:r="http://schemas.openxmlformats.org/officeDocument/2006/relationships" xmlns:p="http://schemas.openxmlformats.org/presentationml/2006/main">
+  <p:cSld>
+    <p:spTree>
+      <p:nvGrpSpPr>
+        <p:cNvPr id="1" name=""/>
+        <p:cNvGrpSpPr/>
+        <p:nvPr/>
+      </p:nvGrpSpPr>
+      <p:grpSpPr>
+        <a:xfrm>
+          <a:off x="0" y="0"/>
+          <a:ext cx="0" cy="0"/>
+          <a:chOff x="0" y="0"/>
+          <a:chExt cx="0" cy="0"/>
+        </a:xfrm>
+      </p:grpSpPr>
+      <p:sp>
+        <p:nvSpPr>
+          <p:cNvPr id="3" name="Titel 2"/>
+          <p:cNvSpPr>
+            <a:spLocks noGrp="1"/>
+          </p:cNvSpPr>
+          <p:nvPr>
+            <p:ph type="title"/>
+          </p:nvPr>
+        </p:nvSpPr>
+        <p:spPr/>
+        <p:txBody>
+          <a:bodyPr>
+            <a:normAutofit fontScale="90000"/>
+          </a:bodyPr>
+          <a:lstStyle/>
+          <a:p>
+            <a:r>
+              <a:rPr lang="de-DE" dirty="0"/>
+              <a:t>Drehimpulserhaltung</a:t>
+            </a:r>
+          </a:p>
+        </p:txBody>
+      </p:sp>
+      <p:sp>
+        <p:nvSpPr>
+          <p:cNvPr id="4" name="Datumsplatzhalter 3"/>
+          <p:cNvSpPr>
+            <a:spLocks noGrp="1"/>
+          </p:cNvSpPr>
+          <p:nvPr>
+            <p:ph type="dt" sz="half" idx="2"/>
+          </p:nvPr>
+        </p:nvSpPr>
+        <p:spPr/>
+        <p:txBody>
+          <a:bodyPr/>
+          <a:lstStyle/>
+          <a:p>
+            <a:r>
+              <a:rPr lang="de-DE" smtClean="0"/>
+              <a:t>A. Kessler,  J. Schmidt,  K. Schergaut </a:t>
+            </a:r>
+            <a:endParaRPr lang="de-DE" dirty="0"/>
+          </a:p>
+        </p:txBody>
+      </p:sp>
+      <p:sp>
+        <p:nvSpPr>
+          <p:cNvPr id="5" name="Fußzeilenplatzhalter 4"/>
+          <p:cNvSpPr>
+            <a:spLocks noGrp="1"/>
+          </p:cNvSpPr>
+          <p:nvPr>
+            <p:ph type="ftr" sz="quarter" idx="3"/>
+          </p:nvPr>
+        </p:nvSpPr>
+        <p:spPr/>
+        <p:txBody>
+          <a:bodyPr/>
+          <a:lstStyle/>
+          <a:p>
+            <a:r>
+              <a:rPr lang="de-DE" smtClean="0"/>
+              <a:t>Physik in der Kampfkunst Aikido                                http://www.uni-jena.de/aikido</a:t>
+            </a:r>
+            <a:endParaRPr lang="de-DE" dirty="0"/>
+          </a:p>
+        </p:txBody>
+      </p:sp>
+      <p:pic>
+        <p:nvPicPr>
+          <p:cNvPr id="6" name="Inhaltsplatzhalter 5"/>
+          <p:cNvPicPr>
+            <a:picLocks noGrp="1" noChangeAspect="1"/>
+          </p:cNvPicPr>
+          <p:nvPr>
+            <p:ph idx="1"/>
+          </p:nvPr>
+        </p:nvPicPr>
+        <p:blipFill>
+          <a:blip r:embed="rId2">
+            <a:extLst>
+              <a:ext uri="{28A0092B-C50C-407E-A947-70E740481C1C}">
+                <a14:useLocalDpi xmlns:a14="http://schemas.microsoft.com/office/drawing/2010/main" val="0"/>
+              </a:ext>
+            </a:extLst>
+          </a:blip>
+          <a:stretch>
+            <a:fillRect/>
+          </a:stretch>
+        </p:blipFill>
+        <p:spPr>
+          <a:xfrm>
+            <a:off x="1714500" y="1429544"/>
+            <a:ext cx="5715000" cy="4286250"/>
+          </a:xfrm>
+        </p:spPr>
+      </p:pic>
+    </p:spTree>
+    <p:extLst>
+      <p:ext uri="{BB962C8B-B14F-4D97-AF65-F5344CB8AC3E}">
+        <p14:creationId xmlns:p14="http://schemas.microsoft.com/office/powerpoint/2010/main" val="2122353284"/>
+      </p:ext>
+    </p:extLst>
+  </p:cSld>
+  <p:clrMapOvr>
+    <a:masterClrMapping/>
+  </p:clrMapOvr>
+</p:sld>
+</file>
+
+<file path=ppt/slides/slide13.xml><?xml version="1.0" encoding="utf-8"?>
 <p:sld xmlns:a="http://schemas.openxmlformats.org/drawingml/2006/main" xmlns:r="http://schemas.openxmlformats.org/officeDocument/2006/relationships" xmlns:p="http://schemas.openxmlformats.org/presentationml/2006/main">
   <p:cSld>
     <p:spTree>
@@ -3396,19 +3700,7 @@
                   </a:outerShdw>
                 </a:effectLst>
               </a:rPr>
-              <a:t>i</a:t>
-            </a:r>
-            <a:r>
-              <a:rPr lang="de-DE" sz="8000" i="1" dirty="0" smtClean="0">
-                <a:effectLst>
-                  <a:outerShdw blurRad="38100" dist="38100" dir="2700000" algn="tl">
-                    <a:srgbClr val="000000">
-                      <a:alpha val="43137"/>
-                    </a:srgbClr>
-                  </a:outerShdw>
-                </a:effectLst>
-              </a:rPr>
-              <a:t> – Energie</a:t>
+              <a:t>i – Energie</a:t>
             </a:r>
           </a:p>
         </p:txBody>
@@ -3881,50 +4173,14 @@
             </a:pPr>
             <a:r>
               <a:rPr lang="de-DE" sz="4000" dirty="0" smtClean="0"/>
-              <a:t>Ueshiba</a:t>
-            </a:r>
-            <a:r>
-              <a:rPr lang="de-DE" sz="4000" dirty="0" smtClean="0"/>
-              <a:t>, </a:t>
-            </a:r>
-            <a:r>
-              <a:rPr lang="de-DE" sz="4000" dirty="0" smtClean="0"/>
-              <a:t>Morihei</a:t>
-            </a:r>
-            <a:r>
-              <a:rPr lang="de-DE" sz="4000" dirty="0" smtClean="0"/>
-              <a:t> (O-</a:t>
-            </a:r>
-            <a:r>
-              <a:rPr lang="de-DE" sz="4000" dirty="0" smtClean="0"/>
-              <a:t>Sensei</a:t>
-            </a:r>
-            <a:r>
-              <a:rPr lang="de-DE" sz="4000" dirty="0" smtClean="0"/>
-              <a:t>)</a:t>
+              <a:t>Ueshiba, Morihei (O-Sensei)</a:t>
             </a:r>
             <a:br>
               <a:rPr lang="de-DE" sz="4000" dirty="0" smtClean="0"/>
             </a:br>
             <a:r>
               <a:rPr lang="de-DE" sz="2400" dirty="0" smtClean="0"/>
-              <a:t>*14. 12.1883 </a:t>
-            </a:r>
-            <a:r>
-              <a:rPr lang="de-DE" sz="2400" dirty="0" smtClean="0"/>
-              <a:t>Tanabe</a:t>
-            </a:r>
-            <a:r>
-              <a:rPr lang="de-DE" sz="2400" dirty="0" smtClean="0"/>
-              <a:t>; † 26. 04. 1969 </a:t>
-            </a:r>
-            <a:r>
-              <a:rPr lang="de-DE" sz="2400" dirty="0" smtClean="0"/>
-              <a:t>Iwama</a:t>
-            </a:r>
-            <a:r>
-              <a:rPr lang="de-DE" sz="2400" dirty="0" smtClean="0"/>
-              <a:t> (86)</a:t>
+              <a:t>*14. 12.1883 Tanabe; † 26. 04. 1969 Iwama (86)</a:t>
             </a:r>
           </a:p>
           <a:p>
@@ -4447,22 +4703,7 @@
                   </a:outerShdw>
                 </a:effectLst>
               </a:rPr>
-              <a:t>Aiki</a:t>
-            </a:r>
-            <a:r>
-              <a:rPr lang="de-DE" sz="3200" b="1" dirty="0" smtClean="0">
-                <a:solidFill>
-                  <a:schemeClr val="tx1"/>
-                </a:solidFill>
-                <a:effectLst>
-                  <a:outerShdw blurRad="38100" dist="38100" dir="2700000" algn="tl">
-                    <a:srgbClr val="000000">
-                      <a:alpha val="43137"/>
-                    </a:srgbClr>
-                  </a:outerShdw>
-                </a:effectLst>
-              </a:rPr>
-              <a:t> Ken</a:t>
+              <a:t>Aiki Ken</a:t>
             </a:r>
             <a:endParaRPr lang="de-DE" sz="3200" b="1" dirty="0">
               <a:solidFill>
@@ -4548,19 +4789,7 @@
                   </a:outerShdw>
                 </a:effectLst>
               </a:rPr>
-              <a:t>Aiki</a:t>
-            </a:r>
-            <a:r>
-              <a:rPr lang="de-DE" sz="3200" b="1" dirty="0" smtClean="0">
-                <a:effectLst>
-                  <a:outerShdw blurRad="38100" dist="38100" dir="2700000" algn="tl">
-                    <a:srgbClr val="000000">
-                      <a:alpha val="43137"/>
-                    </a:srgbClr>
-                  </a:outerShdw>
-                </a:effectLst>
-              </a:rPr>
-              <a:t> Jo</a:t>
+              <a:t>Aiki Jo</a:t>
             </a:r>
             <a:endParaRPr lang="de-DE" sz="3200" b="1" dirty="0">
               <a:effectLst>
@@ -4638,19 +4867,7 @@
                   </a:outerShdw>
                 </a:effectLst>
               </a:rPr>
-              <a:t>Tai </a:t>
-            </a:r>
-            <a:r>
-              <a:rPr lang="de-DE" sz="3200" b="1" dirty="0" smtClean="0">
-                <a:effectLst>
-                  <a:outerShdw blurRad="38100" dist="38100" dir="2700000" algn="tl">
-                    <a:srgbClr val="000000">
-                      <a:alpha val="43137"/>
-                    </a:srgbClr>
-                  </a:outerShdw>
-                </a:effectLst>
-              </a:rPr>
-              <a:t>jutsu</a:t>
+              <a:t>Tai jutsu</a:t>
             </a:r>
             <a:endParaRPr lang="de-DE" sz="3200" b="1" dirty="0">
               <a:effectLst>
@@ -4742,31 +4959,7 @@
                   </a:outerShdw>
                 </a:effectLst>
               </a:rPr>
-              <a:t>Tachi</a:t>
-            </a:r>
-            <a:r>
-              <a:rPr lang="de-DE" sz="2400" b="1" dirty="0" smtClean="0">
-                <a:effectLst>
-                  <a:outerShdw blurRad="38100" dist="38100" dir="2700000" algn="tl">
-                    <a:srgbClr val="000000">
-                      <a:alpha val="43137"/>
-                    </a:srgbClr>
-                  </a:outerShdw>
-                </a:effectLst>
-              </a:rPr>
-              <a:t> </a:t>
-            </a:r>
-            <a:r>
-              <a:rPr lang="de-DE" sz="2400" b="1" dirty="0" smtClean="0">
-                <a:effectLst>
-                  <a:outerShdw blurRad="38100" dist="38100" dir="2700000" algn="tl">
-                    <a:srgbClr val="000000">
-                      <a:alpha val="43137"/>
-                    </a:srgbClr>
-                  </a:outerShdw>
-                </a:effectLst>
-              </a:rPr>
-              <a:t>dori</a:t>
+              <a:t>Tachi dori</a:t>
             </a:r>
             <a:endParaRPr lang="de-DE" sz="2400" b="1" dirty="0">
               <a:effectLst>
@@ -4812,31 +5005,7 @@
                   </a:outerShdw>
                 </a:effectLst>
               </a:rPr>
-              <a:t>Jo </a:t>
-            </a:r>
-            <a:r>
-              <a:rPr lang="de-DE" sz="2400" b="1" dirty="0" smtClean="0">
-                <a:effectLst>
-                  <a:outerShdw blurRad="38100" dist="38100" dir="2700000" algn="tl">
-                    <a:srgbClr val="000000">
-                      <a:alpha val="43137"/>
-                    </a:srgbClr>
-                  </a:outerShdw>
-                </a:effectLst>
-              </a:rPr>
-              <a:t>dori</a:t>
-            </a:r>
-            <a:r>
-              <a:rPr lang="de-DE" sz="2400" b="1" dirty="0" smtClean="0">
-                <a:effectLst>
-                  <a:outerShdw blurRad="38100" dist="38100" dir="2700000" algn="tl">
-                    <a:srgbClr val="000000">
-                      <a:alpha val="43137"/>
-                    </a:srgbClr>
-                  </a:outerShdw>
-                </a:effectLst>
-              </a:rPr>
-              <a:t/>
+              <a:t>Jo dori</a:t>
             </a:r>
             <a:br>
               <a:rPr lang="de-DE" sz="2400" b="1" dirty="0" smtClean="0">
@@ -5136,43 +5305,7 @@
                   </a:outerShdw>
                 </a:effectLst>
               </a:rPr>
-              <a:t>Ken </a:t>
-            </a:r>
-            <a:r>
-              <a:rPr lang="de-DE" sz="2400" b="1" dirty="0" smtClean="0">
-                <a:effectLst>
-                  <a:outerShdw blurRad="38100" dist="38100" dir="2700000" algn="tl">
-                    <a:srgbClr val="000000">
-                      <a:alpha val="43137"/>
-                    </a:srgbClr>
-                  </a:outerShdw>
-                </a:effectLst>
-              </a:rPr>
-              <a:t>tai</a:t>
-            </a:r>
-            <a:r>
-              <a:rPr lang="de-DE" sz="2400" b="1" dirty="0" smtClean="0">
-                <a:effectLst>
-                  <a:outerShdw blurRad="38100" dist="38100" dir="2700000" algn="tl">
-                    <a:srgbClr val="000000">
-                      <a:alpha val="43137"/>
-                    </a:srgbClr>
-                  </a:outerShdw>
-                </a:effectLst>
-              </a:rPr>
-              <a:t> </a:t>
-            </a:r>
-            <a:r>
-              <a:rPr lang="de-DE" sz="2400" b="1" dirty="0" smtClean="0">
-                <a:effectLst>
-                  <a:outerShdw blurRad="38100" dist="38100" dir="2700000" algn="tl">
-                    <a:srgbClr val="000000">
-                      <a:alpha val="43137"/>
-                    </a:srgbClr>
-                  </a:outerShdw>
-                </a:effectLst>
-              </a:rPr>
-              <a:t>jo</a:t>
+              <a:t>Ken tai jo</a:t>
             </a:r>
             <a:endParaRPr lang="de-DE" sz="2400" b="1" dirty="0">
               <a:effectLst>
@@ -5621,7 +5754,11 @@
           <a:p>
             <a:r>
               <a:rPr lang="de-DE" dirty="0" smtClean="0"/>
-              <a:t>Traditionelles Aikido: ein äußerst durchdachtes, logisches System!</a:t>
+              <a:t>Traditionelles Aikido</a:t>
+            </a:r>
+            <a:r>
+              <a:rPr lang="de-DE" dirty="0" smtClean="0"/>
+              <a:t>: ein äußerst durchdachtes, logisches System!</a:t>
             </a:r>
           </a:p>
           <a:p>
@@ -5680,7 +5817,6 @@
               <a:rPr lang="de-DE" dirty="0" smtClean="0"/>
               <a:t>Impulsübertragung</a:t>
             </a:r>
-            <a:endParaRPr lang="de-DE" dirty="0" smtClean="0"/>
           </a:p>
           <a:p>
             <a:pPr marL="914400" lvl="1" indent="-514350">
@@ -5711,7 +5847,6 @@
               <a:rPr lang="de-DE" dirty="0" smtClean="0"/>
               <a:t>Schwerkraft</a:t>
             </a:r>
-            <a:endParaRPr lang="de-DE" dirty="0" smtClean="0"/>
           </a:p>
         </p:txBody>
       </p:sp>
@@ -6976,19 +7111,7 @@
           <a:p>
             <a:r>
               <a:rPr lang="de-DE" sz="3600" dirty="0" smtClean="0"/>
-              <a:t>Typische </a:t>
-            </a:r>
-            <a:r>
-              <a:rPr lang="de-DE" sz="3600" dirty="0" smtClean="0"/>
-              <a:t>Aikidostellung</a:t>
-            </a:r>
-            <a:r>
-              <a:rPr lang="de-DE" sz="3600" dirty="0" smtClean="0"/>
-              <a:t>: </a:t>
-            </a:r>
-            <a:r>
-              <a:rPr lang="de-DE" sz="3600" dirty="0" smtClean="0"/>
-              <a:t>Hanmi</a:t>
+              <a:t>Typische Aikidostellung: Hanmi</a:t>
             </a:r>
             <a:endParaRPr lang="de-DE" sz="3600" dirty="0"/>
           </a:p>
@@ -7018,21 +7141,12 @@
           <a:p>
             <a:r>
               <a:rPr lang="de-DE" sz="3600" dirty="0" smtClean="0"/>
-              <a:t>Typisch für Karate: </a:t>
-            </a:r>
-            <a:r>
-              <a:rPr lang="de-DE" sz="3600" dirty="0" smtClean="0"/>
-              <a:t>Zenkutsu</a:t>
-            </a:r>
-            <a:r>
-              <a:rPr lang="de-DE" sz="3600" dirty="0" smtClean="0"/>
-              <a:t> </a:t>
+              <a:t>Typisch für Karate: Zenkutsu </a:t>
             </a:r>
             <a:r>
               <a:rPr lang="de-DE" sz="3600" dirty="0"/>
               <a:t>dachi</a:t>
             </a:r>
-            <a:endParaRPr lang="de-DE" sz="3600" dirty="0"/>
           </a:p>
         </p:txBody>
       </p:sp>
@@ -7676,7 +7790,7 @@
             </p:spPr>
             <p:txBody>
               <a:bodyPr vert="horz" lIns="91440" tIns="45720" rIns="91440" bIns="45720" rtlCol="0">
-                <a:normAutofit/>
+                <a:normAutofit fontScale="85000" lnSpcReduction="10000"/>
               </a:bodyPr>
               <a:lstStyle>
                 <a:lvl1pPr marL="342900" indent="-342900" algn="l" defTabSz="914400" rtl="0" eaLnBrk="1" latinLnBrk="0" hangingPunct="1">
@@ -7815,6 +7929,30 @@
                   </a:defRPr>
                 </a:lvl9pPr>
               </a:lstStyle>
+              <a:p>
+                <a:pPr marL="0" indent="0" algn="just">
+                  <a:buNone/>
+                </a:pPr>
+                <a:r>
+                  <a:rPr lang="de-DE" i="1" dirty="0">
+                    <a:latin typeface="Cambria Math"/>
+                  </a:rPr>
+                  <a:t> „Gib mir einen Punkt, auf dem ich stehen kann, und ich werde dir die Welt aus den Angeln </a:t>
+                </a:r>
+                <a:r>
+                  <a:rPr lang="de-DE" i="1" dirty="0" smtClean="0">
+                    <a:latin typeface="Cambria Math"/>
+                  </a:rPr>
+                  <a:t>heben“   (</a:t>
+                </a:r>
+                <a:r>
+                  <a:rPr lang="de-DE" i="1" dirty="0" smtClean="0"/>
+                  <a:t>Archimedes) </a:t>
+                </a:r>
+                <a:endParaRPr lang="de-DE" i="1" dirty="0">
+                  <a:latin typeface="Cambria Math"/>
+                </a:endParaRPr>
+              </a:p>
               <a:p>
                 <a14:m>
                   <m:oMath xmlns:m="http://schemas.openxmlformats.org/officeDocument/2006/math">
@@ -8089,7 +8227,6 @@
                   <a:rPr lang="de-DE" sz="3200" dirty="0" smtClean="0"/>
                   <a:t> Kraft links und rechts</a:t>
                 </a:r>
-                <a:endParaRPr lang="de-DE" sz="3200" dirty="0" smtClean="0"/>
               </a:p>
             </p:txBody>
           </p:sp>
@@ -8114,7 +8251,7 @@
               <a:blipFill rotWithShape="1">
                 <a:blip r:embed="rId6"/>
                 <a:stretch>
-                  <a:fillRect l="-2745"/>
+                  <a:fillRect l="-2267" t="-3119" r="-2387" b="-195"/>
                 </a:stretch>
               </a:blipFill>
             </p:spPr>
@@ -8359,8 +8496,8 @@
               </a:fontRef>
             </p:style>
           </p:cxnSp>
-          <mc:AlternateContent xmlns:mc="http://schemas.openxmlformats.org/markup-compatibility/2006">
-            <mc:Choice xmlns:a14="http://schemas.microsoft.com/office/drawing/2010/main" Requires="a14">
+          <mc:AlternateContent xmlns:mc="http://schemas.openxmlformats.org/markup-compatibility/2006" xmlns:a14="http://schemas.microsoft.com/office/drawing/2010/main">
+            <mc:Choice Requires="a14">
               <p:sp>
                 <p:nvSpPr>
                   <p:cNvPr id="16" name="Rechteck 15"/>
@@ -8382,6 +8519,7 @@
                   </a:bodyPr>
                   <a:lstStyle/>
                   <a:p>
+                    <a:pPr/>
                     <a14:m>
                       <m:oMathPara xmlns:m="http://schemas.openxmlformats.org/officeDocument/2006/math">
                         <m:oMathParaPr>
@@ -8434,7 +8572,7 @@
                 </p:txBody>
               </p:sp>
             </mc:Choice>
-            <mc:Fallback>
+            <mc:Fallback xmlns="">
               <p:sp>
                 <p:nvSpPr>
                   <p:cNvPr id="16" name="Rechteck 15"/>
@@ -8520,7 +8658,7 @@
               <p:spPr>
                 <a:xfrm>
                   <a:off x="314853" y="2290350"/>
-                  <a:ext cx="780919" cy="646331"/>
+                  <a:ext cx="724814" cy="646331"/>
                 </a:xfrm>
                 <a:prstGeom prst="rect">
                   <a:avLst/>
@@ -8532,6 +8670,7 @@
                 </a:bodyPr>
                 <a:lstStyle/>
                 <a:p>
+                  <a:pPr/>
                   <a14:m>
                     <m:oMathPara xmlns:m="http://schemas.openxmlformats.org/officeDocument/2006/math">
                       <m:oMathParaPr>
@@ -8562,13 +8701,13 @@
                           </m:e>
                           <m:sub>
                             <m:r>
-                              <a:rPr lang="de-DE" sz="3600" b="1" i="1">
+                              <a:rPr lang="de-DE" sz="3600" b="1" i="1" smtClean="0">
                                 <a:solidFill>
                                   <a:schemeClr val="tx2"/>
                                 </a:solidFill>
                                 <a:latin typeface="Cambria Math"/>
                               </a:rPr>
-                              <m:t>𝒓</m:t>
+                              <m:t>𝒍</m:t>
                             </m:r>
                           </m:sub>
                         </m:sSub>
@@ -8596,7 +8735,7 @@
               <p:spPr>
                 <a:xfrm>
                   <a:off x="314853" y="2290350"/>
-                  <a:ext cx="780919" cy="646331"/>
+                  <a:ext cx="724814" cy="646331"/>
                 </a:xfrm>
                 <a:prstGeom prst="rect">
                   <a:avLst/>
@@ -9874,8 +10013,8 @@
           <a:chExt cx="0" cy="0"/>
         </a:xfrm>
       </p:grpSpPr>
-      <mc:AlternateContent xmlns:mc="http://schemas.openxmlformats.org/markup-compatibility/2006">
-        <mc:Choice xmlns:a14="http://schemas.microsoft.com/office/drawing/2010/main" Requires="a14">
+      <mc:AlternateContent xmlns:mc="http://schemas.openxmlformats.org/markup-compatibility/2006" xmlns:a14="http://schemas.microsoft.com/office/drawing/2010/main">
+        <mc:Choice Requires="a14">
           <p:sp>
             <p:nvSpPr>
               <p:cNvPr id="2" name="Inhaltsplatzhalter 1"/>
@@ -9908,13 +10047,7 @@
                   <a:rPr lang="de-DE" i="1" u="sng" dirty="0" smtClean="0">
                     <a:latin typeface="+mj-lt"/>
                   </a:rPr>
-                  <a:t>Newtonsche</a:t>
-                </a:r>
-                <a:r>
-                  <a:rPr lang="de-DE" i="1" u="sng" dirty="0" smtClean="0">
-                    <a:latin typeface="+mj-lt"/>
-                  </a:rPr>
-                  <a:t> Gesetze: </a:t>
+                  <a:t>Newtonsche Gesetze: </a:t>
                 </a:r>
               </a:p>
               <a:p>
@@ -9927,11 +10060,7 @@
                 </a:pPr>
                 <a:r>
                   <a:rPr lang="de-DE" dirty="0" smtClean="0"/>
-                  <a:t>Ohne einwirkende Kräfte, </a:t>
-                </a:r>
-                <a:r>
-                  <a:rPr lang="de-DE" dirty="0" smtClean="0"/>
-                  <a:t>gibt es keine Geschwindigkeitsänderung</a:t>
+                  <a:t>Ohne einwirkende Kräfte, gibt es keine Geschwindigkeitsänderung</a:t>
                 </a:r>
                 <a:endParaRPr lang="de-DE" b="0" i="1" dirty="0" smtClean="0">
                   <a:latin typeface="Cambria Math"/>
@@ -9983,11 +10112,7 @@
                 </a14:m>
                 <a:r>
                   <a:rPr lang="de-DE" dirty="0" smtClean="0"/>
-                  <a:t> </a:t>
-                </a:r>
-                <a:r>
-                  <a:rPr lang="de-DE" dirty="0" smtClean="0"/>
-                  <a:t>mit  </a:t>
+                  <a:t> mit  </a:t>
                 </a:r>
                 <a14:m>
                   <m:oMath xmlns:m="http://schemas.openxmlformats.org/officeDocument/2006/math">
@@ -10001,11 +10126,7 @@
                 </a14:m>
                 <a:r>
                   <a:rPr lang="de-DE" dirty="0" smtClean="0"/>
-                  <a:t>: </a:t>
-                </a:r>
-                <a:r>
-                  <a:rPr lang="de-DE" dirty="0" smtClean="0"/>
-                  <a:t>Kraft, </a:t>
+                  <a:t>: Kraft, </a:t>
                 </a:r>
                 <a14:m>
                   <m:oMath xmlns:m="http://schemas.openxmlformats.org/officeDocument/2006/math">
@@ -10019,11 +10140,7 @@
                 </a14:m>
                 <a:r>
                   <a:rPr lang="de-DE" dirty="0" smtClean="0"/>
-                  <a:t>: Beschleunigung</a:t>
-                </a:r>
-                <a:r>
-                  <a:rPr lang="de-DE" dirty="0" smtClean="0"/>
-                  <a:t>, </a:t>
+                  <a:t>: Beschleunigung, </a:t>
                 </a:r>
                 <a14:m>
                   <m:oMath xmlns:m="http://schemas.openxmlformats.org/officeDocument/2006/math">
@@ -10057,7 +10174,7 @@
             </p:txBody>
           </p:sp>
         </mc:Choice>
-        <mc:Fallback>
+        <mc:Fallback xmlns="">
           <p:sp>
             <p:nvSpPr>
               <p:cNvPr id="2" name="Inhaltsplatzhalter 1"/>

</xml_diff>

<commit_message>
Drehimupls ausgearbeitet, Folie mit bolometrischen Kreisen umstrukturiert.
</commit_message>
<xml_diff>
--- a/LNdW2013 physik in Aikido/LNdW2013 Physik in Aikido.pptx
+++ b/LNdW2013 physik in Aikido/LNdW2013 Physik in Aikido.pptx
@@ -204,7 +204,7 @@
           <a:p>
             <a:fld id="{22975348-65C7-4E30-829F-ADBF67F8AD2B}" type="datetimeFigureOut">
               <a:rPr lang="de-DE" smtClean="0"/>
-              <a:t>21.11.2013</a:t>
+              <a:t>22.11.2013</a:t>
             </a:fld>
             <a:endParaRPr lang="de-DE" dirty="0"/>
           </a:p>
@@ -518,7 +518,11 @@
           <a:p>
             <a:r>
               <a:rPr lang="de-DE" dirty="0" smtClean="0"/>
-              <a:t>1.53 m Groß,</a:t>
+              <a:t>1.59 </a:t>
+            </a:r>
+            <a:r>
+              <a:rPr lang="de-DE" dirty="0" smtClean="0"/>
+              <a:t>m Groß,</a:t>
             </a:r>
             <a:r>
               <a:rPr lang="de-DE" baseline="0" dirty="0" smtClean="0"/>
@@ -528,8 +532,19 @@
           <a:p>
             <a:r>
               <a:rPr lang="de-DE" baseline="0" dirty="0" smtClean="0"/>
-              <a:t>Sehr hartes selbständiges Training</a:t>
-            </a:r>
+              <a:t>Sehr hartes </a:t>
+            </a:r>
+            <a:r>
+              <a:rPr lang="de-DE" baseline="0" dirty="0" smtClean="0"/>
+              <a:t>Training von Kindheit an</a:t>
+            </a:r>
+          </a:p>
+          <a:p>
+            <a:r>
+              <a:rPr lang="de-DE" baseline="0" dirty="0" smtClean="0"/>
+              <a:t>1.59m klein aber äußerst stark.</a:t>
+            </a:r>
+            <a:endParaRPr lang="de-DE" baseline="0" dirty="0" smtClean="0"/>
           </a:p>
           <a:p>
             <a:r>
@@ -540,7 +555,64 @@
           <a:p>
             <a:r>
               <a:rPr lang="de-DE" baseline="0" dirty="0" smtClean="0"/>
-              <a:t>Mit 40 Reputation eines unbesiegten Kämpfers</a:t>
+              <a:t>Mit 40 Reputation eines </a:t>
+            </a:r>
+            <a:r>
+              <a:rPr lang="de-DE" baseline="0" dirty="0" smtClean="0"/>
+              <a:t>unbesiegbaren Kämpfers</a:t>
+            </a:r>
+          </a:p>
+          <a:p>
+            <a:r>
+              <a:rPr lang="de-DE" baseline="0" dirty="0" smtClean="0"/>
+              <a:t>Synthese aus </a:t>
+            </a:r>
+            <a:r>
+              <a:rPr lang="de-DE" baseline="0" dirty="0" err="1" smtClean="0"/>
+              <a:t>Daito-Ryu</a:t>
+            </a:r>
+            <a:r>
+              <a:rPr lang="de-DE" baseline="0" dirty="0" smtClean="0"/>
+              <a:t> </a:t>
+            </a:r>
+            <a:r>
+              <a:rPr lang="de-DE" baseline="0" dirty="0" err="1" smtClean="0"/>
+              <a:t>Aiki</a:t>
+            </a:r>
+            <a:r>
+              <a:rPr lang="de-DE" baseline="0" dirty="0" smtClean="0"/>
+              <a:t> </a:t>
+            </a:r>
+            <a:r>
+              <a:rPr lang="de-DE" baseline="0" dirty="0" err="1" smtClean="0"/>
+              <a:t>jujutsu</a:t>
+            </a:r>
+            <a:r>
+              <a:rPr lang="de-DE" baseline="0" dirty="0" smtClean="0"/>
+              <a:t>, Ken </a:t>
+            </a:r>
+            <a:r>
+              <a:rPr lang="de-DE" baseline="0" dirty="0" err="1" smtClean="0"/>
+              <a:t>Jutsu</a:t>
+            </a:r>
+            <a:r>
+              <a:rPr lang="de-DE" baseline="0" dirty="0" smtClean="0"/>
+              <a:t>, Jodo</a:t>
+            </a:r>
+          </a:p>
+          <a:p>
+            <a:endParaRPr lang="de-DE" baseline="0" dirty="0" smtClean="0"/>
+          </a:p>
+          <a:p>
+            <a:r>
+              <a:rPr lang="de-DE" baseline="0" dirty="0" smtClean="0"/>
+              <a:t>Friedvolle Grundhaltung: Japanische Kampkünste geprägt durchs Schwert: absolut tödliche Waffe. Bsp. Karate: tiefer Stand, große Reichweite, tödlicher Schlag.</a:t>
+            </a:r>
+          </a:p>
+          <a:p>
+            <a:r>
+              <a:rPr lang="de-DE" baseline="0" dirty="0" smtClean="0"/>
+              <a:t>Man muss keinen Angriff annehmen! -&gt; Lockerheit</a:t>
             </a:r>
             <a:endParaRPr lang="de-DE" dirty="0" smtClean="0"/>
           </a:p>
@@ -632,20 +704,109 @@
             </a:pPr>
             <a:r>
               <a:rPr lang="de-DE" dirty="0" smtClean="0"/>
-              <a:t>Aikido</a:t>
+              <a:t>Schwert: </a:t>
+            </a:r>
+          </a:p>
+          <a:p>
+            <a:pPr marL="685800" lvl="1" indent="-228600">
+              <a:buFont typeface="+mj-lt"/>
+              <a:buAutoNum type="arabicPeriod"/>
+            </a:pPr>
+            <a:r>
+              <a:rPr lang="de-DE" dirty="0" err="1" smtClean="0"/>
+              <a:t>Sichi</a:t>
             </a:r>
             <a:r>
               <a:rPr lang="de-DE" baseline="0" dirty="0" smtClean="0"/>
-              <a:t> hanmi</a:t>
-            </a:r>
-            <a:r>
-              <a:rPr lang="de-DE" dirty="0" smtClean="0"/>
-              <a:t>: Grundfläche ein Dreieck. Schwerpunkt in der Mitte. Starke Linie:</a:t>
+              <a:t> </a:t>
+            </a:r>
+            <a:r>
+              <a:rPr lang="de-DE" baseline="0" dirty="0" err="1" smtClean="0"/>
+              <a:t>no</a:t>
             </a:r>
             <a:r>
               <a:rPr lang="de-DE" baseline="0" dirty="0" smtClean="0"/>
-              <a:t> Verbindungslinie zw. Füssen, Schwache Linie: senkrecht dazu.</a:t>
-            </a:r>
+              <a:t> </a:t>
+            </a:r>
+            <a:r>
+              <a:rPr lang="de-DE" baseline="0" dirty="0" err="1" smtClean="0"/>
+              <a:t>Kumitachi</a:t>
+            </a:r>
+            <a:r>
+              <a:rPr lang="de-DE" baseline="0" dirty="0" smtClean="0"/>
+              <a:t>, </a:t>
+            </a:r>
+          </a:p>
+          <a:p>
+            <a:pPr marL="685800" lvl="1" indent="-228600">
+              <a:buFont typeface="+mj-lt"/>
+              <a:buAutoNum type="arabicPeriod"/>
+            </a:pPr>
+            <a:r>
+              <a:rPr lang="de-DE" baseline="0" dirty="0" err="1" smtClean="0"/>
+              <a:t>Henkaform</a:t>
+            </a:r>
+            <a:r>
+              <a:rPr lang="de-DE" baseline="0" dirty="0" smtClean="0"/>
+              <a:t> daraus </a:t>
+            </a:r>
+            <a:r>
+              <a:rPr lang="de-DE" baseline="0" dirty="0" err="1" smtClean="0"/>
+              <a:t>Kotegaeshi</a:t>
+            </a:r>
+            <a:endParaRPr lang="de-DE" baseline="0" dirty="0" smtClean="0"/>
+          </a:p>
+          <a:p>
+            <a:pPr marL="228600" lvl="0" indent="-228600">
+              <a:buFont typeface="Arial" panose="020B0604020202020204" pitchFamily="34" charset="0"/>
+              <a:buChar char="•"/>
+            </a:pPr>
+            <a:r>
+              <a:rPr lang="de-DE" baseline="0" dirty="0" smtClean="0"/>
+              <a:t>Waffenlos: </a:t>
+            </a:r>
+          </a:p>
+          <a:p>
+            <a:pPr marL="685800" lvl="1" indent="-228600">
+              <a:buFont typeface="+mj-lt"/>
+              <a:buAutoNum type="arabicPeriod"/>
+            </a:pPr>
+            <a:r>
+              <a:rPr lang="de-DE" baseline="0" dirty="0" err="1" smtClean="0"/>
+              <a:t>Kotegaeshi</a:t>
+            </a:r>
+            <a:r>
+              <a:rPr lang="de-DE" baseline="0" dirty="0" smtClean="0"/>
+              <a:t> </a:t>
+            </a:r>
+          </a:p>
+          <a:p>
+            <a:pPr marL="685800" lvl="1" indent="-228600">
+              <a:buFont typeface="+mj-lt"/>
+              <a:buAutoNum type="arabicPeriod"/>
+            </a:pPr>
+            <a:r>
+              <a:rPr lang="de-DE" baseline="0" dirty="0" err="1" smtClean="0"/>
+              <a:t>Koshi</a:t>
+            </a:r>
+            <a:r>
+              <a:rPr lang="de-DE" baseline="0" dirty="0" smtClean="0"/>
+              <a:t> Nage</a:t>
+            </a:r>
+          </a:p>
+          <a:p>
+            <a:pPr marL="685800" lvl="1" indent="-228600">
+              <a:buFont typeface="+mj-lt"/>
+              <a:buAutoNum type="arabicPeriod"/>
+            </a:pPr>
+            <a:r>
+              <a:rPr lang="de-DE" baseline="0" dirty="0" err="1" smtClean="0"/>
+              <a:t>Nikkyo</a:t>
+            </a:r>
+            <a:endParaRPr lang="de-DE" baseline="0" dirty="0" smtClean="0"/>
+          </a:p>
+          <a:p>
+            <a:endParaRPr lang="de-DE" baseline="0" dirty="0" smtClean="0"/>
           </a:p>
           <a:p>
             <a:pPr marL="171450" indent="-171450">
@@ -653,8 +814,20 @@
               <a:buChar char="•"/>
             </a:pPr>
             <a:r>
+              <a:rPr lang="de-DE" baseline="0" dirty="0" err="1" smtClean="0"/>
+              <a:t>TachiDori</a:t>
+            </a:r>
+            <a:r>
               <a:rPr lang="de-DE" baseline="0" dirty="0" smtClean="0"/>
-              <a:t>Karate Zenkutsu dachi: Zentrum ist weiter vorne, und tiefer. Grundfläche ist ein Rechteck. Ebenfalls starke und schwache Linien</a:t>
+              <a:t>: </a:t>
+            </a:r>
+            <a:r>
+              <a:rPr lang="de-DE" baseline="0" dirty="0" err="1" smtClean="0"/>
+              <a:t>Kokyu</a:t>
+            </a:r>
+            <a:r>
+              <a:rPr lang="de-DE" baseline="0" dirty="0" smtClean="0"/>
+              <a:t> Nage</a:t>
             </a:r>
           </a:p>
           <a:p>
@@ -663,9 +836,26 @@
               <a:buChar char="•"/>
             </a:pPr>
             <a:r>
+              <a:rPr lang="de-DE" baseline="0" dirty="0" err="1" smtClean="0"/>
+              <a:t>Aiki</a:t>
+            </a:r>
+            <a:r>
               <a:rPr lang="de-DE" baseline="0" dirty="0" smtClean="0"/>
-              <a:t>Für eine Aikidotechnik ist es zwingend erforderlich, den Schwerpunkt des Angreifers außerhalb seiner Standfläche zu bringen.</a:t>
-            </a:r>
+              <a:t> Jo: Rock </a:t>
+            </a:r>
+            <a:r>
+              <a:rPr lang="de-DE" baseline="0" dirty="0" err="1" smtClean="0"/>
+              <a:t>No</a:t>
+            </a:r>
+            <a:r>
+              <a:rPr lang="de-DE" baseline="0" dirty="0" smtClean="0"/>
+              <a:t> </a:t>
+            </a:r>
+            <a:r>
+              <a:rPr lang="de-DE" baseline="0" dirty="0" err="1" smtClean="0"/>
+              <a:t>KumiJo</a:t>
+            </a:r>
+            <a:endParaRPr lang="de-DE" baseline="0" dirty="0" smtClean="0"/>
           </a:p>
           <a:p>
             <a:pPr marL="171450" indent="-171450">
@@ -674,9 +864,56 @@
             </a:pPr>
             <a:r>
               <a:rPr lang="de-DE" baseline="0" dirty="0" smtClean="0"/>
-              <a:t>Andererseits ist eigene Stabilität für einen Aikidoka von entscheidender Bedeutung.</a:t>
-            </a:r>
-            <a:endParaRPr lang="de-DE" dirty="0" smtClean="0"/>
+              <a:t>Jo </a:t>
+            </a:r>
+            <a:r>
+              <a:rPr lang="de-DE" baseline="0" dirty="0" err="1" smtClean="0"/>
+              <a:t>Dori</a:t>
+            </a:r>
+            <a:r>
+              <a:rPr lang="de-DE" baseline="0" dirty="0" smtClean="0"/>
+              <a:t>:  </a:t>
+            </a:r>
+            <a:r>
+              <a:rPr lang="de-DE" baseline="0" dirty="0" err="1" smtClean="0"/>
+              <a:t>Ju</a:t>
+            </a:r>
+            <a:r>
+              <a:rPr lang="de-DE" baseline="0" dirty="0" smtClean="0"/>
+              <a:t> </a:t>
+            </a:r>
+            <a:r>
+              <a:rPr lang="de-DE" baseline="0" dirty="0" err="1" smtClean="0"/>
+              <a:t>Ji</a:t>
+            </a:r>
+            <a:r>
+              <a:rPr lang="de-DE" baseline="0" dirty="0" smtClean="0"/>
+              <a:t> Nage</a:t>
+            </a:r>
+          </a:p>
+          <a:p>
+            <a:pPr marL="171450" indent="-171450">
+              <a:buFont typeface="Arial" panose="020B0604020202020204" pitchFamily="34" charset="0"/>
+              <a:buChar char="•"/>
+            </a:pPr>
+            <a:r>
+              <a:rPr lang="de-DE" baseline="0" dirty="0" smtClean="0"/>
+              <a:t>Jo Nage:  </a:t>
+            </a:r>
+            <a:r>
+              <a:rPr lang="de-DE" baseline="0" dirty="0" err="1" smtClean="0"/>
+              <a:t>Shihonage</a:t>
+            </a:r>
+            <a:endParaRPr lang="de-DE" baseline="0" dirty="0" smtClean="0"/>
+          </a:p>
+          <a:p>
+            <a:endParaRPr lang="de-DE" baseline="0" dirty="0" smtClean="0"/>
+          </a:p>
+          <a:p>
+            <a:endParaRPr lang="de-DE" baseline="0" dirty="0" smtClean="0"/>
+          </a:p>
+          <a:p>
+            <a:endParaRPr lang="de-DE" dirty="0"/>
           </a:p>
         </p:txBody>
       </p:sp>
@@ -697,7 +934,7 @@
           <a:p>
             <a:fld id="{5FCB60D4-54C9-4D27-9DD7-47BA08F3328E}" type="slidenum">
               <a:rPr lang="de-DE" smtClean="0"/>
-              <a:t>6</a:t>
+              <a:t>4</a:t>
             </a:fld>
             <a:endParaRPr lang="de-DE" dirty="0"/>
           </a:p>
@@ -706,7 +943,7 @@
     </p:spTree>
     <p:extLst>
       <p:ext uri="{BB962C8B-B14F-4D97-AF65-F5344CB8AC3E}">
-        <p14:creationId xmlns:p14="http://schemas.microsoft.com/office/powerpoint/2010/main" val="480772012"/>
+        <p14:creationId xmlns:p14="http://schemas.microsoft.com/office/powerpoint/2010/main" val="4280359503"/>
       </p:ext>
     </p:extLst>
   </p:cSld>
@@ -766,12 +1003,25 @@
             </a:pPr>
             <a:r>
               <a:rPr lang="de-DE" dirty="0" smtClean="0"/>
-              <a:t>Drehmoment:</a:t>
+              <a:t>Aikido</a:t>
             </a:r>
             <a:r>
               <a:rPr lang="de-DE" baseline="0" dirty="0" smtClean="0"/>
-              <a:t> Kreuzvektorprodukt aus Ortsvektor und Kraft, oder wenn Kraft senkrecht auf Hebelarm wirkt: Hebelarm * Kraft</a:t>
-            </a:r>
+              <a:t> </a:t>
+            </a:r>
+            <a:r>
+              <a:rPr lang="de-DE" baseline="0" dirty="0" err="1" smtClean="0"/>
+              <a:t>hanmi</a:t>
+            </a:r>
+            <a:r>
+              <a:rPr lang="de-DE" dirty="0" smtClean="0"/>
+              <a:t>: Friedliche</a:t>
+            </a:r>
+            <a:r>
+              <a:rPr lang="de-DE" baseline="0" dirty="0" smtClean="0"/>
+              <a:t> Grundhaltung äußerst sich in unserer Grundstellung.</a:t>
+            </a:r>
+            <a:endParaRPr lang="de-DE" dirty="0" smtClean="0"/>
           </a:p>
           <a:p>
             <a:pPr marL="171450" indent="-171450">
@@ -779,9 +1029,48 @@
               <a:buChar char="•"/>
             </a:pPr>
             <a:r>
+              <a:rPr lang="de-DE" dirty="0" smtClean="0"/>
+              <a:t>Grundfläche </a:t>
+            </a:r>
+            <a:r>
+              <a:rPr lang="de-DE" dirty="0" smtClean="0"/>
+              <a:t>ein Dreieck. Schwerpunkt in der Mitte. Starke Linie:</a:t>
+            </a:r>
+            <a:r>
               <a:rPr lang="de-DE" baseline="0" dirty="0" smtClean="0"/>
-              <a:t>D.h. Man kann mit wenig Kraft, ein großes Drehmoment erreichen, wenn der Hebelarm lang ist!</a:t>
-            </a:r>
+              <a:t> Verbindungslinie zw. Füssen, Schwache Linie: senkrecht dazu.</a:t>
+            </a:r>
+          </a:p>
+          <a:p>
+            <a:pPr marL="171450" indent="-171450">
+              <a:buFont typeface="Arial" panose="020B0604020202020204" pitchFamily="34" charset="0"/>
+              <a:buChar char="•"/>
+            </a:pPr>
+            <a:r>
+              <a:rPr lang="de-DE" baseline="0" dirty="0" smtClean="0"/>
+              <a:t>Karate Zenkutsu dachi: Zentrum ist weiter vorne, und tiefer. Grundfläche ist ein Rechteck. Ebenfalls starke und schwache Linien</a:t>
+            </a:r>
+          </a:p>
+          <a:p>
+            <a:pPr marL="171450" indent="-171450">
+              <a:buFont typeface="Arial" panose="020B0604020202020204" pitchFamily="34" charset="0"/>
+              <a:buChar char="•"/>
+            </a:pPr>
+            <a:r>
+              <a:rPr lang="de-DE" baseline="0" dirty="0" smtClean="0"/>
+              <a:t>Für eine Aikidotechnik ist es zwingend erforderlich, den Schwerpunkt des Angreifers außerhalb seiner Standfläche zu bringen.</a:t>
+            </a:r>
+          </a:p>
+          <a:p>
+            <a:pPr marL="171450" indent="-171450">
+              <a:buFont typeface="Arial" panose="020B0604020202020204" pitchFamily="34" charset="0"/>
+              <a:buChar char="•"/>
+            </a:pPr>
+            <a:r>
+              <a:rPr lang="de-DE" baseline="0" dirty="0" smtClean="0"/>
+              <a:t>Andererseits ist eigene Stabilität für einen Aikidoka von entscheidender Bedeutung.</a:t>
+            </a:r>
+            <a:endParaRPr lang="de-DE" dirty="0" smtClean="0"/>
           </a:p>
         </p:txBody>
       </p:sp>
@@ -802,7 +1091,7 @@
           <a:p>
             <a:fld id="{5FCB60D4-54C9-4D27-9DD7-47BA08F3328E}" type="slidenum">
               <a:rPr lang="de-DE" smtClean="0"/>
-              <a:t>7</a:t>
+              <a:t>6</a:t>
             </a:fld>
             <a:endParaRPr lang="de-DE" dirty="0"/>
           </a:p>
@@ -811,7 +1100,7 @@
     </p:spTree>
     <p:extLst>
       <p:ext uri="{BB962C8B-B14F-4D97-AF65-F5344CB8AC3E}">
-        <p14:creationId xmlns:p14="http://schemas.microsoft.com/office/powerpoint/2010/main" val="545087587"/>
+        <p14:creationId xmlns:p14="http://schemas.microsoft.com/office/powerpoint/2010/main" val="480772012"/>
       </p:ext>
     </p:extLst>
   </p:cSld>
@@ -865,85 +1154,28 @@
           <a:bodyPr/>
           <a:lstStyle/>
           <a:p>
+            <a:pPr marL="171450" indent="-171450">
+              <a:buFont typeface="Arial" panose="020B0604020202020204" pitchFamily="34" charset="0"/>
+              <a:buChar char="•"/>
+            </a:pPr>
             <a:r>
               <a:rPr lang="de-DE" dirty="0" smtClean="0"/>
-              <a:t>Freiheitsgrade:</a:t>
+              <a:t>Drehmoment:</a:t>
             </a:r>
             <a:r>
               <a:rPr lang="de-DE" baseline="0" dirty="0" smtClean="0"/>
-              <a:t> Schulter 3, (Höhe, Seite, Rotation des Oberarmes)</a:t>
-            </a:r>
-          </a:p>
-          <a:p>
+              <a:t> Kreuzvektorprodukt aus Ortsvektor und Kraft, oder wenn Kraft senkrecht auf Hebelarm wirkt: Hebelarm * Kraft</a:t>
+            </a:r>
+          </a:p>
+          <a:p>
+            <a:pPr marL="171450" indent="-171450">
+              <a:buFont typeface="Arial" panose="020B0604020202020204" pitchFamily="34" charset="0"/>
+              <a:buChar char="•"/>
+            </a:pPr>
             <a:r>
               <a:rPr lang="de-DE" baseline="0" dirty="0" smtClean="0"/>
-              <a:t>Zu 1. Rokkyu, Kote Gaeshi. Nicht die Schmerzeinwirkung ist entscheidend, sondern die Struktur</a:t>
-            </a:r>
-          </a:p>
-          <a:p>
-            <a:endParaRPr lang="de-DE" baseline="0" dirty="0" smtClean="0"/>
-          </a:p>
-          <a:p>
-            <a:r>
-              <a:rPr lang="de-DE" baseline="0" dirty="0" smtClean="0"/>
-              <a:t>Zu 2. Shihonage, Irimi Nage, Kaitennage</a:t>
-            </a:r>
-            <a:r>
-              <a:rPr lang="de-DE" dirty="0" smtClean="0"/>
-              <a:t>.</a:t>
-            </a:r>
-          </a:p>
-          <a:p>
-            <a:endParaRPr lang="de-DE" dirty="0"/>
-          </a:p>
-          <a:p>
-            <a:pPr marL="0" lvl="1">
-              <a:defRPr/>
-            </a:pPr>
-            <a:r>
-              <a:rPr lang="de-DE" dirty="0" smtClean="0"/>
-              <a:t>Kokyu: Diese </a:t>
-            </a:r>
-            <a:r>
-              <a:rPr lang="de-DE" dirty="0"/>
-              <a:t>natürliche Arm- und Handhaltung haben Sie beim Anschieben von einem Auto</a:t>
-            </a:r>
-            <a:r>
-              <a:rPr lang="de-DE" dirty="0" smtClean="0"/>
-              <a:t>!)</a:t>
-            </a:r>
-          </a:p>
-          <a:p>
-            <a:pPr marL="0" lvl="1">
-              <a:defRPr/>
-            </a:pPr>
-            <a:r>
-              <a:rPr lang="de-DE" sz="1200" dirty="0" smtClean="0"/>
-              <a:t>Mittellinie:</a:t>
-            </a:r>
-            <a:r>
-              <a:rPr lang="de-DE" sz="1200" baseline="0" dirty="0" smtClean="0"/>
-              <a:t> </a:t>
-            </a:r>
-            <a:r>
-              <a:rPr lang="de-DE" sz="1200" dirty="0" smtClean="0"/>
-              <a:t>treffen Sie beim Arbeiten mit einer Axt</a:t>
-            </a:r>
-          </a:p>
-          <a:p>
-            <a:pPr marL="0" lvl="1">
-              <a:defRPr/>
-            </a:pPr>
-            <a:endParaRPr lang="de-DE" sz="1200" dirty="0" smtClean="0"/>
-          </a:p>
-          <a:p>
-            <a:pPr marL="0" lvl="1">
-              <a:defRPr/>
-            </a:pPr>
-            <a:endParaRPr lang="de-DE" dirty="0"/>
-          </a:p>
-          <a:p>
-            <a:endParaRPr lang="de-DE" baseline="0" dirty="0" smtClean="0"/>
+              <a:t>D.h. Man kann mit wenig Kraft, ein großes Drehmoment erreichen, wenn der Hebelarm lang ist!</a:t>
+            </a:r>
           </a:p>
         </p:txBody>
       </p:sp>
@@ -964,7 +1196,7 @@
           <a:p>
             <a:fld id="{5FCB60D4-54C9-4D27-9DD7-47BA08F3328E}" type="slidenum">
               <a:rPr lang="de-DE" smtClean="0"/>
-              <a:t>8</a:t>
+              <a:t>7</a:t>
             </a:fld>
             <a:endParaRPr lang="de-DE" dirty="0"/>
           </a:p>
@@ -973,7 +1205,7 @@
     </p:spTree>
     <p:extLst>
       <p:ext uri="{BB962C8B-B14F-4D97-AF65-F5344CB8AC3E}">
-        <p14:creationId xmlns:p14="http://schemas.microsoft.com/office/powerpoint/2010/main" val="1647780645"/>
+        <p14:creationId xmlns:p14="http://schemas.microsoft.com/office/powerpoint/2010/main" val="545087587"/>
       </p:ext>
     </p:extLst>
   </p:cSld>
@@ -1027,43 +1259,85 @@
           <a:bodyPr/>
           <a:lstStyle/>
           <a:p>
-            <a:pPr marL="228600" indent="-228600">
-              <a:buFont typeface="+mj-lt"/>
-              <a:buAutoNum type="arabicPeriod"/>
+            <a:r>
+              <a:rPr lang="de-DE" dirty="0" smtClean="0"/>
+              <a:t>Freiheitsgrade:</a:t>
+            </a:r>
+            <a:r>
+              <a:rPr lang="de-DE" baseline="0" dirty="0" smtClean="0"/>
+              <a:t> Schulter 3, (Höhe, Seite, Rotation des Oberarmes)</a:t>
+            </a:r>
+          </a:p>
+          <a:p>
+            <a:r>
+              <a:rPr lang="de-DE" baseline="0" dirty="0" smtClean="0"/>
+              <a:t>Zu 1. Rokkyu, Kote Gaeshi. Nicht die Schmerzeinwirkung ist entscheidend, sondern die Struktur</a:t>
+            </a:r>
+          </a:p>
+          <a:p>
+            <a:endParaRPr lang="de-DE" baseline="0" dirty="0" smtClean="0"/>
+          </a:p>
+          <a:p>
+            <a:r>
+              <a:rPr lang="de-DE" baseline="0" dirty="0" smtClean="0"/>
+              <a:t>Zu 2. Shihonage, Irimi Nage, Kaitennage</a:t>
+            </a:r>
+            <a:r>
+              <a:rPr lang="de-DE" dirty="0" smtClean="0"/>
+              <a:t>.</a:t>
+            </a:r>
+          </a:p>
+          <a:p>
+            <a:endParaRPr lang="de-DE" dirty="0"/>
+          </a:p>
+          <a:p>
+            <a:pPr marL="0" lvl="1">
+              <a:defRPr/>
             </a:pPr>
             <a:r>
               <a:rPr lang="de-DE" dirty="0" smtClean="0"/>
-              <a:t>Das</a:t>
-            </a:r>
-            <a:r>
-              <a:rPr lang="de-DE" baseline="0" dirty="0" smtClean="0"/>
-              <a:t> gilt auch für eigenen Körper! Man muss Kraft aufwenden, um sich in Bewegung zu setzen, aber auch um die Bewegung zu beenden.</a:t>
-            </a:r>
-            <a:br>
-              <a:rPr lang="de-DE" baseline="0" dirty="0" smtClean="0"/>
-            </a:br>
-            <a:r>
-              <a:rPr lang="de-DE" baseline="0" dirty="0" smtClean="0"/>
-              <a:t>Man kann den Angreifer in Bewegung halten, wenn man die stoppende Kräfte neutralisiert</a:t>
-            </a:r>
-          </a:p>
-          <a:p>
-            <a:pPr marL="228600" indent="-228600">
-              <a:buFont typeface="+mj-lt"/>
-              <a:buAutoNum type="arabicPeriod"/>
+              <a:t>Kokyu: Diese </a:t>
+            </a:r>
+            <a:r>
+              <a:rPr lang="de-DE" dirty="0"/>
+              <a:t>natürliche Arm- und Handhaltung haben Sie beim Anschieben von einem Auto</a:t>
+            </a:r>
+            <a:r>
+              <a:rPr lang="de-DE" dirty="0" smtClean="0"/>
+              <a:t>!)</a:t>
+            </a:r>
+          </a:p>
+          <a:p>
+            <a:pPr marL="0" lvl="1">
+              <a:defRPr/>
             </a:pPr>
             <a:r>
-              <a:rPr lang="de-DE" baseline="0" dirty="0" smtClean="0"/>
-              <a:t>+3. Um doppelte Masse zu beschleunigen, braucht man doppelte Kraft. Mit einfacher Kraft ist die Beschleunigung halb so groß.</a:t>
-            </a:r>
-            <a:br>
-              <a:rPr lang="de-DE" baseline="0" dirty="0" smtClean="0"/>
-            </a:br>
-            <a:r>
-              <a:rPr lang="de-DE" baseline="0" dirty="0" smtClean="0"/>
-              <a:t>Man muss die Masse des Angreifers beachten! Die gleiche Kraft wirkt auch auf Aikidoka! Versucht man einen schweren Gegner zu stark zu beschleunigen kommt man evtl.. an eigene Grenzen!</a:t>
-            </a:r>
+              <a:rPr lang="de-DE" sz="1200" dirty="0" smtClean="0"/>
+              <a:t>Mittellinie:</a:t>
+            </a:r>
+            <a:r>
+              <a:rPr lang="de-DE" sz="1200" baseline="0" dirty="0" smtClean="0"/>
+              <a:t> </a:t>
+            </a:r>
+            <a:r>
+              <a:rPr lang="de-DE" sz="1200" dirty="0" smtClean="0"/>
+              <a:t>treffen Sie beim Arbeiten mit einer Axt</a:t>
+            </a:r>
+          </a:p>
+          <a:p>
+            <a:pPr marL="0" lvl="1">
+              <a:defRPr/>
+            </a:pPr>
+            <a:endParaRPr lang="de-DE" sz="1200" dirty="0" smtClean="0"/>
+          </a:p>
+          <a:p>
+            <a:pPr marL="0" lvl="1">
+              <a:defRPr/>
+            </a:pPr>
             <a:endParaRPr lang="de-DE" dirty="0"/>
+          </a:p>
+          <a:p>
+            <a:endParaRPr lang="de-DE" baseline="0" dirty="0" smtClean="0"/>
           </a:p>
         </p:txBody>
       </p:sp>
@@ -1084,7 +1358,7 @@
           <a:p>
             <a:fld id="{5FCB60D4-54C9-4D27-9DD7-47BA08F3328E}" type="slidenum">
               <a:rPr lang="de-DE" smtClean="0"/>
-              <a:t>9</a:t>
+              <a:t>8</a:t>
             </a:fld>
             <a:endParaRPr lang="de-DE" dirty="0"/>
           </a:p>
@@ -1093,7 +1367,7 @@
     </p:spTree>
     <p:extLst>
       <p:ext uri="{BB962C8B-B14F-4D97-AF65-F5344CB8AC3E}">
-        <p14:creationId xmlns:p14="http://schemas.microsoft.com/office/powerpoint/2010/main" val="3710346526"/>
+        <p14:creationId xmlns:p14="http://schemas.microsoft.com/office/powerpoint/2010/main" val="1647780645"/>
       </p:ext>
     </p:extLst>
   </p:cSld>
@@ -1147,6 +1421,42 @@
           <a:bodyPr/>
           <a:lstStyle/>
           <a:p>
+            <a:pPr marL="228600" indent="-228600">
+              <a:buFont typeface="+mj-lt"/>
+              <a:buAutoNum type="arabicPeriod"/>
+            </a:pPr>
+            <a:r>
+              <a:rPr lang="de-DE" dirty="0" smtClean="0"/>
+              <a:t>Das</a:t>
+            </a:r>
+            <a:r>
+              <a:rPr lang="de-DE" baseline="0" dirty="0" smtClean="0"/>
+              <a:t> gilt auch für eigenen Körper! Man muss Kraft aufwenden, um sich in Bewegung zu setzen, aber auch um die Bewegung zu beenden.</a:t>
+            </a:r>
+            <a:br>
+              <a:rPr lang="de-DE" baseline="0" dirty="0" smtClean="0"/>
+            </a:br>
+            <a:r>
+              <a:rPr lang="de-DE" baseline="0" dirty="0" smtClean="0"/>
+              <a:t>Man kann den Angreifer in Bewegung halten, wenn man die stoppende Kräfte neutralisiert</a:t>
+            </a:r>
+          </a:p>
+          <a:p>
+            <a:pPr marL="228600" indent="-228600">
+              <a:buFont typeface="+mj-lt"/>
+              <a:buAutoNum type="arabicPeriod"/>
+            </a:pPr>
+            <a:r>
+              <a:rPr lang="de-DE" baseline="0" dirty="0" smtClean="0"/>
+              <a:t>+3. Um doppelte Masse zu beschleunigen, braucht man doppelte Kraft. Mit einfacher Kraft ist die Beschleunigung halb so groß.</a:t>
+            </a:r>
+            <a:br>
+              <a:rPr lang="de-DE" baseline="0" dirty="0" smtClean="0"/>
+            </a:br>
+            <a:r>
+              <a:rPr lang="de-DE" baseline="0" dirty="0" smtClean="0"/>
+              <a:t>Man muss die Masse des Angreifers beachten! Die gleiche Kraft wirkt auch auf Aikidoka! Versucht man einen schweren Gegner zu stark zu beschleunigen kommt man evtl.. an eigene Grenzen!</a:t>
+            </a:r>
             <a:endParaRPr lang="de-DE" dirty="0"/>
           </a:p>
         </p:txBody>
@@ -1168,6 +1478,90 @@
           <a:p>
             <a:fld id="{5FCB60D4-54C9-4D27-9DD7-47BA08F3328E}" type="slidenum">
               <a:rPr lang="de-DE" smtClean="0"/>
+              <a:t>9</a:t>
+            </a:fld>
+            <a:endParaRPr lang="de-DE" dirty="0"/>
+          </a:p>
+        </p:txBody>
+      </p:sp>
+    </p:spTree>
+    <p:extLst>
+      <p:ext uri="{BB962C8B-B14F-4D97-AF65-F5344CB8AC3E}">
+        <p14:creationId xmlns:p14="http://schemas.microsoft.com/office/powerpoint/2010/main" val="3710346526"/>
+      </p:ext>
+    </p:extLst>
+  </p:cSld>
+  <p:clrMapOvr>
+    <a:masterClrMapping/>
+  </p:clrMapOvr>
+</p:notes>
+</file>
+
+<file path=ppt/notesSlides/notesSlide7.xml><?xml version="1.0" encoding="utf-8"?>
+<p:notes xmlns:a="http://schemas.openxmlformats.org/drawingml/2006/main" xmlns:r="http://schemas.openxmlformats.org/officeDocument/2006/relationships" xmlns:p="http://schemas.openxmlformats.org/presentationml/2006/main">
+  <p:cSld>
+    <p:spTree>
+      <p:nvGrpSpPr>
+        <p:cNvPr id="1" name=""/>
+        <p:cNvGrpSpPr/>
+        <p:nvPr/>
+      </p:nvGrpSpPr>
+      <p:grpSpPr>
+        <a:xfrm>
+          <a:off x="0" y="0"/>
+          <a:ext cx="0" cy="0"/>
+          <a:chOff x="0" y="0"/>
+          <a:chExt cx="0" cy="0"/>
+        </a:xfrm>
+      </p:grpSpPr>
+      <p:sp>
+        <p:nvSpPr>
+          <p:cNvPr id="2" name="Folienbildplatzhalter 1"/>
+          <p:cNvSpPr>
+            <a:spLocks noGrp="1" noRot="1" noChangeAspect="1"/>
+          </p:cNvSpPr>
+          <p:nvPr>
+            <p:ph type="sldImg"/>
+          </p:nvPr>
+        </p:nvSpPr>
+        <p:spPr/>
+      </p:sp>
+      <p:sp>
+        <p:nvSpPr>
+          <p:cNvPr id="3" name="Notizenplatzhalter 2"/>
+          <p:cNvSpPr>
+            <a:spLocks noGrp="1"/>
+          </p:cNvSpPr>
+          <p:nvPr>
+            <p:ph type="body" idx="1"/>
+          </p:nvPr>
+        </p:nvSpPr>
+        <p:spPr/>
+        <p:txBody>
+          <a:bodyPr/>
+          <a:lstStyle/>
+          <a:p>
+            <a:endParaRPr lang="de-DE" dirty="0"/>
+          </a:p>
+        </p:txBody>
+      </p:sp>
+      <p:sp>
+        <p:nvSpPr>
+          <p:cNvPr id="4" name="Foliennummernplatzhalter 3"/>
+          <p:cNvSpPr>
+            <a:spLocks noGrp="1"/>
+          </p:cNvSpPr>
+          <p:nvPr>
+            <p:ph type="sldNum" sz="quarter" idx="10"/>
+          </p:nvPr>
+        </p:nvSpPr>
+        <p:spPr/>
+        <p:txBody>
+          <a:bodyPr/>
+          <a:lstStyle/>
+          <a:p>
+            <a:fld id="{5FCB60D4-54C9-4D27-9DD7-47BA08F3328E}" type="slidenum">
+              <a:rPr lang="de-DE" smtClean="0"/>
               <a:t>10</a:t>
             </a:fld>
             <a:endParaRPr lang="de-DE" dirty="0"/>
@@ -1178,6 +1572,106 @@
     <p:extLst>
       <p:ext uri="{BB962C8B-B14F-4D97-AF65-F5344CB8AC3E}">
         <p14:creationId xmlns:p14="http://schemas.microsoft.com/office/powerpoint/2010/main" val="279119837"/>
+      </p:ext>
+    </p:extLst>
+  </p:cSld>
+  <p:clrMapOvr>
+    <a:masterClrMapping/>
+  </p:clrMapOvr>
+</p:notes>
+</file>
+
+<file path=ppt/notesSlides/notesSlide8.xml><?xml version="1.0" encoding="utf-8"?>
+<p:notes xmlns:a="http://schemas.openxmlformats.org/drawingml/2006/main" xmlns:r="http://schemas.openxmlformats.org/officeDocument/2006/relationships" xmlns:p="http://schemas.openxmlformats.org/presentationml/2006/main">
+  <p:cSld>
+    <p:spTree>
+      <p:nvGrpSpPr>
+        <p:cNvPr id="1" name=""/>
+        <p:cNvGrpSpPr/>
+        <p:nvPr/>
+      </p:nvGrpSpPr>
+      <p:grpSpPr>
+        <a:xfrm>
+          <a:off x="0" y="0"/>
+          <a:ext cx="0" cy="0"/>
+          <a:chOff x="0" y="0"/>
+          <a:chExt cx="0" cy="0"/>
+        </a:xfrm>
+      </p:grpSpPr>
+      <p:sp>
+        <p:nvSpPr>
+          <p:cNvPr id="2" name="Folienbildplatzhalter 1"/>
+          <p:cNvSpPr>
+            <a:spLocks noGrp="1" noRot="1" noChangeAspect="1"/>
+          </p:cNvSpPr>
+          <p:nvPr>
+            <p:ph type="sldImg"/>
+          </p:nvPr>
+        </p:nvSpPr>
+        <p:spPr/>
+      </p:sp>
+      <p:sp>
+        <p:nvSpPr>
+          <p:cNvPr id="3" name="Notizenplatzhalter 2"/>
+          <p:cNvSpPr>
+            <a:spLocks noGrp="1"/>
+          </p:cNvSpPr>
+          <p:nvPr>
+            <p:ph type="body" idx="1"/>
+          </p:nvPr>
+        </p:nvSpPr>
+        <p:spPr/>
+        <p:txBody>
+          <a:bodyPr/>
+          <a:lstStyle/>
+          <a:p>
+            <a:r>
+              <a:rPr lang="de-DE" dirty="0" smtClean="0"/>
+              <a:t>Experiment mit eine Schnur mit einem</a:t>
+            </a:r>
+            <a:r>
+              <a:rPr lang="de-DE" baseline="0" dirty="0" smtClean="0"/>
+              <a:t> </a:t>
+            </a:r>
+            <a:r>
+              <a:rPr lang="de-DE" dirty="0" smtClean="0"/>
+              <a:t>Gewicht</a:t>
+            </a:r>
+            <a:r>
+              <a:rPr lang="de-DE" baseline="0" dirty="0" smtClean="0"/>
+              <a:t> dran!</a:t>
+            </a:r>
+            <a:endParaRPr lang="de-DE" dirty="0"/>
+          </a:p>
+        </p:txBody>
+      </p:sp>
+      <p:sp>
+        <p:nvSpPr>
+          <p:cNvPr id="4" name="Foliennummernplatzhalter 3"/>
+          <p:cNvSpPr>
+            <a:spLocks noGrp="1"/>
+          </p:cNvSpPr>
+          <p:nvPr>
+            <p:ph type="sldNum" sz="quarter" idx="10"/>
+          </p:nvPr>
+        </p:nvSpPr>
+        <p:spPr/>
+        <p:txBody>
+          <a:bodyPr/>
+          <a:lstStyle/>
+          <a:p>
+            <a:fld id="{5FCB60D4-54C9-4D27-9DD7-47BA08F3328E}" type="slidenum">
+              <a:rPr lang="de-DE" smtClean="0"/>
+              <a:t>11</a:t>
+            </a:fld>
+            <a:endParaRPr lang="de-DE" dirty="0"/>
+          </a:p>
+        </p:txBody>
+      </p:sp>
+    </p:spTree>
+    <p:extLst>
+      <p:ext uri="{BB962C8B-B14F-4D97-AF65-F5344CB8AC3E}">
+        <p14:creationId xmlns:p14="http://schemas.microsoft.com/office/powerpoint/2010/main" val="979376755"/>
       </p:ext>
     </p:extLst>
   </p:cSld>
@@ -3136,87 +3630,102 @@
           </a:p>
         </p:txBody>
       </p:sp>
-      <p:sp>
-        <p:nvSpPr>
-          <p:cNvPr id="10" name="Ellipse 9"/>
-          <p:cNvSpPr/>
+      <p:grpSp>
+        <p:nvGrpSpPr>
+          <p:cNvPr id="2" name="Gruppieren 1"/>
+          <p:cNvGrpSpPr/>
           <p:nvPr/>
-        </p:nvSpPr>
-        <p:spPr>
+        </p:nvGrpSpPr>
+        <p:grpSpPr>
           <a:xfrm>
-            <a:off x="3815916" y="2502373"/>
-            <a:ext cx="1944216" cy="1944216"/>
+            <a:off x="467543" y="1556792"/>
+            <a:ext cx="4104456" cy="3888432"/>
+            <a:chOff x="1763688" y="558157"/>
+            <a:chExt cx="6048672" cy="5832648"/>
           </a:xfrm>
-          <a:prstGeom prst="ellipse">
-            <a:avLst/>
-          </a:prstGeom>
-        </p:spPr>
-        <p:style>
-          <a:lnRef idx="2">
-            <a:schemeClr val="accent6">
-              <a:shade val="50000"/>
-            </a:schemeClr>
-          </a:lnRef>
-          <a:fillRef idx="1">
-            <a:schemeClr val="accent6"/>
-          </a:fillRef>
-          <a:effectRef idx="0">
-            <a:schemeClr val="accent6"/>
-          </a:effectRef>
-          <a:fontRef idx="minor">
-            <a:schemeClr val="lt1"/>
-          </a:fontRef>
-        </p:style>
-        <p:txBody>
-          <a:bodyPr rtlCol="0" anchor="ctr"/>
-          <a:lstStyle/>
-          <a:p>
-            <a:pPr algn="ctr"/>
-            <a:endParaRPr lang="de-DE"/>
-          </a:p>
-        </p:txBody>
-      </p:sp>
-      <p:sp>
-        <p:nvSpPr>
-          <p:cNvPr id="11" name="Ellipse 10"/>
-          <p:cNvSpPr/>
-          <p:nvPr/>
-        </p:nvSpPr>
-        <p:spPr>
-          <a:xfrm>
-            <a:off x="1763688" y="558157"/>
-            <a:ext cx="6048672" cy="5832648"/>
-          </a:xfrm>
-          <a:prstGeom prst="ellipse">
-            <a:avLst/>
-          </a:prstGeom>
-          <a:noFill/>
-        </p:spPr>
-        <p:style>
-          <a:lnRef idx="2">
-            <a:schemeClr val="accent1">
-              <a:shade val="50000"/>
-            </a:schemeClr>
-          </a:lnRef>
-          <a:fillRef idx="1">
-            <a:schemeClr val="accent1"/>
-          </a:fillRef>
-          <a:effectRef idx="0">
-            <a:schemeClr val="accent1"/>
-          </a:effectRef>
-          <a:fontRef idx="minor">
-            <a:schemeClr val="lt1"/>
-          </a:fontRef>
-        </p:style>
-        <p:txBody>
-          <a:bodyPr rtlCol="0" anchor="ctr"/>
-          <a:lstStyle/>
-          <a:p>
-            <a:pPr algn="ctr"/>
-            <a:endParaRPr lang="de-DE"/>
-          </a:p>
-        </p:txBody>
-      </p:sp>
+        </p:grpSpPr>
+        <p:sp>
+          <p:nvSpPr>
+            <p:cNvPr id="10" name="Ellipse 9"/>
+            <p:cNvSpPr/>
+            <p:nvPr/>
+          </p:nvSpPr>
+          <p:spPr>
+            <a:xfrm>
+              <a:off x="3815916" y="2502373"/>
+              <a:ext cx="1944216" cy="1944216"/>
+            </a:xfrm>
+            <a:prstGeom prst="ellipse">
+              <a:avLst/>
+            </a:prstGeom>
+          </p:spPr>
+          <p:style>
+            <a:lnRef idx="2">
+              <a:schemeClr val="accent6">
+                <a:shade val="50000"/>
+              </a:schemeClr>
+            </a:lnRef>
+            <a:fillRef idx="1">
+              <a:schemeClr val="accent6"/>
+            </a:fillRef>
+            <a:effectRef idx="0">
+              <a:schemeClr val="accent6"/>
+            </a:effectRef>
+            <a:fontRef idx="minor">
+              <a:schemeClr val="lt1"/>
+            </a:fontRef>
+          </p:style>
+          <p:txBody>
+            <a:bodyPr rtlCol="0" anchor="ctr"/>
+            <a:lstStyle/>
+            <a:p>
+              <a:pPr algn="ctr"/>
+              <a:endParaRPr lang="de-DE"/>
+            </a:p>
+          </p:txBody>
+        </p:sp>
+        <p:sp>
+          <p:nvSpPr>
+            <p:cNvPr id="11" name="Ellipse 10"/>
+            <p:cNvSpPr/>
+            <p:nvPr/>
+          </p:nvSpPr>
+          <p:spPr>
+            <a:xfrm>
+              <a:off x="1763688" y="558157"/>
+              <a:ext cx="6048672" cy="5832648"/>
+            </a:xfrm>
+            <a:prstGeom prst="ellipse">
+              <a:avLst/>
+            </a:prstGeom>
+            <a:noFill/>
+          </p:spPr>
+          <p:style>
+            <a:lnRef idx="2">
+              <a:schemeClr val="accent1">
+                <a:shade val="50000"/>
+              </a:schemeClr>
+            </a:lnRef>
+            <a:fillRef idx="1">
+              <a:schemeClr val="accent1"/>
+            </a:fillRef>
+            <a:effectRef idx="0">
+              <a:schemeClr val="accent1"/>
+            </a:effectRef>
+            <a:fontRef idx="minor">
+              <a:schemeClr val="lt1"/>
+            </a:fontRef>
+          </p:style>
+          <p:txBody>
+            <a:bodyPr rtlCol="0" anchor="ctr"/>
+            <a:lstStyle/>
+            <a:p>
+              <a:pPr algn="ctr"/>
+              <a:endParaRPr lang="de-DE"/>
+            </a:p>
+          </p:txBody>
+        </p:sp>
+      </p:grpSp>
       <p:pic>
         <p:nvPicPr>
           <p:cNvPr id="9" name="Inhaltsplatzhalter 8"/>
@@ -3228,7 +3737,7 @@
           </p:nvPr>
         </p:nvPicPr>
         <p:blipFill>
-          <a:blip r:embed="rId2" cstate="print">
+          <a:blip r:embed="rId3" cstate="print">
             <a:extLst>
               <a:ext uri="{28A0092B-C50C-407E-A947-70E740481C1C}">
                 <a14:useLocalDpi xmlns:a14="http://schemas.microsoft.com/office/drawing/2010/main" val="0"/>
@@ -3241,11 +3750,444 @@
         </p:blipFill>
         <p:spPr>
           <a:xfrm>
-            <a:off x="1399757" y="2996952"/>
+            <a:off x="103612" y="3140283"/>
             <a:ext cx="727862" cy="721449"/>
           </a:xfrm>
         </p:spPr>
       </p:pic>
+      <p:pic>
+        <p:nvPicPr>
+          <p:cNvPr id="13" name="Inhaltsplatzhalter 5"/>
+          <p:cNvPicPr>
+            <a:picLocks noGrp="1" noChangeAspect="1"/>
+          </p:cNvPicPr>
+          <p:nvPr>
+            <p:ph idx="1"/>
+          </p:nvPr>
+        </p:nvPicPr>
+        <p:blipFill rotWithShape="1">
+          <a:blip r:embed="rId4">
+            <a:extLst>
+              <a:ext uri="{28A0092B-C50C-407E-A947-70E740481C1C}">
+                <a14:useLocalDpi xmlns:a14="http://schemas.microsoft.com/office/drawing/2010/main" val="0"/>
+              </a:ext>
+            </a:extLst>
+          </a:blip>
+          <a:srcRect l="9683" r="16070"/>
+          <a:stretch/>
+        </p:blipFill>
+        <p:spPr>
+          <a:xfrm>
+            <a:off x="4788024" y="1533947"/>
+            <a:ext cx="4171950" cy="4214242"/>
+          </a:xfrm>
+        </p:spPr>
+      </p:pic>
+      <mc:AlternateContent xmlns:mc="http://schemas.openxmlformats.org/markup-compatibility/2006">
+        <mc:Choice xmlns:a14="http://schemas.microsoft.com/office/drawing/2010/main" Requires="a14">
+          <p:sp>
+            <p:nvSpPr>
+              <p:cNvPr id="7" name="Textfeld 6"/>
+              <p:cNvSpPr txBox="1"/>
+              <p:nvPr/>
+            </p:nvSpPr>
+            <p:spPr>
+              <a:xfrm>
+                <a:off x="1346509" y="851298"/>
+                <a:ext cx="2346523" cy="584775"/>
+              </a:xfrm>
+              <a:prstGeom prst="rect">
+                <a:avLst/>
+              </a:prstGeom>
+              <a:noFill/>
+            </p:spPr>
+            <p:txBody>
+              <a:bodyPr wrap="square" rtlCol="0">
+                <a:spAutoFit/>
+              </a:bodyPr>
+              <a:lstStyle/>
+              <a:p>
+                <a14:m>
+                  <m:oMathPara xmlns:m="http://schemas.openxmlformats.org/officeDocument/2006/math">
+                    <m:oMathParaPr>
+                      <m:jc m:val="centerGroup"/>
+                    </m:oMathParaPr>
+                    <m:oMath xmlns:m="http://schemas.openxmlformats.org/officeDocument/2006/math">
+                      <m:r>
+                        <a:rPr lang="de-DE" sz="3200" b="0" i="1" smtClean="0">
+                          <a:latin typeface="Cambria Math"/>
+                        </a:rPr>
+                        <m:t>𝐿</m:t>
+                      </m:r>
+                      <m:r>
+                        <a:rPr lang="de-DE" sz="3200" b="0" i="1" smtClean="0">
+                          <a:latin typeface="Cambria Math"/>
+                        </a:rPr>
+                        <m:t>=</m:t>
+                      </m:r>
+                      <m:r>
+                        <a:rPr lang="de-DE" sz="3200" b="0" i="1" smtClean="0">
+                          <a:latin typeface="Cambria Math"/>
+                        </a:rPr>
+                        <m:t>𝑟</m:t>
+                      </m:r>
+                      <m:r>
+                        <a:rPr lang="de-DE" sz="3200" b="0" i="1" smtClean="0">
+                          <a:latin typeface="Cambria Math"/>
+                          <a:ea typeface="Cambria Math"/>
+                        </a:rPr>
+                        <m:t>∙</m:t>
+                      </m:r>
+                      <m:r>
+                        <a:rPr lang="de-DE" sz="3200" b="0" i="1" smtClean="0">
+                          <a:latin typeface="Cambria Math"/>
+                          <a:ea typeface="Cambria Math"/>
+                        </a:rPr>
+                        <m:t>𝑣</m:t>
+                      </m:r>
+                      <m:r>
+                        <a:rPr lang="de-DE" sz="3200" b="0" i="1" smtClean="0">
+                          <a:latin typeface="Cambria Math"/>
+                          <a:ea typeface="Cambria Math"/>
+                        </a:rPr>
+                        <m:t>∙</m:t>
+                      </m:r>
+                      <m:r>
+                        <a:rPr lang="de-DE" sz="3200" b="0" i="1" smtClean="0">
+                          <a:latin typeface="Cambria Math"/>
+                          <a:ea typeface="Cambria Math"/>
+                        </a:rPr>
+                        <m:t>𝑚</m:t>
+                      </m:r>
+                    </m:oMath>
+                  </m:oMathPara>
+                </a14:m>
+                <a:endParaRPr lang="de-DE" sz="3200" dirty="0"/>
+              </a:p>
+            </p:txBody>
+          </p:sp>
+        </mc:Choice>
+        <mc:Fallback>
+          <p:sp>
+            <p:nvSpPr>
+              <p:cNvPr id="7" name="Textfeld 6"/>
+              <p:cNvSpPr txBox="1">
+                <a:spLocks noRot="1" noChangeAspect="1" noMove="1" noResize="1" noEditPoints="1" noAdjustHandles="1" noChangeArrowheads="1" noChangeShapeType="1" noTextEdit="1"/>
+              </p:cNvSpPr>
+              <p:nvPr/>
+            </p:nvSpPr>
+            <p:spPr>
+              <a:xfrm>
+                <a:off x="1346509" y="851298"/>
+                <a:ext cx="2346523" cy="584775"/>
+              </a:xfrm>
+              <a:prstGeom prst="rect">
+                <a:avLst/>
+              </a:prstGeom>
+              <a:blipFill rotWithShape="1">
+                <a:blip r:embed="rId5"/>
+                <a:stretch>
+                  <a:fillRect/>
+                </a:stretch>
+              </a:blipFill>
+            </p:spPr>
+            <p:txBody>
+              <a:bodyPr/>
+              <a:lstStyle/>
+              <a:p>
+                <a:r>
+                  <a:rPr lang="de-DE">
+                    <a:noFill/>
+                  </a:rPr>
+                  <a:t> </a:t>
+                </a:r>
+              </a:p>
+            </p:txBody>
+          </p:sp>
+        </mc:Fallback>
+      </mc:AlternateContent>
+      <p:cxnSp>
+        <p:nvCxnSpPr>
+          <p:cNvPr id="14" name="Gerade Verbindung 13"/>
+          <p:cNvCxnSpPr/>
+          <p:nvPr/>
+        </p:nvCxnSpPr>
+        <p:spPr>
+          <a:xfrm>
+            <a:off x="467543" y="3501008"/>
+            <a:ext cx="2052228" cy="0"/>
+          </a:xfrm>
+          <a:prstGeom prst="line">
+            <a:avLst/>
+          </a:prstGeom>
+          <a:ln w="76200"/>
+        </p:spPr>
+        <p:style>
+          <a:lnRef idx="1">
+            <a:schemeClr val="accent1"/>
+          </a:lnRef>
+          <a:fillRef idx="0">
+            <a:schemeClr val="accent1"/>
+          </a:fillRef>
+          <a:effectRef idx="0">
+            <a:schemeClr val="accent1"/>
+          </a:effectRef>
+          <a:fontRef idx="minor">
+            <a:schemeClr val="tx1"/>
+          </a:fontRef>
+        </p:style>
+      </p:cxnSp>
+      <mc:AlternateContent xmlns:mc="http://schemas.openxmlformats.org/markup-compatibility/2006">
+        <mc:Choice xmlns:a14="http://schemas.microsoft.com/office/drawing/2010/main" Requires="a14">
+          <p:sp>
+            <p:nvSpPr>
+              <p:cNvPr id="15" name="Rechteck 14"/>
+              <p:cNvSpPr/>
+              <p:nvPr/>
+            </p:nvSpPr>
+            <p:spPr>
+              <a:xfrm>
+                <a:off x="1234355" y="2924944"/>
+                <a:ext cx="518604" cy="646331"/>
+              </a:xfrm>
+              <a:prstGeom prst="rect">
+                <a:avLst/>
+              </a:prstGeom>
+            </p:spPr>
+            <p:txBody>
+              <a:bodyPr wrap="none">
+                <a:spAutoFit/>
+              </a:bodyPr>
+              <a:lstStyle/>
+              <a:p>
+                <a14:m>
+                  <m:oMathPara xmlns:m="http://schemas.openxmlformats.org/officeDocument/2006/math">
+                    <m:oMathParaPr>
+                      <m:jc m:val="centerGroup"/>
+                    </m:oMathParaPr>
+                    <m:oMath xmlns:m="http://schemas.openxmlformats.org/officeDocument/2006/math">
+                      <m:r>
+                        <a:rPr lang="de-DE" sz="3600" i="1">
+                          <a:latin typeface="Cambria Math"/>
+                        </a:rPr>
+                        <m:t>𝑟</m:t>
+                      </m:r>
+                    </m:oMath>
+                  </m:oMathPara>
+                </a14:m>
+                <a:endParaRPr lang="de-DE" sz="3600" dirty="0"/>
+              </a:p>
+            </p:txBody>
+          </p:sp>
+        </mc:Choice>
+        <mc:Fallback>
+          <p:sp>
+            <p:nvSpPr>
+              <p:cNvPr id="15" name="Rechteck 14"/>
+              <p:cNvSpPr>
+                <a:spLocks noRot="1" noChangeAspect="1" noMove="1" noResize="1" noEditPoints="1" noAdjustHandles="1" noChangeArrowheads="1" noChangeShapeType="1" noTextEdit="1"/>
+              </p:cNvSpPr>
+              <p:nvPr/>
+            </p:nvSpPr>
+            <p:spPr>
+              <a:xfrm>
+                <a:off x="1234355" y="2924944"/>
+                <a:ext cx="518604" cy="646331"/>
+              </a:xfrm>
+              <a:prstGeom prst="rect">
+                <a:avLst/>
+              </a:prstGeom>
+              <a:blipFill rotWithShape="1">
+                <a:blip r:embed="rId6"/>
+                <a:stretch>
+                  <a:fillRect/>
+                </a:stretch>
+              </a:blipFill>
+            </p:spPr>
+            <p:txBody>
+              <a:bodyPr/>
+              <a:lstStyle/>
+              <a:p>
+                <a:r>
+                  <a:rPr lang="de-DE">
+                    <a:noFill/>
+                  </a:rPr>
+                  <a:t> </a:t>
+                </a:r>
+              </a:p>
+            </p:txBody>
+          </p:sp>
+        </mc:Fallback>
+      </mc:AlternateContent>
+      <p:cxnSp>
+        <p:nvCxnSpPr>
+          <p:cNvPr id="17" name="Gerade Verbindung mit Pfeil 16"/>
+          <p:cNvCxnSpPr/>
+          <p:nvPr/>
+        </p:nvCxnSpPr>
+        <p:spPr>
+          <a:xfrm>
+            <a:off x="467543" y="3501008"/>
+            <a:ext cx="0" cy="1296144"/>
+          </a:xfrm>
+          <a:prstGeom prst="straightConnector1">
+            <a:avLst/>
+          </a:prstGeom>
+          <a:ln w="76200">
+            <a:solidFill>
+              <a:srgbClr val="C00000"/>
+            </a:solidFill>
+            <a:tailEnd type="arrow"/>
+          </a:ln>
+        </p:spPr>
+        <p:style>
+          <a:lnRef idx="1">
+            <a:schemeClr val="accent1"/>
+          </a:lnRef>
+          <a:fillRef idx="0">
+            <a:schemeClr val="accent1"/>
+          </a:fillRef>
+          <a:effectRef idx="0">
+            <a:schemeClr val="accent1"/>
+          </a:effectRef>
+          <a:fontRef idx="minor">
+            <a:schemeClr val="tx1"/>
+          </a:fontRef>
+        </p:style>
+      </p:cxnSp>
+      <mc:AlternateContent xmlns:mc="http://schemas.openxmlformats.org/markup-compatibility/2006">
+        <mc:Choice xmlns:a14="http://schemas.microsoft.com/office/drawing/2010/main" Requires="a14">
+          <p:sp>
+            <p:nvSpPr>
+              <p:cNvPr id="18" name="Rechteck 17"/>
+              <p:cNvSpPr/>
+              <p:nvPr/>
+            </p:nvSpPr>
+            <p:spPr>
+              <a:xfrm>
+                <a:off x="467543" y="3825914"/>
+                <a:ext cx="554062" cy="646331"/>
+              </a:xfrm>
+              <a:prstGeom prst="rect">
+                <a:avLst/>
+              </a:prstGeom>
+            </p:spPr>
+            <p:txBody>
+              <a:bodyPr wrap="none">
+                <a:spAutoFit/>
+              </a:bodyPr>
+              <a:lstStyle/>
+              <a:p>
+                <a14:m>
+                  <m:oMathPara xmlns:m="http://schemas.openxmlformats.org/officeDocument/2006/math">
+                    <m:oMathParaPr>
+                      <m:jc m:val="centerGroup"/>
+                    </m:oMathParaPr>
+                    <m:oMath xmlns:m="http://schemas.openxmlformats.org/officeDocument/2006/math">
+                      <m:r>
+                        <a:rPr lang="de-DE" sz="3600" b="0" i="1" smtClean="0">
+                          <a:solidFill>
+                            <a:srgbClr val="C00000"/>
+                          </a:solidFill>
+                          <a:latin typeface="Cambria Math"/>
+                        </a:rPr>
+                        <m:t>𝑣</m:t>
+                      </m:r>
+                    </m:oMath>
+                  </m:oMathPara>
+                </a14:m>
+                <a:endParaRPr lang="de-DE" sz="3600" dirty="0">
+                  <a:solidFill>
+                    <a:srgbClr val="C00000"/>
+                  </a:solidFill>
+                </a:endParaRPr>
+              </a:p>
+            </p:txBody>
+          </p:sp>
+        </mc:Choice>
+        <mc:Fallback>
+          <p:sp>
+            <p:nvSpPr>
+              <p:cNvPr id="18" name="Rechteck 17"/>
+              <p:cNvSpPr>
+                <a:spLocks noRot="1" noChangeAspect="1" noMove="1" noResize="1" noEditPoints="1" noAdjustHandles="1" noChangeArrowheads="1" noChangeShapeType="1" noTextEdit="1"/>
+              </p:cNvSpPr>
+              <p:nvPr/>
+            </p:nvSpPr>
+            <p:spPr>
+              <a:xfrm>
+                <a:off x="467543" y="3825914"/>
+                <a:ext cx="554062" cy="646331"/>
+              </a:xfrm>
+              <a:prstGeom prst="rect">
+                <a:avLst/>
+              </a:prstGeom>
+              <a:blipFill rotWithShape="1">
+                <a:blip r:embed="rId7"/>
+                <a:stretch>
+                  <a:fillRect/>
+                </a:stretch>
+              </a:blipFill>
+            </p:spPr>
+            <p:txBody>
+              <a:bodyPr/>
+              <a:lstStyle/>
+              <a:p>
+                <a:r>
+                  <a:rPr lang="de-DE">
+                    <a:noFill/>
+                  </a:rPr>
+                  <a:t> </a:t>
+                </a:r>
+              </a:p>
+            </p:txBody>
+          </p:sp>
+        </mc:Fallback>
+      </mc:AlternateContent>
+      <p:sp>
+        <p:nvSpPr>
+          <p:cNvPr id="19" name="Textfeld 18"/>
+          <p:cNvSpPr txBox="1"/>
+          <p:nvPr/>
+        </p:nvSpPr>
+        <p:spPr>
+          <a:xfrm>
+            <a:off x="4372181" y="789742"/>
+            <a:ext cx="4771819" cy="954107"/>
+          </a:xfrm>
+          <a:prstGeom prst="rect">
+            <a:avLst/>
+          </a:prstGeom>
+          <a:noFill/>
+        </p:spPr>
+        <p:txBody>
+          <a:bodyPr wrap="none" rtlCol="0">
+            <a:spAutoFit/>
+          </a:bodyPr>
+          <a:lstStyle/>
+          <a:p>
+            <a:r>
+              <a:rPr lang="de-DE" sz="2800" dirty="0" smtClean="0"/>
+              <a:t>Viele </a:t>
+            </a:r>
+            <a:r>
+              <a:rPr lang="de-DE" sz="2800" dirty="0" err="1" smtClean="0"/>
+              <a:t>Aikidotechniken</a:t>
+            </a:r>
+            <a:r>
+              <a:rPr lang="de-DE" sz="2800" dirty="0" smtClean="0"/>
+              <a:t> werden </a:t>
+            </a:r>
+            <a:br>
+              <a:rPr lang="de-DE" sz="2800" dirty="0" smtClean="0"/>
+            </a:br>
+            <a:r>
+              <a:rPr lang="de-DE" sz="2800" dirty="0" smtClean="0"/>
+              <a:t>auf einer Spiralbahn ausgeführt</a:t>
+            </a:r>
+          </a:p>
+        </p:txBody>
+      </p:sp>
     </p:spTree>
     <p:extLst>
       <p:ext uri="{BB962C8B-B14F-4D97-AF65-F5344CB8AC3E}">
@@ -3256,6 +4198,13 @@
   <p:clrMapOvr>
     <a:masterClrMapping/>
   </p:clrMapOvr>
+  <p:timing>
+    <p:tnLst>
+      <p:par>
+        <p:cTn id="1" dur="indefinite" restart="never" nodeType="tmRoot"/>
+      </p:par>
+    </p:tnLst>
+  </p:timing>
 </p:sld>
 </file>
 
@@ -3276,79 +4225,9 @@
           <a:chExt cx="0" cy="0"/>
         </a:xfrm>
       </p:grpSpPr>
-      <p:sp>
-        <p:nvSpPr>
-          <p:cNvPr id="3" name="Titel 2"/>
-          <p:cNvSpPr>
-            <a:spLocks noGrp="1"/>
-          </p:cNvSpPr>
-          <p:nvPr>
-            <p:ph type="title"/>
-          </p:nvPr>
-        </p:nvSpPr>
-        <p:spPr/>
-        <p:txBody>
-          <a:bodyPr>
-            <a:normAutofit fontScale="90000"/>
-          </a:bodyPr>
-          <a:lstStyle/>
-          <a:p>
-            <a:r>
-              <a:rPr lang="de-DE" dirty="0"/>
-              <a:t>Drehimpulserhaltung</a:t>
-            </a:r>
-          </a:p>
-        </p:txBody>
-      </p:sp>
-      <p:sp>
-        <p:nvSpPr>
-          <p:cNvPr id="4" name="Datumsplatzhalter 3"/>
-          <p:cNvSpPr>
-            <a:spLocks noGrp="1"/>
-          </p:cNvSpPr>
-          <p:nvPr>
-            <p:ph type="dt" sz="half" idx="2"/>
-          </p:nvPr>
-        </p:nvSpPr>
-        <p:spPr/>
-        <p:txBody>
-          <a:bodyPr/>
-          <a:lstStyle/>
-          <a:p>
-            <a:r>
-              <a:rPr lang="de-DE" smtClean="0"/>
-              <a:t>A. Kessler,  J. Schmidt,  K. Schergaut </a:t>
-            </a:r>
-            <a:endParaRPr lang="de-DE" dirty="0"/>
-          </a:p>
-        </p:txBody>
-      </p:sp>
-      <p:sp>
-        <p:nvSpPr>
-          <p:cNvPr id="5" name="Fußzeilenplatzhalter 4"/>
-          <p:cNvSpPr>
-            <a:spLocks noGrp="1"/>
-          </p:cNvSpPr>
-          <p:nvPr>
-            <p:ph type="ftr" sz="quarter" idx="3"/>
-          </p:nvPr>
-        </p:nvSpPr>
-        <p:spPr/>
-        <p:txBody>
-          <a:bodyPr/>
-          <a:lstStyle/>
-          <a:p>
-            <a:r>
-              <a:rPr lang="de-DE" smtClean="0"/>
-              <a:t>Physik in der Kampfkunst Aikido                                http://www.uni-jena.de/aikido</a:t>
-            </a:r>
-            <a:endParaRPr lang="de-DE" dirty="0"/>
-          </a:p>
-        </p:txBody>
-      </p:sp>
       <p:pic>
         <p:nvPicPr>
-          <p:cNvPr id="6" name="Inhaltsplatzhalter 5"/>
+          <p:cNvPr id="9" name="Inhaltsplatzhalter 8"/>
           <p:cNvPicPr>
             <a:picLocks noGrp="1" noChangeAspect="1"/>
           </p:cNvPicPr>
@@ -3370,11 +4249,170 @@
         </p:blipFill>
         <p:spPr>
           <a:xfrm>
-            <a:off x="1714500" y="1429544"/>
-            <a:ext cx="5715000" cy="4286250"/>
+            <a:off x="395536" y="1225554"/>
+            <a:ext cx="4032448" cy="4795734"/>
           </a:xfrm>
         </p:spPr>
       </p:pic>
+      <p:sp>
+        <p:nvSpPr>
+          <p:cNvPr id="3" name="Titel 2"/>
+          <p:cNvSpPr>
+            <a:spLocks noGrp="1"/>
+          </p:cNvSpPr>
+          <p:nvPr>
+            <p:ph type="title"/>
+          </p:nvPr>
+        </p:nvSpPr>
+        <p:spPr/>
+        <p:txBody>
+          <a:bodyPr>
+            <a:normAutofit fontScale="90000"/>
+          </a:bodyPr>
+          <a:lstStyle/>
+          <a:p>
+            <a:r>
+              <a:rPr lang="de-DE" dirty="0"/>
+              <a:t>Drehimpulserhaltung</a:t>
+            </a:r>
+          </a:p>
+        </p:txBody>
+      </p:sp>
+      <p:sp>
+        <p:nvSpPr>
+          <p:cNvPr id="4" name="Datumsplatzhalter 3"/>
+          <p:cNvSpPr>
+            <a:spLocks noGrp="1"/>
+          </p:cNvSpPr>
+          <p:nvPr>
+            <p:ph type="dt" sz="half" idx="2"/>
+          </p:nvPr>
+        </p:nvSpPr>
+        <p:spPr/>
+        <p:txBody>
+          <a:bodyPr/>
+          <a:lstStyle/>
+          <a:p>
+            <a:r>
+              <a:rPr lang="de-DE" smtClean="0"/>
+              <a:t>A. Kessler,  J. Schmidt,  K. Schergaut </a:t>
+            </a:r>
+            <a:endParaRPr lang="de-DE" dirty="0"/>
+          </a:p>
+        </p:txBody>
+      </p:sp>
+      <p:sp>
+        <p:nvSpPr>
+          <p:cNvPr id="5" name="Fußzeilenplatzhalter 4"/>
+          <p:cNvSpPr>
+            <a:spLocks noGrp="1"/>
+          </p:cNvSpPr>
+          <p:nvPr>
+            <p:ph type="ftr" sz="quarter" idx="3"/>
+          </p:nvPr>
+        </p:nvSpPr>
+        <p:spPr/>
+        <p:txBody>
+          <a:bodyPr/>
+          <a:lstStyle/>
+          <a:p>
+            <a:r>
+              <a:rPr lang="de-DE" smtClean="0"/>
+              <a:t>Physik in der Kampfkunst Aikido                                http://www.uni-jena.de/aikido</a:t>
+            </a:r>
+            <a:endParaRPr lang="de-DE" dirty="0"/>
+          </a:p>
+        </p:txBody>
+      </p:sp>
+      <p:sp>
+        <p:nvSpPr>
+          <p:cNvPr id="7" name="Inhaltsplatzhalter 6"/>
+          <p:cNvSpPr>
+            <a:spLocks noGrp="1"/>
+          </p:cNvSpPr>
+          <p:nvPr>
+            <p:ph idx="10"/>
+          </p:nvPr>
+        </p:nvSpPr>
+        <p:spPr/>
+        <p:txBody>
+          <a:bodyPr/>
+          <a:lstStyle/>
+          <a:p>
+            <a:r>
+              <a:rPr lang="de-DE" dirty="0" err="1"/>
+              <a:t>Eiskunstläfuereffekt</a:t>
+            </a:r>
+            <a:endParaRPr lang="de-DE" dirty="0"/>
+          </a:p>
+        </p:txBody>
+      </p:sp>
+      <p:pic>
+        <p:nvPicPr>
+          <p:cNvPr id="10" name="Inhaltsplatzhalter 9"/>
+          <p:cNvPicPr>
+            <a:picLocks noGrp="1" noChangeAspect="1"/>
+          </p:cNvPicPr>
+          <p:nvPr>
+            <p:ph idx="11"/>
+          </p:nvPr>
+        </p:nvPicPr>
+        <p:blipFill>
+          <a:blip r:embed="rId3">
+            <a:extLst>
+              <a:ext uri="{28A0092B-C50C-407E-A947-70E740481C1C}">
+                <a14:useLocalDpi xmlns:a14="http://schemas.microsoft.com/office/drawing/2010/main" val="0"/>
+              </a:ext>
+            </a:extLst>
+          </a:blip>
+          <a:stretch>
+            <a:fillRect/>
+          </a:stretch>
+        </p:blipFill>
+        <p:spPr>
+          <a:xfrm>
+            <a:off x="5076056" y="1484784"/>
+            <a:ext cx="3877227" cy="4569590"/>
+          </a:xfrm>
+        </p:spPr>
+      </p:pic>
+      <p:sp>
+        <p:nvSpPr>
+          <p:cNvPr id="11" name="Textfeld 10"/>
+          <p:cNvSpPr txBox="1"/>
+          <p:nvPr/>
+        </p:nvSpPr>
+        <p:spPr>
+          <a:xfrm>
+            <a:off x="755576" y="6165304"/>
+            <a:ext cx="4442563" cy="369332"/>
+          </a:xfrm>
+          <a:prstGeom prst="rect">
+            <a:avLst/>
+          </a:prstGeom>
+          <a:noFill/>
+        </p:spPr>
+        <p:txBody>
+          <a:bodyPr wrap="none" rtlCol="0">
+            <a:spAutoFit/>
+          </a:bodyPr>
+          <a:lstStyle/>
+          <a:p>
+            <a:r>
+              <a:rPr lang="de-DE" dirty="0"/>
+              <a:t>(Bilder </a:t>
+            </a:r>
+            <a:r>
+              <a:rPr lang="de-DE" dirty="0" smtClean="0"/>
+              <a:t>vom: </a:t>
+            </a:r>
+            <a:r>
+              <a:rPr lang="de-DE" dirty="0"/>
+              <a:t>http://www.einstein-online.info)</a:t>
+            </a:r>
+          </a:p>
+        </p:txBody>
+      </p:sp>
     </p:spTree>
     <p:extLst>
       <p:ext uri="{BB962C8B-B14F-4D97-AF65-F5344CB8AC3E}">
@@ -3385,6 +4423,13 @@
   <p:clrMapOvr>
     <a:masterClrMapping/>
   </p:clrMapOvr>
+  <p:timing>
+    <p:tnLst>
+      <p:par>
+        <p:cTn id="1" dur="indefinite" restart="never" nodeType="tmRoot"/>
+      </p:par>
+    </p:tnLst>
+  </p:timing>
 </p:sld>
 </file>
 
@@ -4172,11 +5217,11 @@
               <a:buChar char="•"/>
             </a:pPr>
             <a:r>
-              <a:rPr lang="de-DE" sz="4000" dirty="0" smtClean="0"/>
+              <a:rPr lang="de-DE" sz="3200" dirty="0" smtClean="0"/>
               <a:t>Ueshiba, Morihei (O-Sensei)</a:t>
             </a:r>
             <a:br>
-              <a:rPr lang="de-DE" sz="4000" dirty="0" smtClean="0"/>
+              <a:rPr lang="de-DE" sz="3200" dirty="0" smtClean="0"/>
             </a:br>
             <a:r>
               <a:rPr lang="de-DE" sz="2400" dirty="0" smtClean="0"/>
@@ -4192,7 +5237,7 @@
               <a:buChar char="•"/>
             </a:pPr>
             <a:r>
-              <a:rPr lang="de-DE" sz="4000" dirty="0" smtClean="0"/>
+              <a:rPr lang="de-DE" sz="3200" dirty="0" smtClean="0"/>
               <a:t>Exzellenter Budo Experte</a:t>
             </a:r>
           </a:p>
@@ -4205,16 +5250,59 @@
               <a:buChar char="•"/>
             </a:pPr>
             <a:r>
-              <a:rPr lang="de-DE" sz="4000" dirty="0" smtClean="0"/>
-              <a:t>Synthese aus verschiedenen </a:t>
+              <a:rPr lang="de-DE" sz="3200" dirty="0" smtClean="0"/>
+              <a:t>Aikido wurde beeinflusst durch:</a:t>
+            </a:r>
+            <a:r>
+              <a:rPr lang="de-DE" sz="3200" dirty="0"/>
+              <a:t/>
             </a:r>
             <a:br>
-              <a:rPr lang="de-DE" sz="4000" dirty="0" smtClean="0"/>
+              <a:rPr lang="de-DE" sz="3200" dirty="0"/>
             </a:br>
             <a:r>
-              <a:rPr lang="de-DE" sz="4000" dirty="0" smtClean="0"/>
-              <a:t>Kampfkünsten</a:t>
-            </a:r>
+              <a:rPr lang="de-DE" sz="3200" i="1" dirty="0" err="1"/>
+              <a:t>Daitō-ryū</a:t>
+            </a:r>
+            <a:r>
+              <a:rPr lang="de-DE" sz="3200" i="1" dirty="0"/>
+              <a:t> </a:t>
+            </a:r>
+            <a:r>
+              <a:rPr lang="de-DE" sz="3200" i="1" dirty="0" err="1"/>
+              <a:t>aiki-jūjutsu</a:t>
+            </a:r>
+            <a:r>
+              <a:rPr lang="de-DE" sz="3200" i="1" dirty="0"/>
+              <a:t/>
+            </a:r>
+            <a:br>
+              <a:rPr lang="de-DE" sz="3200" i="1" dirty="0"/>
+            </a:br>
+            <a:r>
+              <a:rPr lang="de-DE" sz="3200" i="1" dirty="0" smtClean="0"/>
+              <a:t>Ken </a:t>
+            </a:r>
+            <a:r>
+              <a:rPr lang="de-DE" sz="3200" i="1" dirty="0" err="1" smtClean="0"/>
+              <a:t>Jutsu</a:t>
+            </a:r>
+            <a:r>
+              <a:rPr lang="de-DE" sz="3200" i="1" dirty="0"/>
+              <a:t/>
+            </a:r>
+            <a:br>
+              <a:rPr lang="de-DE" sz="3200" i="1" dirty="0"/>
+            </a:br>
+            <a:r>
+              <a:rPr lang="de-DE" sz="3200" i="1" dirty="0" smtClean="0"/>
+              <a:t>Jodo </a:t>
+            </a:r>
+            <a:r>
+              <a:rPr lang="de-DE" sz="3200" dirty="0" smtClean="0"/>
+              <a:t>und weiteren Kampfkünsten</a:t>
+            </a:r>
+            <a:endParaRPr lang="de-DE" sz="3200" dirty="0" smtClean="0"/>
           </a:p>
           <a:p>
             <a:pPr marL="285750" indent="-285750">
@@ -4225,7 +5313,7 @@
               <a:buChar char="•"/>
             </a:pPr>
             <a:r>
-              <a:rPr lang="de-DE" sz="4000" b="1" i="1" dirty="0" smtClean="0">
+              <a:rPr lang="de-DE" sz="3200" b="1" i="1" dirty="0" smtClean="0">
                 <a:solidFill>
                   <a:srgbClr val="C00000"/>
                 </a:solidFill>
@@ -4240,7 +5328,7 @@
               </a:spcBef>
             </a:pPr>
             <a:r>
-              <a:rPr lang="de-DE" sz="4000" b="1" i="1" dirty="0" smtClean="0">
+              <a:rPr lang="de-DE" sz="3200" b="1" i="1" dirty="0" smtClean="0">
                 <a:solidFill>
                   <a:srgbClr val="C00000"/>
                 </a:solidFill>
@@ -4248,14 +5336,14 @@
               <a:t>Neutralisiere, füge aber </a:t>
             </a:r>
             <a:br>
-              <a:rPr lang="de-DE" sz="4000" b="1" i="1" dirty="0" smtClean="0">
+              <a:rPr lang="de-DE" sz="3200" b="1" i="1" dirty="0" smtClean="0">
                 <a:solidFill>
                   <a:srgbClr val="C00000"/>
                 </a:solidFill>
               </a:rPr>
             </a:br>
             <a:r>
-              <a:rPr lang="de-DE" sz="4000" b="1" i="1" dirty="0" smtClean="0">
+              <a:rPr lang="de-DE" sz="3200" b="1" i="1" dirty="0" smtClean="0">
                 <a:solidFill>
                   <a:srgbClr val="C00000"/>
                 </a:solidFill>
@@ -4579,7 +5667,7 @@
           <p:nvPr/>
         </p:nvPicPr>
         <p:blipFill>
-          <a:blip r:embed="rId2">
+          <a:blip r:embed="rId3">
             <a:extLst>
               <a:ext uri="{28A0092B-C50C-407E-A947-70E740481C1C}">
                 <a14:useLocalDpi xmlns:a14="http://schemas.microsoft.com/office/drawing/2010/main" val="0"/>
@@ -5063,7 +6151,7 @@
           <p:nvPr/>
         </p:nvPicPr>
         <p:blipFill>
-          <a:blip r:embed="rId3" cstate="print">
+          <a:blip r:embed="rId4" cstate="print">
             <a:extLst>
               <a:ext uri="{28A0092B-C50C-407E-A947-70E740481C1C}">
                 <a14:useLocalDpi xmlns:a14="http://schemas.microsoft.com/office/drawing/2010/main" val="0"/>
@@ -5095,7 +6183,7 @@
           </p:nvPr>
         </p:nvPicPr>
         <p:blipFill>
-          <a:blip r:embed="rId4">
+          <a:blip r:embed="rId5">
             <a:extLst>
               <a:ext uri="{28A0092B-C50C-407E-A947-70E740481C1C}">
                 <a14:useLocalDpi xmlns:a14="http://schemas.microsoft.com/office/drawing/2010/main" val="0"/>
@@ -5341,6 +6429,9 @@
                     <p:cTn id="3" fill="hold">
                       <p:stCondLst>
                         <p:cond delay="indefinite"/>
+                        <p:cond evt="onBegin" delay="0">
+                          <p:tn val="2"/>
+                        </p:cond>
                       </p:stCondLst>
                       <p:childTnLst>
                         <p:par>
@@ -5350,7 +6441,7 @@
                             </p:stCondLst>
                             <p:childTnLst>
                               <p:par>
-                                <p:cTn id="5" presetID="1" presetClass="entr" presetSubtype="0" fill="hold" nodeType="clickEffect">
+                                <p:cTn id="5" presetID="1" presetClass="entr" presetSubtype="0" fill="hold" grpId="0" nodeType="withEffect">
                                   <p:stCondLst>
                                     <p:cond delay="0"/>
                                   </p:stCondLst>
@@ -5358,33 +6449,6 @@
                                     <p:set>
                                       <p:cBhvr>
                                         <p:cTn id="6" dur="1" fill="hold">
-                                          <p:stCondLst>
-                                            <p:cond delay="0"/>
-                                          </p:stCondLst>
-                                        </p:cTn>
-                                        <p:tgtEl>
-                                          <p:spTgt spid="19"/>
-                                        </p:tgtEl>
-                                        <p:attrNameLst>
-                                          <p:attrName>style.visibility</p:attrName>
-                                        </p:attrNameLst>
-                                      </p:cBhvr>
-                                      <p:to>
-                                        <p:strVal val="visible"/>
-                                      </p:to>
-                                    </p:set>
-                                  </p:childTnLst>
-                                </p:cTn>
-                              </p:par>
-                              <p:par>
-                                <p:cTn id="7" presetID="1" presetClass="entr" presetSubtype="0" fill="hold" grpId="0" nodeType="withEffect">
-                                  <p:stCondLst>
-                                    <p:cond delay="0"/>
-                                  </p:stCondLst>
-                                  <p:childTnLst>
-                                    <p:set>
-                                      <p:cBhvr>
-                                        <p:cTn id="8" dur="1" fill="hold">
                                           <p:stCondLst>
                                             <p:cond delay="0"/>
                                           </p:stCondLst>
@@ -5410,26 +6474,26 @@
                     </p:cTn>
                   </p:par>
                   <p:par>
-                    <p:cTn id="9" fill="hold">
+                    <p:cTn id="7" fill="hold">
                       <p:stCondLst>
                         <p:cond delay="indefinite"/>
                       </p:stCondLst>
                       <p:childTnLst>
                         <p:par>
-                          <p:cTn id="10" fill="hold">
+                          <p:cTn id="8" fill="hold">
                             <p:stCondLst>
                               <p:cond delay="0"/>
                             </p:stCondLst>
                             <p:childTnLst>
                               <p:par>
-                                <p:cTn id="11" presetID="1" presetClass="entr" presetSubtype="0" fill="hold" grpId="0" nodeType="clickEffect">
+                                <p:cTn id="9" presetID="1" presetClass="entr" presetSubtype="0" fill="hold" grpId="0" nodeType="clickEffect">
                                   <p:stCondLst>
                                     <p:cond delay="0"/>
                                   </p:stCondLst>
                                   <p:childTnLst>
                                     <p:set>
                                       <p:cBhvr>
-                                        <p:cTn id="12" dur="1" fill="hold">
+                                        <p:cTn id="10" dur="1" fill="hold">
                                           <p:stCondLst>
                                             <p:cond delay="0"/>
                                           </p:stCondLst>
@@ -5455,26 +6519,26 @@
                     </p:cTn>
                   </p:par>
                   <p:par>
-                    <p:cTn id="13" fill="hold">
+                    <p:cTn id="11" fill="hold">
                       <p:stCondLst>
                         <p:cond delay="indefinite"/>
                       </p:stCondLst>
                       <p:childTnLst>
                         <p:par>
-                          <p:cTn id="14" fill="hold">
+                          <p:cTn id="12" fill="hold">
                             <p:stCondLst>
                               <p:cond delay="0"/>
                             </p:stCondLst>
                             <p:childTnLst>
                               <p:par>
-                                <p:cTn id="15" presetID="1" presetClass="entr" presetSubtype="0" fill="hold" grpId="0" nodeType="clickEffect">
+                                <p:cTn id="13" presetID="1" presetClass="entr" presetSubtype="0" fill="hold" grpId="0" nodeType="clickEffect">
                                   <p:stCondLst>
                                     <p:cond delay="0"/>
                                   </p:stCondLst>
                                   <p:childTnLst>
                                     <p:set>
                                       <p:cBhvr>
-                                        <p:cTn id="16" dur="1" fill="hold">
+                                        <p:cTn id="14" dur="1" fill="hold">
                                           <p:stCondLst>
                                             <p:cond delay="0"/>
                                           </p:stCondLst>
@@ -5500,26 +6564,116 @@
                     </p:cTn>
                   </p:par>
                   <p:par>
-                    <p:cTn id="17" fill="hold">
+                    <p:cTn id="15" fill="hold">
                       <p:stCondLst>
                         <p:cond delay="indefinite"/>
                       </p:stCondLst>
                       <p:childTnLst>
                         <p:par>
-                          <p:cTn id="18" fill="hold">
+                          <p:cTn id="16" fill="hold">
                             <p:stCondLst>
                               <p:cond delay="0"/>
                             </p:stCondLst>
                             <p:childTnLst>
                               <p:par>
-                                <p:cTn id="19" presetID="1" presetClass="entr" presetSubtype="0" fill="hold" grpId="0" nodeType="clickEffect">
+                                <p:cTn id="17" presetID="1" presetClass="entr" presetSubtype="0" fill="hold" grpId="0" nodeType="clickEffect">
                                   <p:stCondLst>
                                     <p:cond delay="0"/>
                                   </p:stCondLst>
                                   <p:childTnLst>
                                     <p:set>
                                       <p:cBhvr>
-                                        <p:cTn id="20" dur="1" fill="hold">
+                                        <p:cTn id="18" dur="1" fill="hold">
+                                          <p:stCondLst>
+                                            <p:cond delay="0"/>
+                                          </p:stCondLst>
+                                        </p:cTn>
+                                        <p:tgtEl>
+                                          <p:spTgt spid="7"/>
+                                        </p:tgtEl>
+                                        <p:attrNameLst>
+                                          <p:attrName>style.visibility</p:attrName>
+                                        </p:attrNameLst>
+                                      </p:cBhvr>
+                                      <p:to>
+                                        <p:strVal val="visible"/>
+                                      </p:to>
+                                    </p:set>
+                                  </p:childTnLst>
+                                </p:cTn>
+                              </p:par>
+                            </p:childTnLst>
+                          </p:cTn>
+                        </p:par>
+                      </p:childTnLst>
+                    </p:cTn>
+                  </p:par>
+                  <p:par>
+                    <p:cTn id="19" fill="hold">
+                      <p:stCondLst>
+                        <p:cond delay="indefinite"/>
+                      </p:stCondLst>
+                      <p:childTnLst>
+                        <p:par>
+                          <p:cTn id="20" fill="hold">
+                            <p:stCondLst>
+                              <p:cond delay="0"/>
+                            </p:stCondLst>
+                            <p:childTnLst>
+                              <p:par>
+                                <p:cTn id="21" presetID="1" presetClass="entr" presetSubtype="0" fill="hold" grpId="0" nodeType="clickEffect">
+                                  <p:stCondLst>
+                                    <p:cond delay="0"/>
+                                  </p:stCondLst>
+                                  <p:childTnLst>
+                                    <p:set>
+                                      <p:cBhvr>
+                                        <p:cTn id="22" dur="1" fill="hold">
+                                          <p:stCondLst>
+                                            <p:cond delay="0"/>
+                                          </p:stCondLst>
+                                        </p:cTn>
+                                        <p:tgtEl>
+                                          <p:spTgt spid="13"/>
+                                        </p:tgtEl>
+                                        <p:attrNameLst>
+                                          <p:attrName>style.visibility</p:attrName>
+                                        </p:attrNameLst>
+                                      </p:cBhvr>
+                                      <p:to>
+                                        <p:strVal val="visible"/>
+                                      </p:to>
+                                    </p:set>
+                                  </p:childTnLst>
+                                </p:cTn>
+                              </p:par>
+                            </p:childTnLst>
+                          </p:cTn>
+                        </p:par>
+                      </p:childTnLst>
+                    </p:cTn>
+                  </p:par>
+                  <p:par>
+                    <p:cTn id="23" fill="hold">
+                      <p:stCondLst>
+                        <p:cond delay="indefinite"/>
+                      </p:stCondLst>
+                      <p:childTnLst>
+                        <p:par>
+                          <p:cTn id="24" fill="hold">
+                            <p:stCondLst>
+                              <p:cond delay="0"/>
+                            </p:stCondLst>
+                            <p:childTnLst>
+                              <p:par>
+                                <p:cTn id="25" presetID="1" presetClass="entr" presetSubtype="0" fill="hold" grpId="0" nodeType="clickEffect">
+                                  <p:stCondLst>
+                                    <p:cond delay="0"/>
+                                  </p:stCondLst>
+                                  <p:childTnLst>
+                                    <p:set>
+                                      <p:cBhvr>
+                                        <p:cTn id="26" dur="1" fill="hold">
                                           <p:stCondLst>
                                             <p:cond delay="0"/>
                                           </p:stCondLst>
@@ -5545,32 +6699,32 @@
                     </p:cTn>
                   </p:par>
                   <p:par>
-                    <p:cTn id="21" fill="hold">
+                    <p:cTn id="27" fill="hold">
                       <p:stCondLst>
                         <p:cond delay="indefinite"/>
                       </p:stCondLst>
                       <p:childTnLst>
                         <p:par>
-                          <p:cTn id="22" fill="hold">
+                          <p:cTn id="28" fill="hold">
                             <p:stCondLst>
                               <p:cond delay="0"/>
                             </p:stCondLst>
                             <p:childTnLst>
                               <p:par>
-                                <p:cTn id="23" presetID="1" presetClass="entr" presetSubtype="0" fill="hold" grpId="0" nodeType="clickEffect">
+                                <p:cTn id="29" presetID="1" presetClass="entr" presetSubtype="0" fill="hold" grpId="0" nodeType="clickEffect">
                                   <p:stCondLst>
                                     <p:cond delay="0"/>
                                   </p:stCondLst>
                                   <p:childTnLst>
                                     <p:set>
                                       <p:cBhvr>
-                                        <p:cTn id="24" dur="1" fill="hold">
+                                        <p:cTn id="30" dur="1" fill="hold">
                                           <p:stCondLst>
                                             <p:cond delay="0"/>
                                           </p:stCondLst>
                                         </p:cTn>
                                         <p:tgtEl>
-                                          <p:spTgt spid="7"/>
+                                          <p:spTgt spid="14"/>
                                         </p:tgtEl>
                                         <p:attrNameLst>
                                           <p:attrName>style.visibility</p:attrName>
@@ -5590,77 +6744,32 @@
                     </p:cTn>
                   </p:par>
                   <p:par>
-                    <p:cTn id="25" fill="hold">
+                    <p:cTn id="31" fill="hold">
                       <p:stCondLst>
                         <p:cond delay="indefinite"/>
                       </p:stCondLst>
                       <p:childTnLst>
                         <p:par>
-                          <p:cTn id="26" fill="hold">
+                          <p:cTn id="32" fill="hold">
                             <p:stCondLst>
                               <p:cond delay="0"/>
                             </p:stCondLst>
                             <p:childTnLst>
                               <p:par>
-                                <p:cTn id="27" presetID="1" presetClass="entr" presetSubtype="0" fill="hold" grpId="0" nodeType="clickEffect">
+                                <p:cTn id="33" presetID="1" presetClass="entr" presetSubtype="0" fill="hold" nodeType="clickEffect">
                                   <p:stCondLst>
                                     <p:cond delay="0"/>
                                   </p:stCondLst>
                                   <p:childTnLst>
                                     <p:set>
                                       <p:cBhvr>
-                                        <p:cTn id="28" dur="1" fill="hold">
+                                        <p:cTn id="34" dur="1" fill="hold">
                                           <p:stCondLst>
                                             <p:cond delay="0"/>
                                           </p:stCondLst>
                                         </p:cTn>
                                         <p:tgtEl>
-                                          <p:spTgt spid="13"/>
-                                        </p:tgtEl>
-                                        <p:attrNameLst>
-                                          <p:attrName>style.visibility</p:attrName>
-                                        </p:attrNameLst>
-                                      </p:cBhvr>
-                                      <p:to>
-                                        <p:strVal val="visible"/>
-                                      </p:to>
-                                    </p:set>
-                                  </p:childTnLst>
-                                </p:cTn>
-                              </p:par>
-                            </p:childTnLst>
-                          </p:cTn>
-                        </p:par>
-                      </p:childTnLst>
-                    </p:cTn>
-                  </p:par>
-                  <p:par>
-                    <p:cTn id="29" fill="hold">
-                      <p:stCondLst>
-                        <p:cond delay="indefinite"/>
-                      </p:stCondLst>
-                      <p:childTnLst>
-                        <p:par>
-                          <p:cTn id="30" fill="hold">
-                            <p:stCondLst>
-                              <p:cond delay="0"/>
-                            </p:stCondLst>
-                            <p:childTnLst>
-                              <p:par>
-                                <p:cTn id="31" presetID="1" presetClass="entr" presetSubtype="0" fill="hold" grpId="0" nodeType="clickEffect">
-                                  <p:stCondLst>
-                                    <p:cond delay="0"/>
-                                  </p:stCondLst>
-                                  <p:childTnLst>
-                                    <p:set>
-                                      <p:cBhvr>
-                                        <p:cTn id="32" dur="1" fill="hold">
-                                          <p:stCondLst>
-                                            <p:cond delay="0"/>
-                                          </p:stCondLst>
-                                        </p:cTn>
-                                        <p:tgtEl>
-                                          <p:spTgt spid="14"/>
+                                          <p:spTgt spid="19"/>
                                         </p:tgtEl>
                                         <p:attrNameLst>
                                           <p:attrName>style.visibility</p:attrName>
@@ -5754,11 +6863,7 @@
           <a:p>
             <a:r>
               <a:rPr lang="de-DE" dirty="0" smtClean="0"/>
-              <a:t>Traditionelles Aikido</a:t>
-            </a:r>
-            <a:r>
-              <a:rPr lang="de-DE" dirty="0" smtClean="0"/>
-              <a:t>: ein äußerst durchdachtes, logisches System!</a:t>
+              <a:t>Traditionelles Aikido: ein äußerst durchdachtes, logisches System!</a:t>
             </a:r>
           </a:p>
           <a:p>
@@ -7781,7 +8886,7 @@
             </p:nvSpPr>
             <p:spPr>
               <a:xfrm>
-                <a:off x="35496" y="2897560"/>
+                <a:off x="35496" y="3257600"/>
                 <a:ext cx="5112568" cy="3123728"/>
               </a:xfrm>
               <a:prstGeom prst="rect">
@@ -7790,7 +8895,7 @@
             </p:spPr>
             <p:txBody>
               <a:bodyPr vert="horz" lIns="91440" tIns="45720" rIns="91440" bIns="45720" rtlCol="0">
-                <a:normAutofit fontScale="85000" lnSpcReduction="10000"/>
+                <a:normAutofit fontScale="92500" lnSpcReduction="20000"/>
               </a:bodyPr>
               <a:lstStyle>
                 <a:lvl1pPr marL="342900" indent="-342900" algn="l" defTabSz="914400" rtl="0" eaLnBrk="1" latinLnBrk="0" hangingPunct="1">
@@ -7943,11 +9048,13 @@
                   <a:rPr lang="de-DE" i="1" dirty="0" smtClean="0">
                     <a:latin typeface="Cambria Math"/>
                   </a:rPr>
-                  <a:t>heben“   (</a:t>
+                  <a:t>heben“   </a:t>
                 </a:r>
                 <a:r>
-                  <a:rPr lang="de-DE" i="1" dirty="0" smtClean="0"/>
-                  <a:t>Archimedes) </a:t>
+                  <a:rPr lang="de-DE" i="1" dirty="0">
+                    <a:latin typeface="Cambria Math"/>
+                  </a:rPr>
+                  <a:t>(Archimedes) </a:t>
                 </a:r>
                 <a:endParaRPr lang="de-DE" i="1" dirty="0">
                   <a:latin typeface="Cambria Math"/>
@@ -8087,19 +9194,22 @@
                 <a:endParaRPr lang="de-DE" sz="3200" dirty="0" smtClean="0"/>
               </a:p>
               <a:p>
+                <a:pPr marL="400050" lvl="1" indent="0">
+                  <a:buNone/>
+                </a:pPr>
                 <a14:m>
                   <m:oMath xmlns:m="http://schemas.openxmlformats.org/officeDocument/2006/math">
                     <m:sSub>
                       <m:sSubPr>
                         <m:ctrlPr>
-                          <a:rPr lang="de-DE" sz="3200" i="1" smtClean="0">
+                          <a:rPr lang="de-DE" sz="2800" i="1" smtClean="0">
                             <a:latin typeface="Cambria Math"/>
                           </a:rPr>
                         </m:ctrlPr>
                       </m:sSubPr>
                       <m:e>
                         <m:r>
-                          <a:rPr lang="de-DE" sz="3200" b="0" i="1" smtClean="0">
+                          <a:rPr lang="de-DE" sz="2800" b="0" i="1" smtClean="0">
                             <a:latin typeface="Cambria Math"/>
                           </a:rPr>
                           <m:t>h</m:t>
@@ -8107,7 +9217,7 @@
                       </m:e>
                       <m:sub>
                         <m:r>
-                          <a:rPr lang="de-DE" sz="3200" b="0" i="1" smtClean="0">
+                          <a:rPr lang="de-DE" sz="2800" b="0" i="1" smtClean="0">
                             <a:latin typeface="Cambria Math"/>
                           </a:rPr>
                           <m:t>𝑙</m:t>
@@ -8115,7 +9225,7 @@
                       </m:sub>
                     </m:sSub>
                     <m:r>
-                      <a:rPr lang="de-DE" sz="3200" b="0" i="1" smtClean="0">
+                      <a:rPr lang="de-DE" sz="2800" b="0" i="1" smtClean="0">
                         <a:latin typeface="Cambria Math"/>
                       </a:rPr>
                       <m:t>,</m:t>
@@ -8123,14 +9233,14 @@
                     <m:sSub>
                       <m:sSubPr>
                         <m:ctrlPr>
-                          <a:rPr lang="de-DE" sz="3200" b="0" i="1" smtClean="0">
+                          <a:rPr lang="de-DE" sz="2800" b="0" i="1" smtClean="0">
                             <a:latin typeface="Cambria Math"/>
                           </a:rPr>
                         </m:ctrlPr>
                       </m:sSubPr>
                       <m:e>
                         <m:r>
-                          <a:rPr lang="de-DE" sz="3200" b="0" i="1" smtClean="0">
+                          <a:rPr lang="de-DE" sz="2800" b="0" i="1" smtClean="0">
                             <a:latin typeface="Cambria Math"/>
                           </a:rPr>
                           <m:t>h</m:t>
@@ -8138,7 +9248,7 @@
                       </m:e>
                       <m:sub>
                         <m:r>
-                          <a:rPr lang="de-DE" sz="3200" b="0" i="1" smtClean="0">
+                          <a:rPr lang="de-DE" sz="2800" b="0" i="1" smtClean="0">
                             <a:latin typeface="Cambria Math"/>
                           </a:rPr>
                           <m:t>𝑟</m:t>
@@ -8148,13 +9258,16 @@
                   </m:oMath>
                 </a14:m>
                 <a:r>
-                  <a:rPr lang="de-DE" sz="3200" dirty="0" smtClean="0"/>
+                  <a:rPr lang="de-DE" sz="2800" dirty="0" smtClean="0"/>
                   <a:t>: Hebelarm links und rechts</a:t>
                 </a:r>
               </a:p>
               <a:p>
+                <a:pPr marL="400050" lvl="1" indent="0">
+                  <a:buNone/>
+                </a:pPr>
                 <a:r>
-                  <a:rPr lang="de-DE" sz="3200" dirty="0" smtClean="0"/>
+                  <a:rPr lang="de-DE" sz="2800" dirty="0" smtClean="0"/>
                   <a:t> </a:t>
                 </a:r>
                 <a14:m>
@@ -8224,7 +9337,7 @@
                   </m:oMath>
                 </a14:m>
                 <a:r>
-                  <a:rPr lang="de-DE" sz="3200" dirty="0" smtClean="0"/>
+                  <a:rPr lang="de-DE" sz="2800" dirty="0" smtClean="0"/>
                   <a:t> Kraft links und rechts</a:t>
                 </a:r>
               </a:p>
@@ -8242,7 +9355,7 @@
             </p:nvSpPr>
             <p:spPr>
               <a:xfrm>
-                <a:off x="35496" y="2897560"/>
+                <a:off x="35496" y="3257600"/>
                 <a:ext cx="5112568" cy="3123728"/>
               </a:xfrm>
               <a:prstGeom prst="rect">
@@ -8251,7 +9364,7 @@
               <a:blipFill rotWithShape="1">
                 <a:blip r:embed="rId6"/>
                 <a:stretch>
-                  <a:fillRect l="-2267" t="-3119" r="-2387" b="-195"/>
+                  <a:fillRect l="-2864" t="-5458" r="-2864"/>
                 </a:stretch>
               </a:blipFill>
             </p:spPr>
@@ -8647,8 +9760,8 @@
             </p:style>
           </p:cxnSp>
         </p:grpSp>
-        <mc:AlternateContent xmlns:mc="http://schemas.openxmlformats.org/markup-compatibility/2006">
-          <mc:Choice xmlns:a14="http://schemas.microsoft.com/office/drawing/2010/main" Requires="a14">
+        <mc:AlternateContent xmlns:mc="http://schemas.openxmlformats.org/markup-compatibility/2006" xmlns:a14="http://schemas.microsoft.com/office/drawing/2010/main">
+          <mc:Choice Requires="a14">
             <p:sp>
               <p:nvSpPr>
                 <p:cNvPr id="29" name="Rechteck 28"/>
@@ -8723,7 +9836,7 @@
               </p:txBody>
             </p:sp>
           </mc:Choice>
-          <mc:Fallback>
+          <mc:Fallback xmlns="">
             <p:sp>
               <p:nvSpPr>
                 <p:cNvPr id="29" name="Rechteck 28"/>
@@ -8903,6 +10016,39 @@
           </a:fontRef>
         </p:style>
       </p:cxnSp>
+      <p:sp>
+        <p:nvSpPr>
+          <p:cNvPr id="20" name="Textfeld 19"/>
+          <p:cNvSpPr txBox="1"/>
+          <p:nvPr/>
+        </p:nvSpPr>
+        <p:spPr>
+          <a:xfrm>
+            <a:off x="62901" y="2739670"/>
+            <a:ext cx="5147115" cy="369332"/>
+          </a:xfrm>
+          <a:prstGeom prst="rect">
+            <a:avLst/>
+          </a:prstGeom>
+          <a:noFill/>
+        </p:spPr>
+        <p:txBody>
+          <a:bodyPr wrap="none" rtlCol="0">
+            <a:spAutoFit/>
+          </a:bodyPr>
+          <a:lstStyle/>
+          <a:p>
+            <a:r>
+              <a:rPr lang="de-DE" dirty="0" smtClean="0"/>
+              <a:t>(Bild von: </a:t>
+            </a:r>
+            <a:r>
+              <a:rPr lang="de-DE" dirty="0"/>
+              <a:t>http://de.wikipedia.org/wiki/Hebelgesetz)</a:t>
+            </a:r>
+          </a:p>
+        </p:txBody>
+      </p:sp>
     </p:spTree>
     <p:extLst>
       <p:ext uri="{BB962C8B-B14F-4D97-AF65-F5344CB8AC3E}">
@@ -9478,7 +10624,7 @@
         </p:spPr>
         <p:txBody>
           <a:bodyPr>
-            <a:normAutofit/>
+            <a:normAutofit lnSpcReduction="10000"/>
           </a:bodyPr>
           <a:lstStyle/>
           <a:p>
@@ -9505,13 +10651,11 @@
             </a:pPr>
             <a:r>
               <a:rPr lang="de-DE" dirty="0" smtClean="0"/>
-              <a:t>Ihren natürlichen Spielraum ausnutzen</a:t>
-            </a:r>
-          </a:p>
-          <a:p>
+              <a:t>Ihren natürlichen Spielraum </a:t>
+            </a:r>
             <a:r>
               <a:rPr lang="de-DE" dirty="0" smtClean="0"/>
-              <a:t>Starke Haltung in Aikido:</a:t>
+              <a:t>ausnutzen</a:t>
             </a:r>
           </a:p>
           <a:p>
@@ -9521,16 +10665,24 @@
             </a:pPr>
             <a:r>
               <a:rPr lang="de-DE" dirty="0" smtClean="0"/>
-              <a:t>Kokyu</a:t>
-            </a:r>
-            <a:r>
-              <a:rPr lang="de-DE" dirty="0"/>
-              <a:t> </a:t>
-            </a:r>
+              <a:t>Sich in die Kraftlinie des Angreifers einbinden</a:t>
+            </a:r>
+            <a:endParaRPr lang="de-DE" dirty="0" smtClean="0"/>
+          </a:p>
+          <a:p>
             <a:r>
               <a:rPr lang="de-DE" dirty="0" smtClean="0"/>
-              <a:t>(Atemkraft vs. muskuläre Spannung) </a:t>
-            </a:r>
+              <a:t>Beim </a:t>
+            </a:r>
+            <a:r>
+              <a:rPr lang="de-DE" dirty="0" err="1" smtClean="0"/>
+              <a:t>Aikidoka</a:t>
+            </a:r>
+            <a:r>
+              <a:rPr lang="de-DE" dirty="0" smtClean="0"/>
+              <a:t>:</a:t>
+            </a:r>
+            <a:endParaRPr lang="de-DE" dirty="0" smtClean="0"/>
           </a:p>
           <a:p>
             <a:pPr marL="914400" lvl="1" indent="-514350">
@@ -9539,9 +10691,17 @@
             </a:pPr>
             <a:r>
               <a:rPr lang="de-DE" dirty="0" smtClean="0"/>
-              <a:t>Körpermittellinie. </a:t>
-            </a:r>
-            <a:endParaRPr lang="de-DE" sz="2400" dirty="0" smtClean="0"/>
+              <a:t>Kokyu</a:t>
+            </a:r>
+            <a:r>
+              <a:rPr lang="de-DE" dirty="0"/>
+              <a:t> </a:t>
+            </a:r>
+            <a:r>
+              <a:rPr lang="de-DE" dirty="0" smtClean="0"/>
+              <a:t>(Atemkraft vs. muskuläre Spannung) </a:t>
+            </a:r>
+            <a:endParaRPr lang="de-DE" dirty="0" smtClean="0"/>
           </a:p>
           <a:p>
             <a:pPr marL="914400" lvl="1" indent="-514350">
@@ -9550,20 +10710,23 @@
             </a:pPr>
             <a:r>
               <a:rPr lang="de-DE" dirty="0" smtClean="0"/>
-              <a:t>Bequemster Arbeitsbereich </a:t>
-            </a:r>
-            <a:br>
+              <a:t>Fußstellung </a:t>
+            </a:r>
+            <a:r>
+              <a:rPr lang="de-DE" dirty="0" err="1" smtClean="0"/>
+              <a:t>Hanmi</a:t>
+            </a:r>
+            <a:endParaRPr lang="de-DE" dirty="0" smtClean="0"/>
+          </a:p>
+          <a:p>
+            <a:pPr marL="914400" lvl="1" indent="-514350">
+              <a:buFont typeface="+mj-lt"/>
+              <a:buAutoNum type="arabicPeriod"/>
+            </a:pPr>
+            <a:r>
               <a:rPr lang="de-DE" dirty="0" smtClean="0"/>
-            </a:br>
-            <a:r>
-              <a:rPr lang="de-DE" sz="2400" dirty="0" smtClean="0"/>
-              <a:t>(wie beim Essen, Tippen, Schreiben, Werkeln!)</a:t>
-            </a:r>
-          </a:p>
-          <a:p>
-            <a:pPr marL="400050" lvl="1" indent="0">
-              <a:buNone/>
-            </a:pPr>
+              <a:t>Techniken werden in der Körpermittellinie ausgeführt </a:t>
+            </a:r>
             <a:endParaRPr lang="de-DE" sz="2400" dirty="0" smtClean="0"/>
           </a:p>
           <a:p>
@@ -9766,33 +10929,15 @@
                                   </p:childTnLst>
                                 </p:cTn>
                               </p:par>
-                            </p:childTnLst>
-                          </p:cTn>
-                        </p:par>
-                      </p:childTnLst>
-                    </p:cTn>
-                  </p:par>
-                  <p:par>
-                    <p:cTn id="15" fill="hold">
-                      <p:stCondLst>
-                        <p:cond delay="indefinite"/>
-                      </p:stCondLst>
-                      <p:childTnLst>
-                        <p:par>
-                          <p:cTn id="16" fill="hold">
-                            <p:stCondLst>
-                              <p:cond delay="0"/>
-                            </p:stCondLst>
-                            <p:childTnLst>
                               <p:par>
-                                <p:cTn id="17" presetID="1" presetClass="entr" presetSubtype="0" fill="hold" grpId="0" nodeType="clickEffect">
+                                <p:cTn id="15" presetID="1" presetClass="entr" presetSubtype="0" fill="hold" grpId="0" nodeType="withEffect">
                                   <p:stCondLst>
                                     <p:cond delay="0"/>
                                   </p:stCondLst>
                                   <p:childTnLst>
                                     <p:set>
                                       <p:cBhvr>
-                                        <p:cTn id="18" dur="1" fill="hold">
+                                        <p:cTn id="16" dur="1" fill="hold">
                                           <p:stCondLst>
                                             <p:cond delay="0"/>
                                           </p:stCondLst>
@@ -9822,26 +10967,26 @@
                     </p:cTn>
                   </p:par>
                   <p:par>
-                    <p:cTn id="19" fill="hold">
+                    <p:cTn id="17" fill="hold">
                       <p:stCondLst>
                         <p:cond delay="indefinite"/>
                       </p:stCondLst>
                       <p:childTnLst>
                         <p:par>
-                          <p:cTn id="20" fill="hold">
+                          <p:cTn id="18" fill="hold">
                             <p:stCondLst>
                               <p:cond delay="0"/>
                             </p:stCondLst>
                             <p:childTnLst>
                               <p:par>
-                                <p:cTn id="21" presetID="1" presetClass="entr" presetSubtype="0" fill="hold" grpId="0" nodeType="clickEffect">
+                                <p:cTn id="19" presetID="1" presetClass="entr" presetSubtype="0" fill="hold" grpId="0" nodeType="clickEffect">
                                   <p:stCondLst>
                                     <p:cond delay="0"/>
                                   </p:stCondLst>
                                   <p:childTnLst>
                                     <p:set>
                                       <p:cBhvr>
-                                        <p:cTn id="22" dur="1" fill="hold">
+                                        <p:cTn id="20" dur="1" fill="hold">
                                           <p:stCondLst>
                                             <p:cond delay="0"/>
                                           </p:stCondLst>
@@ -9871,19 +11016,50 @@
                     </p:cTn>
                   </p:par>
                   <p:par>
-                    <p:cTn id="23" fill="hold">
+                    <p:cTn id="21" fill="hold">
                       <p:stCondLst>
                         <p:cond delay="indefinite"/>
                       </p:stCondLst>
                       <p:childTnLst>
                         <p:par>
-                          <p:cTn id="24" fill="hold">
+                          <p:cTn id="22" fill="hold">
                             <p:stCondLst>
                               <p:cond delay="0"/>
                             </p:stCondLst>
                             <p:childTnLst>
                               <p:par>
-                                <p:cTn id="25" presetID="1" presetClass="entr" presetSubtype="0" fill="hold" grpId="0" nodeType="clickEffect">
+                                <p:cTn id="23" presetID="1" presetClass="entr" presetSubtype="0" fill="hold" grpId="0" nodeType="clickEffect">
+                                  <p:stCondLst>
+                                    <p:cond delay="0"/>
+                                  </p:stCondLst>
+                                  <p:childTnLst>
+                                    <p:set>
+                                      <p:cBhvr>
+                                        <p:cTn id="24" dur="1" fill="hold">
+                                          <p:stCondLst>
+                                            <p:cond delay="0"/>
+                                          </p:stCondLst>
+                                        </p:cTn>
+                                        <p:tgtEl>
+                                          <p:spTgt spid="7">
+                                            <p:txEl>
+                                              <p:pRg st="5" end="5"/>
+                                            </p:txEl>
+                                          </p:spTgt>
+                                        </p:tgtEl>
+                                        <p:attrNameLst>
+                                          <p:attrName>style.visibility</p:attrName>
+                                        </p:attrNameLst>
+                                      </p:cBhvr>
+                                      <p:to>
+                                        <p:strVal val="visible"/>
+                                      </p:to>
+                                    </p:set>
+                                  </p:childTnLst>
+                                </p:cTn>
+                              </p:par>
+                              <p:par>
+                                <p:cTn id="25" presetID="1" presetClass="entr" presetSubtype="0" fill="hold" grpId="0" nodeType="withEffect">
                                   <p:stCondLst>
                                     <p:cond delay="0"/>
                                   </p:stCondLst>
@@ -9898,7 +11074,7 @@
                                         <p:tgtEl>
                                           <p:spTgt spid="7">
                                             <p:txEl>
-                                              <p:pRg st="5" end="5"/>
+                                              <p:pRg st="6" end="6"/>
                                             </p:txEl>
                                           </p:spTgt>
                                         </p:tgtEl>
@@ -9947,7 +11123,7 @@
                                         <p:tgtEl>
                                           <p:spTgt spid="7">
                                             <p:txEl>
-                                              <p:pRg st="6" end="6"/>
+                                              <p:pRg st="7" end="7"/>
                                             </p:txEl>
                                           </p:spTgt>
                                         </p:tgtEl>
@@ -10013,8 +11189,8 @@
           <a:chExt cx="0" cy="0"/>
         </a:xfrm>
       </p:grpSpPr>
-      <mc:AlternateContent xmlns:mc="http://schemas.openxmlformats.org/markup-compatibility/2006" xmlns:a14="http://schemas.microsoft.com/office/drawing/2010/main">
-        <mc:Choice Requires="a14">
+      <mc:AlternateContent xmlns:mc="http://schemas.openxmlformats.org/markup-compatibility/2006">
+        <mc:Choice xmlns:a14="http://schemas.microsoft.com/office/drawing/2010/main" Requires="a14">
           <p:sp>
             <p:nvSpPr>
               <p:cNvPr id="2" name="Inhaltsplatzhalter 1"/>
@@ -10074,6 +11250,10 @@
                   <a:buFont typeface="+mj-lt"/>
                   <a:buAutoNum type="arabicPeriod"/>
                 </a:pPr>
+                <a:r>
+                  <a:rPr lang="de-DE" b="0" dirty="0" smtClean="0"/>
+                  <a:t> </a:t>
+                </a:r>
                 <a14:m>
                   <m:oMath xmlns:m="http://schemas.openxmlformats.org/officeDocument/2006/math">
                     <m:r>
@@ -10174,7 +11354,7 @@
             </p:txBody>
           </p:sp>
         </mc:Choice>
-        <mc:Fallback xmlns="">
+        <mc:Fallback>
           <p:sp>
             <p:nvSpPr>
               <p:cNvPr id="2" name="Inhaltsplatzhalter 1"/>

</xml_diff>